<commit_message>
Added static code analysis using sonar
</commit_message>
<xml_diff>
--- a/Presentation/Presentation.pptx
+++ b/Presentation/Presentation.pptx
@@ -5,39 +5,42 @@
     <p:sldMasterId id="2147483658" r:id="rId1"/>
   </p:sldMasterIdLst>
   <p:notesMasterIdLst>
-    <p:notesMasterId r:id="rId16"/>
+    <p:notesMasterId r:id="rId19"/>
   </p:notesMasterIdLst>
   <p:sldIdLst>
     <p:sldId id="256" r:id="rId2"/>
     <p:sldId id="257" r:id="rId3"/>
     <p:sldId id="258" r:id="rId4"/>
     <p:sldId id="259" r:id="rId5"/>
-    <p:sldId id="260" r:id="rId6"/>
-    <p:sldId id="261" r:id="rId7"/>
-    <p:sldId id="262" r:id="rId8"/>
-    <p:sldId id="263" r:id="rId9"/>
-    <p:sldId id="264" r:id="rId10"/>
-    <p:sldId id="265" r:id="rId11"/>
-    <p:sldId id="266" r:id="rId12"/>
-    <p:sldId id="267" r:id="rId13"/>
-    <p:sldId id="268" r:id="rId14"/>
-    <p:sldId id="269" r:id="rId15"/>
+    <p:sldId id="274" r:id="rId6"/>
+    <p:sldId id="273" r:id="rId7"/>
+    <p:sldId id="271" r:id="rId8"/>
+    <p:sldId id="270" r:id="rId9"/>
+    <p:sldId id="261" r:id="rId10"/>
+    <p:sldId id="262" r:id="rId11"/>
+    <p:sldId id="263" r:id="rId12"/>
+    <p:sldId id="264" r:id="rId13"/>
+    <p:sldId id="265" r:id="rId14"/>
+    <p:sldId id="266" r:id="rId15"/>
+    <p:sldId id="267" r:id="rId16"/>
+    <p:sldId id="268" r:id="rId17"/>
+    <p:sldId id="269" r:id="rId18"/>
   </p:sldIdLst>
   <p:sldSz cx="9144000" cy="5143500" type="screen16x9"/>
   <p:notesSz cx="6858000" cy="9144000"/>
   <p:embeddedFontLst>
-    <p:embeddedFont>
-      <p:font typeface="Quattrocento Sans" charset="0"/>
-      <p:bold r:id="rId17"/>
-      <p:italic r:id="rId18"/>
-      <p:boldItalic r:id="rId19"/>
-    </p:embeddedFont>
     <p:embeddedFont>
       <p:font typeface="Lora" charset="0"/>
       <p:regular r:id="rId20"/>
       <p:bold r:id="rId21"/>
       <p:italic r:id="rId22"/>
       <p:boldItalic r:id="rId23"/>
+    </p:embeddedFont>
+    <p:embeddedFont>
+      <p:font typeface="Quattrocento Sans" charset="0"/>
+      <p:bold r:id="rId24"/>
+      <p:italic r:id="rId25"/>
+      <p:boldItalic r:id="rId26"/>
     </p:embeddedFont>
   </p:embeddedFontLst>
   <p:defaultTextStyle>
@@ -613,6 +616,107 @@
   <p:cSld>
     <p:spTree>
       <p:nvGrpSpPr>
+        <p:cNvPr id="1" name="Shape 107"/>
+        <p:cNvGrpSpPr/>
+        <p:nvPr/>
+      </p:nvGrpSpPr>
+      <p:grpSpPr>
+        <a:xfrm>
+          <a:off x="0" y="0"/>
+          <a:ext cx="0" cy="0"/>
+          <a:chOff x="0" y="0"/>
+          <a:chExt cx="0" cy="0"/>
+        </a:xfrm>
+      </p:grpSpPr>
+      <p:sp>
+        <p:nvSpPr>
+          <p:cNvPr id="108" name="Shape 108"/>
+          <p:cNvSpPr>
+            <a:spLocks noGrp="1" noRot="1" noChangeAspect="1"/>
+          </p:cNvSpPr>
+          <p:nvPr>
+            <p:ph type="sldImg" idx="2"/>
+          </p:nvPr>
+        </p:nvSpPr>
+        <p:spPr>
+          <a:xfrm>
+            <a:off x="381000" y="685800"/>
+            <a:ext cx="6096000" cy="3429000"/>
+          </a:xfrm>
+          <a:custGeom>
+            <a:avLst/>
+            <a:gdLst/>
+            <a:ahLst/>
+            <a:cxnLst/>
+            <a:rect l="0" t="0" r="0" b="0"/>
+            <a:pathLst>
+              <a:path w="120000" h="120000" extrusionOk="0">
+                <a:moveTo>
+                  <a:pt x="0" y="0"/>
+                </a:moveTo>
+                <a:lnTo>
+                  <a:pt x="120000" y="0"/>
+                </a:lnTo>
+                <a:lnTo>
+                  <a:pt x="120000" y="120000"/>
+                </a:lnTo>
+                <a:lnTo>
+                  <a:pt x="0" y="120000"/>
+                </a:lnTo>
+                <a:close/>
+              </a:path>
+            </a:pathLst>
+          </a:custGeom>
+        </p:spPr>
+      </p:sp>
+      <p:sp>
+        <p:nvSpPr>
+          <p:cNvPr id="109" name="Shape 109"/>
+          <p:cNvSpPr txBox="1">
+            <a:spLocks noGrp="1"/>
+          </p:cNvSpPr>
+          <p:nvPr>
+            <p:ph type="body" idx="1"/>
+          </p:nvPr>
+        </p:nvSpPr>
+        <p:spPr>
+          <a:xfrm>
+            <a:off x="685800" y="4343400"/>
+            <a:ext cx="5486399" cy="4114800"/>
+          </a:xfrm>
+          <a:prstGeom prst="rect">
+            <a:avLst/>
+          </a:prstGeom>
+        </p:spPr>
+        <p:txBody>
+          <a:bodyPr lIns="91425" tIns="91425" rIns="91425" bIns="91425" anchor="t" anchorCtr="0">
+            <a:noAutofit/>
+          </a:bodyPr>
+          <a:lstStyle/>
+          <a:p>
+            <a:pPr lvl="0">
+              <a:spcBef>
+                <a:spcPts val="0"/>
+              </a:spcBef>
+              <a:buNone/>
+            </a:pPr>
+            <a:endParaRPr/>
+          </a:p>
+        </p:txBody>
+      </p:sp>
+    </p:spTree>
+  </p:cSld>
+  <p:clrMapOvr>
+    <a:masterClrMapping/>
+  </p:clrMapOvr>
+</p:notes>
+</file>
+
+<file path=ppt/notesSlides/notesSlide11.xml><?xml version="1.0" encoding="utf-8"?>
+<p:notes xmlns:a="http://schemas.openxmlformats.org/drawingml/2006/main" xmlns:r="http://schemas.openxmlformats.org/officeDocument/2006/relationships" xmlns:p="http://schemas.openxmlformats.org/presentationml/2006/main" showMasterSp="0" showMasterPhAnim="0">
+  <p:cSld>
+    <p:spTree>
+      <p:nvGrpSpPr>
         <p:cNvPr id="1" name="Shape 95"/>
         <p:cNvGrpSpPr/>
         <p:nvPr/>
@@ -709,7 +813,7 @@
 </p:notes>
 </file>
 
-<file path=ppt/notesSlides/notesSlide11.xml><?xml version="1.0" encoding="utf-8"?>
+<file path=ppt/notesSlides/notesSlide12.xml><?xml version="1.0" encoding="utf-8"?>
 <p:notes xmlns:a="http://schemas.openxmlformats.org/drawingml/2006/main" xmlns:r="http://schemas.openxmlformats.org/officeDocument/2006/relationships" xmlns:p="http://schemas.openxmlformats.org/presentationml/2006/main" showMasterSp="0" showMasterPhAnim="0">
   <p:cSld>
     <p:spTree>
@@ -810,7 +914,7 @@
 </p:notes>
 </file>
 
-<file path=ppt/notesSlides/notesSlide12.xml><?xml version="1.0" encoding="utf-8"?>
+<file path=ppt/notesSlides/notesSlide13.xml><?xml version="1.0" encoding="utf-8"?>
 <p:notes xmlns:a="http://schemas.openxmlformats.org/drawingml/2006/main" xmlns:r="http://schemas.openxmlformats.org/officeDocument/2006/relationships" xmlns:p="http://schemas.openxmlformats.org/presentationml/2006/main" showMasterSp="0" showMasterPhAnim="0">
   <p:cSld>
     <p:spTree>
@@ -911,7 +1015,7 @@
 </p:notes>
 </file>
 
-<file path=ppt/notesSlides/notesSlide13.xml><?xml version="1.0" encoding="utf-8"?>
+<file path=ppt/notesSlides/notesSlide14.xml><?xml version="1.0" encoding="utf-8"?>
 <p:notes xmlns:a="http://schemas.openxmlformats.org/drawingml/2006/main" xmlns:r="http://schemas.openxmlformats.org/officeDocument/2006/relationships" xmlns:p="http://schemas.openxmlformats.org/presentationml/2006/main" showMasterSp="0" showMasterPhAnim="0">
   <p:cSld>
     <p:spTree>
@@ -1012,7 +1116,209 @@
 </p:notes>
 </file>
 
-<file path=ppt/notesSlides/notesSlide14.xml><?xml version="1.0" encoding="utf-8"?>
+<file path=ppt/notesSlides/notesSlide15.xml><?xml version="1.0" encoding="utf-8"?>
+<p:notes xmlns:a="http://schemas.openxmlformats.org/drawingml/2006/main" xmlns:r="http://schemas.openxmlformats.org/officeDocument/2006/relationships" xmlns:p="http://schemas.openxmlformats.org/presentationml/2006/main" showMasterSp="0" showMasterPhAnim="0">
+  <p:cSld>
+    <p:spTree>
+      <p:nvGrpSpPr>
+        <p:cNvPr id="1" name="Shape 95"/>
+        <p:cNvGrpSpPr/>
+        <p:nvPr/>
+      </p:nvGrpSpPr>
+      <p:grpSpPr>
+        <a:xfrm>
+          <a:off x="0" y="0"/>
+          <a:ext cx="0" cy="0"/>
+          <a:chOff x="0" y="0"/>
+          <a:chExt cx="0" cy="0"/>
+        </a:xfrm>
+      </p:grpSpPr>
+      <p:sp>
+        <p:nvSpPr>
+          <p:cNvPr id="96" name="Shape 96"/>
+          <p:cNvSpPr>
+            <a:spLocks noGrp="1" noRot="1" noChangeAspect="1"/>
+          </p:cNvSpPr>
+          <p:nvPr>
+            <p:ph type="sldImg" idx="2"/>
+          </p:nvPr>
+        </p:nvSpPr>
+        <p:spPr>
+          <a:xfrm>
+            <a:off x="381000" y="685800"/>
+            <a:ext cx="6096000" cy="3429000"/>
+          </a:xfrm>
+          <a:custGeom>
+            <a:avLst/>
+            <a:gdLst/>
+            <a:ahLst/>
+            <a:cxnLst/>
+            <a:rect l="0" t="0" r="0" b="0"/>
+            <a:pathLst>
+              <a:path w="120000" h="120000" extrusionOk="0">
+                <a:moveTo>
+                  <a:pt x="0" y="0"/>
+                </a:moveTo>
+                <a:lnTo>
+                  <a:pt x="120000" y="0"/>
+                </a:lnTo>
+                <a:lnTo>
+                  <a:pt x="120000" y="120000"/>
+                </a:lnTo>
+                <a:lnTo>
+                  <a:pt x="0" y="120000"/>
+                </a:lnTo>
+                <a:close/>
+              </a:path>
+            </a:pathLst>
+          </a:custGeom>
+        </p:spPr>
+      </p:sp>
+      <p:sp>
+        <p:nvSpPr>
+          <p:cNvPr id="97" name="Shape 97"/>
+          <p:cNvSpPr txBox="1">
+            <a:spLocks noGrp="1"/>
+          </p:cNvSpPr>
+          <p:nvPr>
+            <p:ph type="body" idx="1"/>
+          </p:nvPr>
+        </p:nvSpPr>
+        <p:spPr>
+          <a:xfrm>
+            <a:off x="685800" y="4343400"/>
+            <a:ext cx="5486399" cy="4114800"/>
+          </a:xfrm>
+          <a:prstGeom prst="rect">
+            <a:avLst/>
+          </a:prstGeom>
+        </p:spPr>
+        <p:txBody>
+          <a:bodyPr lIns="91425" tIns="91425" rIns="91425" bIns="91425" anchor="t" anchorCtr="0">
+            <a:noAutofit/>
+          </a:bodyPr>
+          <a:lstStyle/>
+          <a:p>
+            <a:pPr lvl="0">
+              <a:spcBef>
+                <a:spcPts val="0"/>
+              </a:spcBef>
+              <a:buNone/>
+            </a:pPr>
+            <a:endParaRPr/>
+          </a:p>
+        </p:txBody>
+      </p:sp>
+    </p:spTree>
+  </p:cSld>
+  <p:clrMapOvr>
+    <a:masterClrMapping/>
+  </p:clrMapOvr>
+</p:notes>
+</file>
+
+<file path=ppt/notesSlides/notesSlide16.xml><?xml version="1.0" encoding="utf-8"?>
+<p:notes xmlns:a="http://schemas.openxmlformats.org/drawingml/2006/main" xmlns:r="http://schemas.openxmlformats.org/officeDocument/2006/relationships" xmlns:p="http://schemas.openxmlformats.org/presentationml/2006/main" showMasterSp="0" showMasterPhAnim="0">
+  <p:cSld>
+    <p:spTree>
+      <p:nvGrpSpPr>
+        <p:cNvPr id="1" name="Shape 107"/>
+        <p:cNvGrpSpPr/>
+        <p:nvPr/>
+      </p:nvGrpSpPr>
+      <p:grpSpPr>
+        <a:xfrm>
+          <a:off x="0" y="0"/>
+          <a:ext cx="0" cy="0"/>
+          <a:chOff x="0" y="0"/>
+          <a:chExt cx="0" cy="0"/>
+        </a:xfrm>
+      </p:grpSpPr>
+      <p:sp>
+        <p:nvSpPr>
+          <p:cNvPr id="108" name="Shape 108"/>
+          <p:cNvSpPr>
+            <a:spLocks noGrp="1" noRot="1" noChangeAspect="1"/>
+          </p:cNvSpPr>
+          <p:nvPr>
+            <p:ph type="sldImg" idx="2"/>
+          </p:nvPr>
+        </p:nvSpPr>
+        <p:spPr>
+          <a:xfrm>
+            <a:off x="381000" y="685800"/>
+            <a:ext cx="6096000" cy="3429000"/>
+          </a:xfrm>
+          <a:custGeom>
+            <a:avLst/>
+            <a:gdLst/>
+            <a:ahLst/>
+            <a:cxnLst/>
+            <a:rect l="0" t="0" r="0" b="0"/>
+            <a:pathLst>
+              <a:path w="120000" h="120000" extrusionOk="0">
+                <a:moveTo>
+                  <a:pt x="0" y="0"/>
+                </a:moveTo>
+                <a:lnTo>
+                  <a:pt x="120000" y="0"/>
+                </a:lnTo>
+                <a:lnTo>
+                  <a:pt x="120000" y="120000"/>
+                </a:lnTo>
+                <a:lnTo>
+                  <a:pt x="0" y="120000"/>
+                </a:lnTo>
+                <a:close/>
+              </a:path>
+            </a:pathLst>
+          </a:custGeom>
+        </p:spPr>
+      </p:sp>
+      <p:sp>
+        <p:nvSpPr>
+          <p:cNvPr id="109" name="Shape 109"/>
+          <p:cNvSpPr txBox="1">
+            <a:spLocks noGrp="1"/>
+          </p:cNvSpPr>
+          <p:nvPr>
+            <p:ph type="body" idx="1"/>
+          </p:nvPr>
+        </p:nvSpPr>
+        <p:spPr>
+          <a:xfrm>
+            <a:off x="685800" y="4343400"/>
+            <a:ext cx="5486399" cy="4114800"/>
+          </a:xfrm>
+          <a:prstGeom prst="rect">
+            <a:avLst/>
+          </a:prstGeom>
+        </p:spPr>
+        <p:txBody>
+          <a:bodyPr lIns="91425" tIns="91425" rIns="91425" bIns="91425" anchor="t" anchorCtr="0">
+            <a:noAutofit/>
+          </a:bodyPr>
+          <a:lstStyle/>
+          <a:p>
+            <a:pPr lvl="0">
+              <a:spcBef>
+                <a:spcPts val="0"/>
+              </a:spcBef>
+              <a:buNone/>
+            </a:pPr>
+            <a:endParaRPr/>
+          </a:p>
+        </p:txBody>
+      </p:sp>
+    </p:spTree>
+  </p:cSld>
+  <p:clrMapOvr>
+    <a:masterClrMapping/>
+  </p:clrMapOvr>
+</p:notes>
+</file>
+
+<file path=ppt/notesSlides/notesSlide17.xml><?xml version="1.0" encoding="utf-8"?>
 <p:notes xmlns:a="http://schemas.openxmlformats.org/drawingml/2006/main" xmlns:r="http://schemas.openxmlformats.org/officeDocument/2006/relationships" xmlns:p="http://schemas.openxmlformats.org/presentationml/2006/main" showMasterSp="0" showMasterPhAnim="0">
   <p:cSld>
     <p:spTree>
@@ -1522,7 +1828,7 @@
   <p:cSld>
     <p:spTree>
       <p:nvGrpSpPr>
-        <p:cNvPr id="1" name="Shape 95"/>
+        <p:cNvPr id="1" name="Shape 107"/>
         <p:cNvGrpSpPr/>
         <p:nvPr/>
       </p:nvGrpSpPr>
@@ -1536,7 +1842,7 @@
       </p:grpSpPr>
       <p:sp>
         <p:nvSpPr>
-          <p:cNvPr id="96" name="Shape 96"/>
+          <p:cNvPr id="108" name="Shape 108"/>
           <p:cNvSpPr>
             <a:spLocks noGrp="1" noRot="1" noChangeAspect="1"/>
           </p:cNvSpPr>
@@ -1577,7 +1883,7 @@
       </p:sp>
       <p:sp>
         <p:nvSpPr>
-          <p:cNvPr id="97" name="Shape 97"/>
+          <p:cNvPr id="109" name="Shape 109"/>
           <p:cNvSpPr txBox="1">
             <a:spLocks noGrp="1"/>
           </p:cNvSpPr>
@@ -1724,6 +2030,107 @@
   <p:cSld>
     <p:spTree>
       <p:nvGrpSpPr>
+        <p:cNvPr id="1" name="Shape 107"/>
+        <p:cNvGrpSpPr/>
+        <p:nvPr/>
+      </p:nvGrpSpPr>
+      <p:grpSpPr>
+        <a:xfrm>
+          <a:off x="0" y="0"/>
+          <a:ext cx="0" cy="0"/>
+          <a:chOff x="0" y="0"/>
+          <a:chExt cx="0" cy="0"/>
+        </a:xfrm>
+      </p:grpSpPr>
+      <p:sp>
+        <p:nvSpPr>
+          <p:cNvPr id="108" name="Shape 108"/>
+          <p:cNvSpPr>
+            <a:spLocks noGrp="1" noRot="1" noChangeAspect="1"/>
+          </p:cNvSpPr>
+          <p:nvPr>
+            <p:ph type="sldImg" idx="2"/>
+          </p:nvPr>
+        </p:nvSpPr>
+        <p:spPr>
+          <a:xfrm>
+            <a:off x="381000" y="685800"/>
+            <a:ext cx="6096000" cy="3429000"/>
+          </a:xfrm>
+          <a:custGeom>
+            <a:avLst/>
+            <a:gdLst/>
+            <a:ahLst/>
+            <a:cxnLst/>
+            <a:rect l="0" t="0" r="0" b="0"/>
+            <a:pathLst>
+              <a:path w="120000" h="120000" extrusionOk="0">
+                <a:moveTo>
+                  <a:pt x="0" y="0"/>
+                </a:moveTo>
+                <a:lnTo>
+                  <a:pt x="120000" y="0"/>
+                </a:lnTo>
+                <a:lnTo>
+                  <a:pt x="120000" y="120000"/>
+                </a:lnTo>
+                <a:lnTo>
+                  <a:pt x="0" y="120000"/>
+                </a:lnTo>
+                <a:close/>
+              </a:path>
+            </a:pathLst>
+          </a:custGeom>
+        </p:spPr>
+      </p:sp>
+      <p:sp>
+        <p:nvSpPr>
+          <p:cNvPr id="109" name="Shape 109"/>
+          <p:cNvSpPr txBox="1">
+            <a:spLocks noGrp="1"/>
+          </p:cNvSpPr>
+          <p:nvPr>
+            <p:ph type="body" idx="1"/>
+          </p:nvPr>
+        </p:nvSpPr>
+        <p:spPr>
+          <a:xfrm>
+            <a:off x="685800" y="4343400"/>
+            <a:ext cx="5486399" cy="4114800"/>
+          </a:xfrm>
+          <a:prstGeom prst="rect">
+            <a:avLst/>
+          </a:prstGeom>
+        </p:spPr>
+        <p:txBody>
+          <a:bodyPr lIns="91425" tIns="91425" rIns="91425" bIns="91425" anchor="t" anchorCtr="0">
+            <a:noAutofit/>
+          </a:bodyPr>
+          <a:lstStyle/>
+          <a:p>
+            <a:pPr lvl="0">
+              <a:spcBef>
+                <a:spcPts val="0"/>
+              </a:spcBef>
+              <a:buNone/>
+            </a:pPr>
+            <a:endParaRPr/>
+          </a:p>
+        </p:txBody>
+      </p:sp>
+    </p:spTree>
+  </p:cSld>
+  <p:clrMapOvr>
+    <a:masterClrMapping/>
+  </p:clrMapOvr>
+</p:notes>
+</file>
+
+<file path=ppt/notesSlides/notesSlide9.xml><?xml version="1.0" encoding="utf-8"?>
+<p:notes xmlns:a="http://schemas.openxmlformats.org/drawingml/2006/main" xmlns:r="http://schemas.openxmlformats.org/officeDocument/2006/relationships" xmlns:p="http://schemas.openxmlformats.org/presentationml/2006/main" showMasterSp="0" showMasterPhAnim="0">
+  <p:cSld>
+    <p:spTree>
+      <p:nvGrpSpPr>
         <p:cNvPr id="1" name="Shape 95"/>
         <p:cNvGrpSpPr/>
         <p:nvPr/>
@@ -1780,107 +2187,6 @@
       <p:sp>
         <p:nvSpPr>
           <p:cNvPr id="97" name="Shape 97"/>
-          <p:cNvSpPr txBox="1">
-            <a:spLocks noGrp="1"/>
-          </p:cNvSpPr>
-          <p:nvPr>
-            <p:ph type="body" idx="1"/>
-          </p:nvPr>
-        </p:nvSpPr>
-        <p:spPr>
-          <a:xfrm>
-            <a:off x="685800" y="4343400"/>
-            <a:ext cx="5486399" cy="4114800"/>
-          </a:xfrm>
-          <a:prstGeom prst="rect">
-            <a:avLst/>
-          </a:prstGeom>
-        </p:spPr>
-        <p:txBody>
-          <a:bodyPr lIns="91425" tIns="91425" rIns="91425" bIns="91425" anchor="t" anchorCtr="0">
-            <a:noAutofit/>
-          </a:bodyPr>
-          <a:lstStyle/>
-          <a:p>
-            <a:pPr lvl="0">
-              <a:spcBef>
-                <a:spcPts val="0"/>
-              </a:spcBef>
-              <a:buNone/>
-            </a:pPr>
-            <a:endParaRPr/>
-          </a:p>
-        </p:txBody>
-      </p:sp>
-    </p:spTree>
-  </p:cSld>
-  <p:clrMapOvr>
-    <a:masterClrMapping/>
-  </p:clrMapOvr>
-</p:notes>
-</file>
-
-<file path=ppt/notesSlides/notesSlide9.xml><?xml version="1.0" encoding="utf-8"?>
-<p:notes xmlns:a="http://schemas.openxmlformats.org/drawingml/2006/main" xmlns:r="http://schemas.openxmlformats.org/officeDocument/2006/relationships" xmlns:p="http://schemas.openxmlformats.org/presentationml/2006/main" showMasterSp="0" showMasterPhAnim="0">
-  <p:cSld>
-    <p:spTree>
-      <p:nvGrpSpPr>
-        <p:cNvPr id="1" name="Shape 107"/>
-        <p:cNvGrpSpPr/>
-        <p:nvPr/>
-      </p:nvGrpSpPr>
-      <p:grpSpPr>
-        <a:xfrm>
-          <a:off x="0" y="0"/>
-          <a:ext cx="0" cy="0"/>
-          <a:chOff x="0" y="0"/>
-          <a:chExt cx="0" cy="0"/>
-        </a:xfrm>
-      </p:grpSpPr>
-      <p:sp>
-        <p:nvSpPr>
-          <p:cNvPr id="108" name="Shape 108"/>
-          <p:cNvSpPr>
-            <a:spLocks noGrp="1" noRot="1" noChangeAspect="1"/>
-          </p:cNvSpPr>
-          <p:nvPr>
-            <p:ph type="sldImg" idx="2"/>
-          </p:nvPr>
-        </p:nvSpPr>
-        <p:spPr>
-          <a:xfrm>
-            <a:off x="381000" y="685800"/>
-            <a:ext cx="6096000" cy="3429000"/>
-          </a:xfrm>
-          <a:custGeom>
-            <a:avLst/>
-            <a:gdLst/>
-            <a:ahLst/>
-            <a:cxnLst/>
-            <a:rect l="0" t="0" r="0" b="0"/>
-            <a:pathLst>
-              <a:path w="120000" h="120000" extrusionOk="0">
-                <a:moveTo>
-                  <a:pt x="0" y="0"/>
-                </a:moveTo>
-                <a:lnTo>
-                  <a:pt x="120000" y="0"/>
-                </a:lnTo>
-                <a:lnTo>
-                  <a:pt x="120000" y="120000"/>
-                </a:lnTo>
-                <a:lnTo>
-                  <a:pt x="0" y="120000"/>
-                </a:lnTo>
-                <a:close/>
-              </a:path>
-            </a:pathLst>
-          </a:custGeom>
-        </p:spPr>
-      </p:sp>
-      <p:sp>
-        <p:nvSpPr>
-          <p:cNvPr id="109" name="Shape 109"/>
           <p:cNvSpPr txBox="1">
             <a:spLocks noGrp="1"/>
           </p:cNvSpPr>
@@ -4646,11 +4952,11 @@
   <p:clrMapOvr>
     <a:masterClrMapping/>
   </p:clrMapOvr>
-  <mc:AlternateContent xmlns:mc="http://schemas.openxmlformats.org/markup-compatibility/2006">
-    <mc:Choice xmlns:p14="http://schemas.microsoft.com/office/powerpoint/2010/main" Requires="p14">
+  <mc:AlternateContent xmlns:mc="http://schemas.openxmlformats.org/markup-compatibility/2006" xmlns:p14="http://schemas.microsoft.com/office/powerpoint/2010/main">
+    <mc:Choice Requires="p14">
       <p:transition p14:dur="0"/>
     </mc:Choice>
-    <mc:Fallback>
+    <mc:Fallback xmlns="">
       <p:transition/>
     </mc:Fallback>
   </mc:AlternateContent>
@@ -4665,6 +4971,1621 @@
 </file>
 
 <file path=ppt/slides/slide10.xml><?xml version="1.0" encoding="utf-8"?>
+<p:sld xmlns:a="http://schemas.openxmlformats.org/drawingml/2006/main" xmlns:r="http://schemas.openxmlformats.org/officeDocument/2006/relationships" xmlns:p="http://schemas.openxmlformats.org/presentationml/2006/main">
+  <p:cSld>
+    <p:spTree>
+      <p:nvGrpSpPr>
+        <p:cNvPr id="1" name="Shape 110"/>
+        <p:cNvGrpSpPr/>
+        <p:nvPr/>
+      </p:nvGrpSpPr>
+      <p:grpSpPr>
+        <a:xfrm>
+          <a:off x="0" y="0"/>
+          <a:ext cx="0" cy="0"/>
+          <a:chOff x="0" y="0"/>
+          <a:chExt cx="0" cy="0"/>
+        </a:xfrm>
+      </p:grpSpPr>
+      <p:sp>
+        <p:nvSpPr>
+          <p:cNvPr id="111" name="Shape 111"/>
+          <p:cNvSpPr txBox="1">
+            <a:spLocks noGrp="1"/>
+          </p:cNvSpPr>
+          <p:nvPr>
+            <p:ph type="title"/>
+          </p:nvPr>
+        </p:nvSpPr>
+        <p:spPr>
+          <a:xfrm>
+            <a:off x="1381250" y="922668"/>
+            <a:ext cx="3878399" cy="435599"/>
+          </a:xfrm>
+          <a:prstGeom prst="rect">
+            <a:avLst/>
+          </a:prstGeom>
+        </p:spPr>
+        <p:txBody>
+          <a:bodyPr lIns="91425" tIns="91425" rIns="91425" bIns="91425" anchor="ctr" anchorCtr="0">
+            <a:noAutofit/>
+          </a:bodyPr>
+          <a:lstStyle/>
+          <a:p>
+            <a:pPr lvl="0">
+              <a:spcBef>
+                <a:spcPts val="0"/>
+              </a:spcBef>
+              <a:buNone/>
+            </a:pPr>
+            <a:r>
+              <a:rPr lang="en" dirty="0" smtClean="0">
+                <a:highlight>
+                  <a:srgbClr val="FFCD00"/>
+                </a:highlight>
+              </a:rPr>
+              <a:t>Topic</a:t>
+            </a:r>
+            <a:endParaRPr lang="en" dirty="0">
+              <a:highlight>
+                <a:srgbClr val="FFCD00"/>
+              </a:highlight>
+            </a:endParaRPr>
+          </a:p>
+        </p:txBody>
+      </p:sp>
+      <p:sp>
+        <p:nvSpPr>
+          <p:cNvPr id="112" name="Shape 112"/>
+          <p:cNvSpPr txBox="1">
+            <a:spLocks noGrp="1"/>
+          </p:cNvSpPr>
+          <p:nvPr>
+            <p:ph type="body" idx="1"/>
+          </p:nvPr>
+        </p:nvSpPr>
+        <p:spPr>
+          <a:xfrm>
+            <a:off x="1381250" y="1616470"/>
+            <a:ext cx="6809700" cy="3112200"/>
+          </a:xfrm>
+          <a:prstGeom prst="rect">
+            <a:avLst/>
+          </a:prstGeom>
+        </p:spPr>
+        <p:txBody>
+          <a:bodyPr lIns="91425" tIns="91425" rIns="91425" bIns="91425" anchor="t" anchorCtr="0">
+            <a:noAutofit/>
+          </a:bodyPr>
+          <a:lstStyle/>
+          <a:p>
+            <a:pPr marL="457200" lvl="0" indent="-228600" rtl="0">
+              <a:spcBef>
+                <a:spcPts val="0"/>
+              </a:spcBef>
+            </a:pPr>
+            <a:r>
+              <a:rPr lang="en" dirty="0" smtClean="0"/>
+              <a:t>Ursprünglicher Ansatz, Überarbeitungsbedarf</a:t>
+            </a:r>
+          </a:p>
+          <a:p>
+            <a:pPr marL="457200" lvl="0" indent="-228600" rtl="0">
+              <a:spcBef>
+                <a:spcPts val="0"/>
+              </a:spcBef>
+            </a:pPr>
+            <a:r>
+              <a:rPr lang="en" dirty="0" smtClean="0"/>
+              <a:t>Erfahrungen</a:t>
+            </a:r>
+          </a:p>
+          <a:p>
+            <a:pPr marL="457200" lvl="0" indent="-228600" rtl="0">
+              <a:spcBef>
+                <a:spcPts val="0"/>
+              </a:spcBef>
+            </a:pPr>
+            <a:endParaRPr lang="en" dirty="0"/>
+          </a:p>
+        </p:txBody>
+      </p:sp>
+      <p:grpSp>
+        <p:nvGrpSpPr>
+          <p:cNvPr id="113" name="Shape 113"/>
+          <p:cNvGrpSpPr/>
+          <p:nvPr/>
+        </p:nvGrpSpPr>
+        <p:grpSpPr>
+          <a:xfrm>
+            <a:off x="916458" y="1019750"/>
+            <a:ext cx="214624" cy="214624"/>
+            <a:chOff x="2594050" y="1631825"/>
+            <a:chExt cx="439625" cy="439625"/>
+          </a:xfrm>
+        </p:grpSpPr>
+        <p:sp>
+          <p:nvSpPr>
+            <p:cNvPr id="114" name="Shape 114"/>
+            <p:cNvSpPr/>
+            <p:nvPr/>
+          </p:nvSpPr>
+          <p:spPr>
+            <a:xfrm>
+              <a:off x="2594050" y="1883300"/>
+              <a:ext cx="188175" cy="188150"/>
+            </a:xfrm>
+            <a:custGeom>
+              <a:avLst/>
+              <a:gdLst/>
+              <a:ahLst/>
+              <a:cxnLst/>
+              <a:rect l="0" t="0" r="0" b="0"/>
+              <a:pathLst>
+                <a:path w="7527" h="7526" fill="none" extrusionOk="0">
+                  <a:moveTo>
+                    <a:pt x="5992" y="0"/>
+                  </a:moveTo>
+                  <a:lnTo>
+                    <a:pt x="537" y="6430"/>
+                  </a:lnTo>
+                  <a:lnTo>
+                    <a:pt x="1" y="7526"/>
+                  </a:lnTo>
+                  <a:lnTo>
+                    <a:pt x="1097" y="6990"/>
+                  </a:lnTo>
+                  <a:lnTo>
+                    <a:pt x="7526" y="1534"/>
+                  </a:lnTo>
+                  <a:lnTo>
+                    <a:pt x="5992" y="0"/>
+                  </a:lnTo>
+                  <a:close/>
+                </a:path>
+              </a:pathLst>
+            </a:custGeom>
+            <a:noFill/>
+            <a:ln w="9525" cap="rnd" cmpd="sng">
+              <a:solidFill>
+                <a:srgbClr val="000000"/>
+              </a:solidFill>
+              <a:prstDash val="solid"/>
+              <a:round/>
+              <a:headEnd type="none" w="med" len="med"/>
+              <a:tailEnd type="none" w="med" len="med"/>
+            </a:ln>
+          </p:spPr>
+          <p:txBody>
+            <a:bodyPr lIns="91425" tIns="91425" rIns="91425" bIns="91425" anchor="ctr" anchorCtr="0">
+              <a:noAutofit/>
+            </a:bodyPr>
+            <a:lstStyle/>
+            <a:p>
+              <a:pPr lvl="0">
+                <a:spcBef>
+                  <a:spcPts val="0"/>
+                </a:spcBef>
+                <a:buNone/>
+              </a:pPr>
+              <a:endParaRPr/>
+            </a:p>
+          </p:txBody>
+        </p:sp>
+        <p:sp>
+          <p:nvSpPr>
+            <p:cNvPr id="115" name="Shape 115"/>
+            <p:cNvSpPr/>
+            <p:nvPr/>
+          </p:nvSpPr>
+          <p:spPr>
+            <a:xfrm>
+              <a:off x="2857700" y="1631825"/>
+              <a:ext cx="175975" cy="176000"/>
+            </a:xfrm>
+            <a:custGeom>
+              <a:avLst/>
+              <a:gdLst/>
+              <a:ahLst/>
+              <a:cxnLst/>
+              <a:rect l="0" t="0" r="0" b="0"/>
+              <a:pathLst>
+                <a:path w="7039" h="7040" fill="none" extrusionOk="0">
+                  <a:moveTo>
+                    <a:pt x="268" y="2704"/>
+                  </a:moveTo>
+                  <a:lnTo>
+                    <a:pt x="4336" y="6771"/>
+                  </a:lnTo>
+                  <a:lnTo>
+                    <a:pt x="4336" y="6771"/>
+                  </a:lnTo>
+                  <a:lnTo>
+                    <a:pt x="4336" y="6771"/>
+                  </a:lnTo>
+                  <a:lnTo>
+                    <a:pt x="4652" y="6917"/>
+                  </a:lnTo>
+                  <a:lnTo>
+                    <a:pt x="4993" y="7015"/>
+                  </a:lnTo>
+                  <a:lnTo>
+                    <a:pt x="5310" y="7039"/>
+                  </a:lnTo>
+                  <a:lnTo>
+                    <a:pt x="5651" y="7039"/>
+                  </a:lnTo>
+                  <a:lnTo>
+                    <a:pt x="5992" y="6966"/>
+                  </a:lnTo>
+                  <a:lnTo>
+                    <a:pt x="6308" y="6844"/>
+                  </a:lnTo>
+                  <a:lnTo>
+                    <a:pt x="6454" y="6747"/>
+                  </a:lnTo>
+                  <a:lnTo>
+                    <a:pt x="6601" y="6674"/>
+                  </a:lnTo>
+                  <a:lnTo>
+                    <a:pt x="6747" y="6552"/>
+                  </a:lnTo>
+                  <a:lnTo>
+                    <a:pt x="6893" y="6430"/>
+                  </a:lnTo>
+                  <a:lnTo>
+                    <a:pt x="6893" y="6430"/>
+                  </a:lnTo>
+                  <a:lnTo>
+                    <a:pt x="6942" y="6357"/>
+                  </a:lnTo>
+                  <a:lnTo>
+                    <a:pt x="7015" y="6260"/>
+                  </a:lnTo>
+                  <a:lnTo>
+                    <a:pt x="7039" y="6138"/>
+                  </a:lnTo>
+                  <a:lnTo>
+                    <a:pt x="7039" y="6041"/>
+                  </a:lnTo>
+                  <a:lnTo>
+                    <a:pt x="7039" y="6041"/>
+                  </a:lnTo>
+                  <a:lnTo>
+                    <a:pt x="7039" y="5943"/>
+                  </a:lnTo>
+                  <a:lnTo>
+                    <a:pt x="7015" y="5846"/>
+                  </a:lnTo>
+                  <a:lnTo>
+                    <a:pt x="6942" y="5748"/>
+                  </a:lnTo>
+                  <a:lnTo>
+                    <a:pt x="6893" y="5651"/>
+                  </a:lnTo>
+                  <a:lnTo>
+                    <a:pt x="1389" y="147"/>
+                  </a:lnTo>
+                  <a:lnTo>
+                    <a:pt x="1389" y="147"/>
+                  </a:lnTo>
+                  <a:lnTo>
+                    <a:pt x="1291" y="98"/>
+                  </a:lnTo>
+                  <a:lnTo>
+                    <a:pt x="1194" y="25"/>
+                  </a:lnTo>
+                  <a:lnTo>
+                    <a:pt x="1096" y="0"/>
+                  </a:lnTo>
+                  <a:lnTo>
+                    <a:pt x="999" y="0"/>
+                  </a:lnTo>
+                  <a:lnTo>
+                    <a:pt x="999" y="0"/>
+                  </a:lnTo>
+                  <a:lnTo>
+                    <a:pt x="902" y="0"/>
+                  </a:lnTo>
+                  <a:lnTo>
+                    <a:pt x="780" y="25"/>
+                  </a:lnTo>
+                  <a:lnTo>
+                    <a:pt x="682" y="98"/>
+                  </a:lnTo>
+                  <a:lnTo>
+                    <a:pt x="609" y="147"/>
+                  </a:lnTo>
+                  <a:lnTo>
+                    <a:pt x="609" y="147"/>
+                  </a:lnTo>
+                  <a:lnTo>
+                    <a:pt x="487" y="293"/>
+                  </a:lnTo>
+                  <a:lnTo>
+                    <a:pt x="366" y="439"/>
+                  </a:lnTo>
+                  <a:lnTo>
+                    <a:pt x="293" y="585"/>
+                  </a:lnTo>
+                  <a:lnTo>
+                    <a:pt x="195" y="731"/>
+                  </a:lnTo>
+                  <a:lnTo>
+                    <a:pt x="73" y="1048"/>
+                  </a:lnTo>
+                  <a:lnTo>
+                    <a:pt x="0" y="1389"/>
+                  </a:lnTo>
+                  <a:lnTo>
+                    <a:pt x="0" y="1730"/>
+                  </a:lnTo>
+                  <a:lnTo>
+                    <a:pt x="25" y="2046"/>
+                  </a:lnTo>
+                  <a:lnTo>
+                    <a:pt x="122" y="2387"/>
+                  </a:lnTo>
+                  <a:lnTo>
+                    <a:pt x="268" y="2704"/>
+                  </a:lnTo>
+                  <a:lnTo>
+                    <a:pt x="268" y="2704"/>
+                  </a:lnTo>
+                  <a:close/>
+                </a:path>
+              </a:pathLst>
+            </a:custGeom>
+            <a:noFill/>
+            <a:ln w="9525" cap="rnd" cmpd="sng">
+              <a:solidFill>
+                <a:srgbClr val="000000"/>
+              </a:solidFill>
+              <a:prstDash val="solid"/>
+              <a:round/>
+              <a:headEnd type="none" w="med" len="med"/>
+              <a:tailEnd type="none" w="med" len="med"/>
+            </a:ln>
+          </p:spPr>
+          <p:txBody>
+            <a:bodyPr lIns="91425" tIns="91425" rIns="91425" bIns="91425" anchor="ctr" anchorCtr="0">
+              <a:noAutofit/>
+            </a:bodyPr>
+            <a:lstStyle/>
+            <a:p>
+              <a:pPr lvl="0">
+                <a:spcBef>
+                  <a:spcPts val="0"/>
+                </a:spcBef>
+                <a:buNone/>
+              </a:pPr>
+              <a:endParaRPr/>
+            </a:p>
+          </p:txBody>
+        </p:sp>
+        <p:sp>
+          <p:nvSpPr>
+            <p:cNvPr id="116" name="Shape 116"/>
+            <p:cNvSpPr/>
+            <p:nvPr/>
+          </p:nvSpPr>
+          <p:spPr>
+            <a:xfrm>
+              <a:off x="2662850" y="1699400"/>
+              <a:ext cx="303250" cy="303250"/>
+            </a:xfrm>
+            <a:custGeom>
+              <a:avLst/>
+              <a:gdLst/>
+              <a:ahLst/>
+              <a:cxnLst/>
+              <a:rect l="0" t="0" r="0" b="0"/>
+              <a:pathLst>
+                <a:path w="12130" h="12130" fill="none" extrusionOk="0">
+                  <a:moveTo>
+                    <a:pt x="8038" y="1"/>
+                  </a:moveTo>
+                  <a:lnTo>
+                    <a:pt x="4872" y="3191"/>
+                  </a:lnTo>
+                  <a:lnTo>
+                    <a:pt x="4872" y="3191"/>
+                  </a:lnTo>
+                  <a:lnTo>
+                    <a:pt x="4628" y="3094"/>
+                  </a:lnTo>
+                  <a:lnTo>
+                    <a:pt x="4385" y="2997"/>
+                  </a:lnTo>
+                  <a:lnTo>
+                    <a:pt x="4092" y="2899"/>
+                  </a:lnTo>
+                  <a:lnTo>
+                    <a:pt x="3800" y="2850"/>
+                  </a:lnTo>
+                  <a:lnTo>
+                    <a:pt x="3484" y="2777"/>
+                  </a:lnTo>
+                  <a:lnTo>
+                    <a:pt x="3167" y="2729"/>
+                  </a:lnTo>
+                  <a:lnTo>
+                    <a:pt x="2850" y="2704"/>
+                  </a:lnTo>
+                  <a:lnTo>
+                    <a:pt x="2534" y="2704"/>
+                  </a:lnTo>
+                  <a:lnTo>
+                    <a:pt x="2534" y="2704"/>
+                  </a:lnTo>
+                  <a:lnTo>
+                    <a:pt x="2241" y="2704"/>
+                  </a:lnTo>
+                  <a:lnTo>
+                    <a:pt x="1949" y="2729"/>
+                  </a:lnTo>
+                  <a:lnTo>
+                    <a:pt x="1633" y="2777"/>
+                  </a:lnTo>
+                  <a:lnTo>
+                    <a:pt x="1316" y="2850"/>
+                  </a:lnTo>
+                  <a:lnTo>
+                    <a:pt x="999" y="2972"/>
+                  </a:lnTo>
+                  <a:lnTo>
+                    <a:pt x="707" y="3094"/>
+                  </a:lnTo>
+                  <a:lnTo>
+                    <a:pt x="415" y="3289"/>
+                  </a:lnTo>
+                  <a:lnTo>
+                    <a:pt x="147" y="3508"/>
+                  </a:lnTo>
+                  <a:lnTo>
+                    <a:pt x="147" y="3508"/>
+                  </a:lnTo>
+                  <a:lnTo>
+                    <a:pt x="74" y="3581"/>
+                  </a:lnTo>
+                  <a:lnTo>
+                    <a:pt x="25" y="3678"/>
+                  </a:lnTo>
+                  <a:lnTo>
+                    <a:pt x="1" y="3776"/>
+                  </a:lnTo>
+                  <a:lnTo>
+                    <a:pt x="1" y="3898"/>
+                  </a:lnTo>
+                  <a:lnTo>
+                    <a:pt x="1" y="3898"/>
+                  </a:lnTo>
+                  <a:lnTo>
+                    <a:pt x="1" y="3995"/>
+                  </a:lnTo>
+                  <a:lnTo>
+                    <a:pt x="25" y="4093"/>
+                  </a:lnTo>
+                  <a:lnTo>
+                    <a:pt x="74" y="4190"/>
+                  </a:lnTo>
+                  <a:lnTo>
+                    <a:pt x="147" y="4287"/>
+                  </a:lnTo>
+                  <a:lnTo>
+                    <a:pt x="7843" y="11984"/>
+                  </a:lnTo>
+                  <a:lnTo>
+                    <a:pt x="7843" y="11984"/>
+                  </a:lnTo>
+                  <a:lnTo>
+                    <a:pt x="7941" y="12057"/>
+                  </a:lnTo>
+                  <a:lnTo>
+                    <a:pt x="8038" y="12105"/>
+                  </a:lnTo>
+                  <a:lnTo>
+                    <a:pt x="8135" y="12130"/>
+                  </a:lnTo>
+                  <a:lnTo>
+                    <a:pt x="8233" y="12130"/>
+                  </a:lnTo>
+                  <a:lnTo>
+                    <a:pt x="8233" y="12130"/>
+                  </a:lnTo>
+                  <a:lnTo>
+                    <a:pt x="8355" y="12130"/>
+                  </a:lnTo>
+                  <a:lnTo>
+                    <a:pt x="8452" y="12105"/>
+                  </a:lnTo>
+                  <a:lnTo>
+                    <a:pt x="8549" y="12057"/>
+                  </a:lnTo>
+                  <a:lnTo>
+                    <a:pt x="8622" y="11984"/>
+                  </a:lnTo>
+                  <a:lnTo>
+                    <a:pt x="8622" y="11984"/>
+                  </a:lnTo>
+                  <a:lnTo>
+                    <a:pt x="8842" y="11716"/>
+                  </a:lnTo>
+                  <a:lnTo>
+                    <a:pt x="9036" y="11423"/>
+                  </a:lnTo>
+                  <a:lnTo>
+                    <a:pt x="9158" y="11131"/>
+                  </a:lnTo>
+                  <a:lnTo>
+                    <a:pt x="9280" y="10814"/>
+                  </a:lnTo>
+                  <a:lnTo>
+                    <a:pt x="9353" y="10498"/>
+                  </a:lnTo>
+                  <a:lnTo>
+                    <a:pt x="9402" y="10181"/>
+                  </a:lnTo>
+                  <a:lnTo>
+                    <a:pt x="9426" y="9889"/>
+                  </a:lnTo>
+                  <a:lnTo>
+                    <a:pt x="9426" y="9597"/>
+                  </a:lnTo>
+                  <a:lnTo>
+                    <a:pt x="9426" y="9597"/>
+                  </a:lnTo>
+                  <a:lnTo>
+                    <a:pt x="9426" y="9280"/>
+                  </a:lnTo>
+                  <a:lnTo>
+                    <a:pt x="9402" y="8964"/>
+                  </a:lnTo>
+                  <a:lnTo>
+                    <a:pt x="9353" y="8647"/>
+                  </a:lnTo>
+                  <a:lnTo>
+                    <a:pt x="9280" y="8330"/>
+                  </a:lnTo>
+                  <a:lnTo>
+                    <a:pt x="9231" y="8038"/>
+                  </a:lnTo>
+                  <a:lnTo>
+                    <a:pt x="9134" y="7746"/>
+                  </a:lnTo>
+                  <a:lnTo>
+                    <a:pt x="9036" y="7502"/>
+                  </a:lnTo>
+                  <a:lnTo>
+                    <a:pt x="8939" y="7259"/>
+                  </a:lnTo>
+                  <a:lnTo>
+                    <a:pt x="12130" y="4093"/>
+                  </a:lnTo>
+                </a:path>
+              </a:pathLst>
+            </a:custGeom>
+            <a:noFill/>
+            <a:ln w="9525" cap="rnd" cmpd="sng">
+              <a:solidFill>
+                <a:srgbClr val="000000"/>
+              </a:solidFill>
+              <a:prstDash val="solid"/>
+              <a:round/>
+              <a:headEnd type="none" w="med" len="med"/>
+              <a:tailEnd type="none" w="med" len="med"/>
+            </a:ln>
+          </p:spPr>
+          <p:txBody>
+            <a:bodyPr lIns="91425" tIns="91425" rIns="91425" bIns="91425" anchor="ctr" anchorCtr="0">
+              <a:noAutofit/>
+            </a:bodyPr>
+            <a:lstStyle/>
+            <a:p>
+              <a:pPr lvl="0">
+                <a:spcBef>
+                  <a:spcPts val="0"/>
+                </a:spcBef>
+                <a:buNone/>
+              </a:pPr>
+              <a:endParaRPr/>
+            </a:p>
+          </p:txBody>
+        </p:sp>
+        <p:sp>
+          <p:nvSpPr>
+            <p:cNvPr id="117" name="Shape 117"/>
+            <p:cNvSpPr/>
+            <p:nvPr/>
+          </p:nvSpPr>
+          <p:spPr>
+            <a:xfrm>
+              <a:off x="2814911" y="1754061"/>
+              <a:ext cx="49950" cy="49950"/>
+            </a:xfrm>
+            <a:custGeom>
+              <a:avLst/>
+              <a:gdLst/>
+              <a:ahLst/>
+              <a:cxnLst/>
+              <a:rect l="0" t="0" r="0" b="0"/>
+              <a:pathLst>
+                <a:path w="1998" h="1998" fill="none" extrusionOk="0">
+                  <a:moveTo>
+                    <a:pt x="1" y="1997"/>
+                  </a:moveTo>
+                  <a:lnTo>
+                    <a:pt x="1998" y="0"/>
+                  </a:lnTo>
+                </a:path>
+              </a:pathLst>
+            </a:custGeom>
+            <a:noFill/>
+            <a:ln w="9525" cap="rnd" cmpd="sng">
+              <a:solidFill>
+                <a:srgbClr val="000000"/>
+              </a:solidFill>
+              <a:prstDash val="solid"/>
+              <a:round/>
+              <a:headEnd type="none" w="med" len="med"/>
+              <a:tailEnd type="none" w="med" len="med"/>
+            </a:ln>
+          </p:spPr>
+          <p:txBody>
+            <a:bodyPr lIns="91425" tIns="91425" rIns="91425" bIns="91425" anchor="ctr" anchorCtr="0">
+              <a:noAutofit/>
+            </a:bodyPr>
+            <a:lstStyle/>
+            <a:p>
+              <a:pPr lvl="0">
+                <a:spcBef>
+                  <a:spcPts val="0"/>
+                </a:spcBef>
+                <a:buNone/>
+              </a:pPr>
+              <a:endParaRPr/>
+            </a:p>
+          </p:txBody>
+        </p:sp>
+      </p:grpSp>
+    </p:spTree>
+    <p:extLst>
+      <p:ext uri="{BB962C8B-B14F-4D97-AF65-F5344CB8AC3E}">
+        <p14:creationId xmlns:p14="http://schemas.microsoft.com/office/powerpoint/2010/main" val="1178456594"/>
+      </p:ext>
+    </p:extLst>
+  </p:cSld>
+  <p:clrMapOvr>
+    <a:masterClrMapping/>
+  </p:clrMapOvr>
+  <mc:AlternateContent xmlns:mc="http://schemas.openxmlformats.org/markup-compatibility/2006" xmlns:p14="http://schemas.microsoft.com/office/powerpoint/2010/main">
+    <mc:Choice Requires="p14">
+      <p:transition p14:dur="0"/>
+    </mc:Choice>
+    <mc:Fallback xmlns="">
+      <p:transition/>
+    </mc:Fallback>
+  </mc:AlternateContent>
+  <p:timing>
+    <p:tnLst>
+      <p:par>
+        <p:cTn id="1" dur="indefinite" restart="never" nodeType="tmRoot"/>
+      </p:par>
+    </p:tnLst>
+  </p:timing>
+</p:sld>
+</file>
+
+<file path=ppt/slides/slide11.xml><?xml version="1.0" encoding="utf-8"?>
+<p:sld xmlns:a="http://schemas.openxmlformats.org/drawingml/2006/main" xmlns:r="http://schemas.openxmlformats.org/officeDocument/2006/relationships" xmlns:p="http://schemas.openxmlformats.org/presentationml/2006/main">
+  <p:cSld>
+    <p:spTree>
+      <p:nvGrpSpPr>
+        <p:cNvPr id="1" name="Shape 98"/>
+        <p:cNvGrpSpPr/>
+        <p:nvPr/>
+      </p:nvGrpSpPr>
+      <p:grpSpPr>
+        <a:xfrm>
+          <a:off x="0" y="0"/>
+          <a:ext cx="0" cy="0"/>
+          <a:chOff x="0" y="0"/>
+          <a:chExt cx="0" cy="0"/>
+        </a:xfrm>
+      </p:grpSpPr>
+      <p:sp>
+        <p:nvSpPr>
+          <p:cNvPr id="99" name="Shape 99"/>
+          <p:cNvSpPr txBox="1">
+            <a:spLocks noGrp="1"/>
+          </p:cNvSpPr>
+          <p:nvPr>
+            <p:ph type="ctrTitle"/>
+          </p:nvPr>
+        </p:nvSpPr>
+        <p:spPr>
+          <a:xfrm>
+            <a:off x="2022225" y="1693523"/>
+            <a:ext cx="3787799" cy="1159799"/>
+          </a:xfrm>
+          <a:prstGeom prst="rect">
+            <a:avLst/>
+          </a:prstGeom>
+        </p:spPr>
+        <p:txBody>
+          <a:bodyPr lIns="91425" tIns="91425" rIns="91425" bIns="91425" anchor="b" anchorCtr="0">
+            <a:noAutofit/>
+          </a:bodyPr>
+          <a:lstStyle/>
+          <a:p>
+            <a:pPr lvl="0" rtl="0">
+              <a:spcBef>
+                <a:spcPts val="0"/>
+              </a:spcBef>
+              <a:buNone/>
+            </a:pPr>
+            <a:r>
+              <a:rPr lang="en" dirty="0" smtClean="0"/>
+              <a:t>Designer</a:t>
+            </a:r>
+            <a:endParaRPr lang="en" dirty="0"/>
+          </a:p>
+        </p:txBody>
+      </p:sp>
+      <p:sp>
+        <p:nvSpPr>
+          <p:cNvPr id="100" name="Shape 100"/>
+          <p:cNvSpPr txBox="1">
+            <a:spLocks noGrp="1"/>
+          </p:cNvSpPr>
+          <p:nvPr>
+            <p:ph type="subTitle" idx="1"/>
+          </p:nvPr>
+        </p:nvSpPr>
+        <p:spPr>
+          <a:xfrm>
+            <a:off x="2022300" y="2815923"/>
+            <a:ext cx="5591400" cy="784799"/>
+          </a:xfrm>
+          <a:prstGeom prst="rect">
+            <a:avLst/>
+          </a:prstGeom>
+        </p:spPr>
+        <p:txBody>
+          <a:bodyPr lIns="91425" tIns="91425" rIns="91425" bIns="91425" anchor="t" anchorCtr="0">
+            <a:noAutofit/>
+          </a:bodyPr>
+          <a:lstStyle/>
+          <a:p>
+            <a:pPr lvl="0"/>
+            <a:r>
+              <a:rPr lang="en" dirty="0" smtClean="0"/>
+              <a:t>Marcel Herd </a:t>
+            </a:r>
+            <a:r>
+              <a:rPr lang="de-DE" dirty="0" smtClean="0"/>
+              <a:t>• Eugen </a:t>
+            </a:r>
+            <a:r>
+              <a:rPr lang="de-DE" dirty="0" err="1" smtClean="0"/>
+              <a:t>Krizki</a:t>
+            </a:r>
+            <a:endParaRPr lang="en" dirty="0"/>
+          </a:p>
+        </p:txBody>
+      </p:sp>
+      <p:sp>
+        <p:nvSpPr>
+          <p:cNvPr id="101" name="Shape 101"/>
+          <p:cNvSpPr txBox="1"/>
+          <p:nvPr/>
+        </p:nvSpPr>
+        <p:spPr>
+          <a:xfrm>
+            <a:off x="1133975" y="2291150"/>
+            <a:ext cx="543899" cy="562199"/>
+          </a:xfrm>
+          <a:prstGeom prst="rect">
+            <a:avLst/>
+          </a:prstGeom>
+          <a:noFill/>
+          <a:ln>
+            <a:noFill/>
+          </a:ln>
+        </p:spPr>
+        <p:txBody>
+          <a:bodyPr lIns="91425" tIns="91425" rIns="91425" bIns="91425" anchor="ctr" anchorCtr="0">
+            <a:noAutofit/>
+          </a:bodyPr>
+          <a:lstStyle/>
+          <a:p>
+            <a:pPr lvl="0" algn="ctr">
+              <a:spcBef>
+                <a:spcPts val="0"/>
+              </a:spcBef>
+              <a:buNone/>
+            </a:pPr>
+            <a:r>
+              <a:rPr lang="en" sz="2400" dirty="0" smtClean="0">
+                <a:solidFill>
+                  <a:schemeClr val="dk1"/>
+                </a:solidFill>
+                <a:latin typeface="Lora"/>
+                <a:ea typeface="Lora"/>
+                <a:cs typeface="Lora"/>
+                <a:sym typeface="Lora"/>
+              </a:rPr>
+              <a:t>3</a:t>
+            </a:r>
+            <a:endParaRPr lang="en" sz="2400" dirty="0">
+              <a:solidFill>
+                <a:schemeClr val="dk1"/>
+              </a:solidFill>
+              <a:latin typeface="Lora"/>
+              <a:ea typeface="Lora"/>
+              <a:cs typeface="Lora"/>
+              <a:sym typeface="Lora"/>
+            </a:endParaRPr>
+          </a:p>
+        </p:txBody>
+      </p:sp>
+    </p:spTree>
+    <p:extLst>
+      <p:ext uri="{BB962C8B-B14F-4D97-AF65-F5344CB8AC3E}">
+        <p14:creationId xmlns:p14="http://schemas.microsoft.com/office/powerpoint/2010/main" val="3669912151"/>
+      </p:ext>
+    </p:extLst>
+  </p:cSld>
+  <p:clrMapOvr>
+    <a:masterClrMapping/>
+  </p:clrMapOvr>
+  <mc:AlternateContent xmlns:mc="http://schemas.openxmlformats.org/markup-compatibility/2006" xmlns:p14="http://schemas.microsoft.com/office/powerpoint/2010/main">
+    <mc:Choice Requires="p14">
+      <p:transition p14:dur="0"/>
+    </mc:Choice>
+    <mc:Fallback xmlns="">
+      <p:transition/>
+    </mc:Fallback>
+  </mc:AlternateContent>
+  <p:timing>
+    <p:tnLst>
+      <p:par>
+        <p:cTn id="1" dur="indefinite" restart="never" nodeType="tmRoot"/>
+      </p:par>
+    </p:tnLst>
+  </p:timing>
+</p:sld>
+</file>
+
+<file path=ppt/slides/slide12.xml><?xml version="1.0" encoding="utf-8"?>
+<p:sld xmlns:a="http://schemas.openxmlformats.org/drawingml/2006/main" xmlns:r="http://schemas.openxmlformats.org/officeDocument/2006/relationships" xmlns:p="http://schemas.openxmlformats.org/presentationml/2006/main">
+  <p:cSld>
+    <p:spTree>
+      <p:nvGrpSpPr>
+        <p:cNvPr id="1" name="Shape 110"/>
+        <p:cNvGrpSpPr/>
+        <p:nvPr/>
+      </p:nvGrpSpPr>
+      <p:grpSpPr>
+        <a:xfrm>
+          <a:off x="0" y="0"/>
+          <a:ext cx="0" cy="0"/>
+          <a:chOff x="0" y="0"/>
+          <a:chExt cx="0" cy="0"/>
+        </a:xfrm>
+      </p:grpSpPr>
+      <p:sp>
+        <p:nvSpPr>
+          <p:cNvPr id="111" name="Shape 111"/>
+          <p:cNvSpPr txBox="1">
+            <a:spLocks noGrp="1"/>
+          </p:cNvSpPr>
+          <p:nvPr>
+            <p:ph type="title"/>
+          </p:nvPr>
+        </p:nvSpPr>
+        <p:spPr>
+          <a:xfrm>
+            <a:off x="1381250" y="922668"/>
+            <a:ext cx="3878399" cy="435599"/>
+          </a:xfrm>
+          <a:prstGeom prst="rect">
+            <a:avLst/>
+          </a:prstGeom>
+        </p:spPr>
+        <p:txBody>
+          <a:bodyPr lIns="91425" tIns="91425" rIns="91425" bIns="91425" anchor="ctr" anchorCtr="0">
+            <a:noAutofit/>
+          </a:bodyPr>
+          <a:lstStyle/>
+          <a:p>
+            <a:pPr lvl="0">
+              <a:spcBef>
+                <a:spcPts val="0"/>
+              </a:spcBef>
+              <a:buNone/>
+            </a:pPr>
+            <a:r>
+              <a:rPr lang="en" dirty="0" smtClean="0">
+                <a:highlight>
+                  <a:srgbClr val="FFCD00"/>
+                </a:highlight>
+              </a:rPr>
+              <a:t>Topic</a:t>
+            </a:r>
+            <a:endParaRPr lang="en" dirty="0">
+              <a:highlight>
+                <a:srgbClr val="FFCD00"/>
+              </a:highlight>
+            </a:endParaRPr>
+          </a:p>
+        </p:txBody>
+      </p:sp>
+      <p:sp>
+        <p:nvSpPr>
+          <p:cNvPr id="112" name="Shape 112"/>
+          <p:cNvSpPr txBox="1">
+            <a:spLocks noGrp="1"/>
+          </p:cNvSpPr>
+          <p:nvPr>
+            <p:ph type="body" idx="1"/>
+          </p:nvPr>
+        </p:nvSpPr>
+        <p:spPr>
+          <a:xfrm>
+            <a:off x="1381250" y="1616470"/>
+            <a:ext cx="6809700" cy="3112200"/>
+          </a:xfrm>
+          <a:prstGeom prst="rect">
+            <a:avLst/>
+          </a:prstGeom>
+        </p:spPr>
+        <p:txBody>
+          <a:bodyPr lIns="91425" tIns="91425" rIns="91425" bIns="91425" anchor="t" anchorCtr="0">
+            <a:noAutofit/>
+          </a:bodyPr>
+          <a:lstStyle/>
+          <a:p>
+            <a:pPr marL="457200" lvl="0" indent="-228600" rtl="0">
+              <a:spcBef>
+                <a:spcPts val="0"/>
+              </a:spcBef>
+            </a:pPr>
+            <a:r>
+              <a:rPr lang="en" dirty="0" smtClean="0"/>
+              <a:t>Kommentare zum Analyseergebnis</a:t>
+            </a:r>
+          </a:p>
+          <a:p>
+            <a:pPr marL="457200" lvl="0" indent="-228600" rtl="0">
+              <a:spcBef>
+                <a:spcPts val="0"/>
+              </a:spcBef>
+            </a:pPr>
+            <a:r>
+              <a:rPr lang="en" dirty="0" smtClean="0"/>
+              <a:t>Darstellung typischer Teile</a:t>
+            </a:r>
+          </a:p>
+          <a:p>
+            <a:pPr marL="457200" lvl="0" indent="-228600" rtl="0">
+              <a:spcBef>
+                <a:spcPts val="0"/>
+              </a:spcBef>
+            </a:pPr>
+            <a:r>
+              <a:rPr lang="en" dirty="0" smtClean="0"/>
+              <a:t>Begründung für Designentscheidungen</a:t>
+            </a:r>
+          </a:p>
+          <a:p>
+            <a:pPr marL="457200" lvl="0" indent="-228600" rtl="0">
+              <a:spcBef>
+                <a:spcPts val="0"/>
+              </a:spcBef>
+            </a:pPr>
+            <a:r>
+              <a:rPr lang="en" dirty="0" smtClean="0"/>
+              <a:t>Erfahrungen</a:t>
+            </a:r>
+          </a:p>
+          <a:p>
+            <a:pPr marL="457200" lvl="0" indent="-228600" rtl="0">
+              <a:spcBef>
+                <a:spcPts val="0"/>
+              </a:spcBef>
+            </a:pPr>
+            <a:endParaRPr lang="en" dirty="0"/>
+          </a:p>
+        </p:txBody>
+      </p:sp>
+      <p:grpSp>
+        <p:nvGrpSpPr>
+          <p:cNvPr id="113" name="Shape 113"/>
+          <p:cNvGrpSpPr/>
+          <p:nvPr/>
+        </p:nvGrpSpPr>
+        <p:grpSpPr>
+          <a:xfrm>
+            <a:off x="916458" y="1019750"/>
+            <a:ext cx="214624" cy="214624"/>
+            <a:chOff x="2594050" y="1631825"/>
+            <a:chExt cx="439625" cy="439625"/>
+          </a:xfrm>
+        </p:grpSpPr>
+        <p:sp>
+          <p:nvSpPr>
+            <p:cNvPr id="114" name="Shape 114"/>
+            <p:cNvSpPr/>
+            <p:nvPr/>
+          </p:nvSpPr>
+          <p:spPr>
+            <a:xfrm>
+              <a:off x="2594050" y="1883300"/>
+              <a:ext cx="188175" cy="188150"/>
+            </a:xfrm>
+            <a:custGeom>
+              <a:avLst/>
+              <a:gdLst/>
+              <a:ahLst/>
+              <a:cxnLst/>
+              <a:rect l="0" t="0" r="0" b="0"/>
+              <a:pathLst>
+                <a:path w="7527" h="7526" fill="none" extrusionOk="0">
+                  <a:moveTo>
+                    <a:pt x="5992" y="0"/>
+                  </a:moveTo>
+                  <a:lnTo>
+                    <a:pt x="537" y="6430"/>
+                  </a:lnTo>
+                  <a:lnTo>
+                    <a:pt x="1" y="7526"/>
+                  </a:lnTo>
+                  <a:lnTo>
+                    <a:pt x="1097" y="6990"/>
+                  </a:lnTo>
+                  <a:lnTo>
+                    <a:pt x="7526" y="1534"/>
+                  </a:lnTo>
+                  <a:lnTo>
+                    <a:pt x="5992" y="0"/>
+                  </a:lnTo>
+                  <a:close/>
+                </a:path>
+              </a:pathLst>
+            </a:custGeom>
+            <a:noFill/>
+            <a:ln w="9525" cap="rnd" cmpd="sng">
+              <a:solidFill>
+                <a:srgbClr val="000000"/>
+              </a:solidFill>
+              <a:prstDash val="solid"/>
+              <a:round/>
+              <a:headEnd type="none" w="med" len="med"/>
+              <a:tailEnd type="none" w="med" len="med"/>
+            </a:ln>
+          </p:spPr>
+          <p:txBody>
+            <a:bodyPr lIns="91425" tIns="91425" rIns="91425" bIns="91425" anchor="ctr" anchorCtr="0">
+              <a:noAutofit/>
+            </a:bodyPr>
+            <a:lstStyle/>
+            <a:p>
+              <a:pPr lvl="0">
+                <a:spcBef>
+                  <a:spcPts val="0"/>
+                </a:spcBef>
+                <a:buNone/>
+              </a:pPr>
+              <a:endParaRPr/>
+            </a:p>
+          </p:txBody>
+        </p:sp>
+        <p:sp>
+          <p:nvSpPr>
+            <p:cNvPr id="115" name="Shape 115"/>
+            <p:cNvSpPr/>
+            <p:nvPr/>
+          </p:nvSpPr>
+          <p:spPr>
+            <a:xfrm>
+              <a:off x="2857700" y="1631825"/>
+              <a:ext cx="175975" cy="176000"/>
+            </a:xfrm>
+            <a:custGeom>
+              <a:avLst/>
+              <a:gdLst/>
+              <a:ahLst/>
+              <a:cxnLst/>
+              <a:rect l="0" t="0" r="0" b="0"/>
+              <a:pathLst>
+                <a:path w="7039" h="7040" fill="none" extrusionOk="0">
+                  <a:moveTo>
+                    <a:pt x="268" y="2704"/>
+                  </a:moveTo>
+                  <a:lnTo>
+                    <a:pt x="4336" y="6771"/>
+                  </a:lnTo>
+                  <a:lnTo>
+                    <a:pt x="4336" y="6771"/>
+                  </a:lnTo>
+                  <a:lnTo>
+                    <a:pt x="4336" y="6771"/>
+                  </a:lnTo>
+                  <a:lnTo>
+                    <a:pt x="4652" y="6917"/>
+                  </a:lnTo>
+                  <a:lnTo>
+                    <a:pt x="4993" y="7015"/>
+                  </a:lnTo>
+                  <a:lnTo>
+                    <a:pt x="5310" y="7039"/>
+                  </a:lnTo>
+                  <a:lnTo>
+                    <a:pt x="5651" y="7039"/>
+                  </a:lnTo>
+                  <a:lnTo>
+                    <a:pt x="5992" y="6966"/>
+                  </a:lnTo>
+                  <a:lnTo>
+                    <a:pt x="6308" y="6844"/>
+                  </a:lnTo>
+                  <a:lnTo>
+                    <a:pt x="6454" y="6747"/>
+                  </a:lnTo>
+                  <a:lnTo>
+                    <a:pt x="6601" y="6674"/>
+                  </a:lnTo>
+                  <a:lnTo>
+                    <a:pt x="6747" y="6552"/>
+                  </a:lnTo>
+                  <a:lnTo>
+                    <a:pt x="6893" y="6430"/>
+                  </a:lnTo>
+                  <a:lnTo>
+                    <a:pt x="6893" y="6430"/>
+                  </a:lnTo>
+                  <a:lnTo>
+                    <a:pt x="6942" y="6357"/>
+                  </a:lnTo>
+                  <a:lnTo>
+                    <a:pt x="7015" y="6260"/>
+                  </a:lnTo>
+                  <a:lnTo>
+                    <a:pt x="7039" y="6138"/>
+                  </a:lnTo>
+                  <a:lnTo>
+                    <a:pt x="7039" y="6041"/>
+                  </a:lnTo>
+                  <a:lnTo>
+                    <a:pt x="7039" y="6041"/>
+                  </a:lnTo>
+                  <a:lnTo>
+                    <a:pt x="7039" y="5943"/>
+                  </a:lnTo>
+                  <a:lnTo>
+                    <a:pt x="7015" y="5846"/>
+                  </a:lnTo>
+                  <a:lnTo>
+                    <a:pt x="6942" y="5748"/>
+                  </a:lnTo>
+                  <a:lnTo>
+                    <a:pt x="6893" y="5651"/>
+                  </a:lnTo>
+                  <a:lnTo>
+                    <a:pt x="1389" y="147"/>
+                  </a:lnTo>
+                  <a:lnTo>
+                    <a:pt x="1389" y="147"/>
+                  </a:lnTo>
+                  <a:lnTo>
+                    <a:pt x="1291" y="98"/>
+                  </a:lnTo>
+                  <a:lnTo>
+                    <a:pt x="1194" y="25"/>
+                  </a:lnTo>
+                  <a:lnTo>
+                    <a:pt x="1096" y="0"/>
+                  </a:lnTo>
+                  <a:lnTo>
+                    <a:pt x="999" y="0"/>
+                  </a:lnTo>
+                  <a:lnTo>
+                    <a:pt x="999" y="0"/>
+                  </a:lnTo>
+                  <a:lnTo>
+                    <a:pt x="902" y="0"/>
+                  </a:lnTo>
+                  <a:lnTo>
+                    <a:pt x="780" y="25"/>
+                  </a:lnTo>
+                  <a:lnTo>
+                    <a:pt x="682" y="98"/>
+                  </a:lnTo>
+                  <a:lnTo>
+                    <a:pt x="609" y="147"/>
+                  </a:lnTo>
+                  <a:lnTo>
+                    <a:pt x="609" y="147"/>
+                  </a:lnTo>
+                  <a:lnTo>
+                    <a:pt x="487" y="293"/>
+                  </a:lnTo>
+                  <a:lnTo>
+                    <a:pt x="366" y="439"/>
+                  </a:lnTo>
+                  <a:lnTo>
+                    <a:pt x="293" y="585"/>
+                  </a:lnTo>
+                  <a:lnTo>
+                    <a:pt x="195" y="731"/>
+                  </a:lnTo>
+                  <a:lnTo>
+                    <a:pt x="73" y="1048"/>
+                  </a:lnTo>
+                  <a:lnTo>
+                    <a:pt x="0" y="1389"/>
+                  </a:lnTo>
+                  <a:lnTo>
+                    <a:pt x="0" y="1730"/>
+                  </a:lnTo>
+                  <a:lnTo>
+                    <a:pt x="25" y="2046"/>
+                  </a:lnTo>
+                  <a:lnTo>
+                    <a:pt x="122" y="2387"/>
+                  </a:lnTo>
+                  <a:lnTo>
+                    <a:pt x="268" y="2704"/>
+                  </a:lnTo>
+                  <a:lnTo>
+                    <a:pt x="268" y="2704"/>
+                  </a:lnTo>
+                  <a:close/>
+                </a:path>
+              </a:pathLst>
+            </a:custGeom>
+            <a:noFill/>
+            <a:ln w="9525" cap="rnd" cmpd="sng">
+              <a:solidFill>
+                <a:srgbClr val="000000"/>
+              </a:solidFill>
+              <a:prstDash val="solid"/>
+              <a:round/>
+              <a:headEnd type="none" w="med" len="med"/>
+              <a:tailEnd type="none" w="med" len="med"/>
+            </a:ln>
+          </p:spPr>
+          <p:txBody>
+            <a:bodyPr lIns="91425" tIns="91425" rIns="91425" bIns="91425" anchor="ctr" anchorCtr="0">
+              <a:noAutofit/>
+            </a:bodyPr>
+            <a:lstStyle/>
+            <a:p>
+              <a:pPr lvl="0">
+                <a:spcBef>
+                  <a:spcPts val="0"/>
+                </a:spcBef>
+                <a:buNone/>
+              </a:pPr>
+              <a:endParaRPr/>
+            </a:p>
+          </p:txBody>
+        </p:sp>
+        <p:sp>
+          <p:nvSpPr>
+            <p:cNvPr id="116" name="Shape 116"/>
+            <p:cNvSpPr/>
+            <p:nvPr/>
+          </p:nvSpPr>
+          <p:spPr>
+            <a:xfrm>
+              <a:off x="2662850" y="1699400"/>
+              <a:ext cx="303250" cy="303250"/>
+            </a:xfrm>
+            <a:custGeom>
+              <a:avLst/>
+              <a:gdLst/>
+              <a:ahLst/>
+              <a:cxnLst/>
+              <a:rect l="0" t="0" r="0" b="0"/>
+              <a:pathLst>
+                <a:path w="12130" h="12130" fill="none" extrusionOk="0">
+                  <a:moveTo>
+                    <a:pt x="8038" y="1"/>
+                  </a:moveTo>
+                  <a:lnTo>
+                    <a:pt x="4872" y="3191"/>
+                  </a:lnTo>
+                  <a:lnTo>
+                    <a:pt x="4872" y="3191"/>
+                  </a:lnTo>
+                  <a:lnTo>
+                    <a:pt x="4628" y="3094"/>
+                  </a:lnTo>
+                  <a:lnTo>
+                    <a:pt x="4385" y="2997"/>
+                  </a:lnTo>
+                  <a:lnTo>
+                    <a:pt x="4092" y="2899"/>
+                  </a:lnTo>
+                  <a:lnTo>
+                    <a:pt x="3800" y="2850"/>
+                  </a:lnTo>
+                  <a:lnTo>
+                    <a:pt x="3484" y="2777"/>
+                  </a:lnTo>
+                  <a:lnTo>
+                    <a:pt x="3167" y="2729"/>
+                  </a:lnTo>
+                  <a:lnTo>
+                    <a:pt x="2850" y="2704"/>
+                  </a:lnTo>
+                  <a:lnTo>
+                    <a:pt x="2534" y="2704"/>
+                  </a:lnTo>
+                  <a:lnTo>
+                    <a:pt x="2534" y="2704"/>
+                  </a:lnTo>
+                  <a:lnTo>
+                    <a:pt x="2241" y="2704"/>
+                  </a:lnTo>
+                  <a:lnTo>
+                    <a:pt x="1949" y="2729"/>
+                  </a:lnTo>
+                  <a:lnTo>
+                    <a:pt x="1633" y="2777"/>
+                  </a:lnTo>
+                  <a:lnTo>
+                    <a:pt x="1316" y="2850"/>
+                  </a:lnTo>
+                  <a:lnTo>
+                    <a:pt x="999" y="2972"/>
+                  </a:lnTo>
+                  <a:lnTo>
+                    <a:pt x="707" y="3094"/>
+                  </a:lnTo>
+                  <a:lnTo>
+                    <a:pt x="415" y="3289"/>
+                  </a:lnTo>
+                  <a:lnTo>
+                    <a:pt x="147" y="3508"/>
+                  </a:lnTo>
+                  <a:lnTo>
+                    <a:pt x="147" y="3508"/>
+                  </a:lnTo>
+                  <a:lnTo>
+                    <a:pt x="74" y="3581"/>
+                  </a:lnTo>
+                  <a:lnTo>
+                    <a:pt x="25" y="3678"/>
+                  </a:lnTo>
+                  <a:lnTo>
+                    <a:pt x="1" y="3776"/>
+                  </a:lnTo>
+                  <a:lnTo>
+                    <a:pt x="1" y="3898"/>
+                  </a:lnTo>
+                  <a:lnTo>
+                    <a:pt x="1" y="3898"/>
+                  </a:lnTo>
+                  <a:lnTo>
+                    <a:pt x="1" y="3995"/>
+                  </a:lnTo>
+                  <a:lnTo>
+                    <a:pt x="25" y="4093"/>
+                  </a:lnTo>
+                  <a:lnTo>
+                    <a:pt x="74" y="4190"/>
+                  </a:lnTo>
+                  <a:lnTo>
+                    <a:pt x="147" y="4287"/>
+                  </a:lnTo>
+                  <a:lnTo>
+                    <a:pt x="7843" y="11984"/>
+                  </a:lnTo>
+                  <a:lnTo>
+                    <a:pt x="7843" y="11984"/>
+                  </a:lnTo>
+                  <a:lnTo>
+                    <a:pt x="7941" y="12057"/>
+                  </a:lnTo>
+                  <a:lnTo>
+                    <a:pt x="8038" y="12105"/>
+                  </a:lnTo>
+                  <a:lnTo>
+                    <a:pt x="8135" y="12130"/>
+                  </a:lnTo>
+                  <a:lnTo>
+                    <a:pt x="8233" y="12130"/>
+                  </a:lnTo>
+                  <a:lnTo>
+                    <a:pt x="8233" y="12130"/>
+                  </a:lnTo>
+                  <a:lnTo>
+                    <a:pt x="8355" y="12130"/>
+                  </a:lnTo>
+                  <a:lnTo>
+                    <a:pt x="8452" y="12105"/>
+                  </a:lnTo>
+                  <a:lnTo>
+                    <a:pt x="8549" y="12057"/>
+                  </a:lnTo>
+                  <a:lnTo>
+                    <a:pt x="8622" y="11984"/>
+                  </a:lnTo>
+                  <a:lnTo>
+                    <a:pt x="8622" y="11984"/>
+                  </a:lnTo>
+                  <a:lnTo>
+                    <a:pt x="8842" y="11716"/>
+                  </a:lnTo>
+                  <a:lnTo>
+                    <a:pt x="9036" y="11423"/>
+                  </a:lnTo>
+                  <a:lnTo>
+                    <a:pt x="9158" y="11131"/>
+                  </a:lnTo>
+                  <a:lnTo>
+                    <a:pt x="9280" y="10814"/>
+                  </a:lnTo>
+                  <a:lnTo>
+                    <a:pt x="9353" y="10498"/>
+                  </a:lnTo>
+                  <a:lnTo>
+                    <a:pt x="9402" y="10181"/>
+                  </a:lnTo>
+                  <a:lnTo>
+                    <a:pt x="9426" y="9889"/>
+                  </a:lnTo>
+                  <a:lnTo>
+                    <a:pt x="9426" y="9597"/>
+                  </a:lnTo>
+                  <a:lnTo>
+                    <a:pt x="9426" y="9597"/>
+                  </a:lnTo>
+                  <a:lnTo>
+                    <a:pt x="9426" y="9280"/>
+                  </a:lnTo>
+                  <a:lnTo>
+                    <a:pt x="9402" y="8964"/>
+                  </a:lnTo>
+                  <a:lnTo>
+                    <a:pt x="9353" y="8647"/>
+                  </a:lnTo>
+                  <a:lnTo>
+                    <a:pt x="9280" y="8330"/>
+                  </a:lnTo>
+                  <a:lnTo>
+                    <a:pt x="9231" y="8038"/>
+                  </a:lnTo>
+                  <a:lnTo>
+                    <a:pt x="9134" y="7746"/>
+                  </a:lnTo>
+                  <a:lnTo>
+                    <a:pt x="9036" y="7502"/>
+                  </a:lnTo>
+                  <a:lnTo>
+                    <a:pt x="8939" y="7259"/>
+                  </a:lnTo>
+                  <a:lnTo>
+                    <a:pt x="12130" y="4093"/>
+                  </a:lnTo>
+                </a:path>
+              </a:pathLst>
+            </a:custGeom>
+            <a:noFill/>
+            <a:ln w="9525" cap="rnd" cmpd="sng">
+              <a:solidFill>
+                <a:srgbClr val="000000"/>
+              </a:solidFill>
+              <a:prstDash val="solid"/>
+              <a:round/>
+              <a:headEnd type="none" w="med" len="med"/>
+              <a:tailEnd type="none" w="med" len="med"/>
+            </a:ln>
+          </p:spPr>
+          <p:txBody>
+            <a:bodyPr lIns="91425" tIns="91425" rIns="91425" bIns="91425" anchor="ctr" anchorCtr="0">
+              <a:noAutofit/>
+            </a:bodyPr>
+            <a:lstStyle/>
+            <a:p>
+              <a:pPr lvl="0">
+                <a:spcBef>
+                  <a:spcPts val="0"/>
+                </a:spcBef>
+                <a:buNone/>
+              </a:pPr>
+              <a:endParaRPr/>
+            </a:p>
+          </p:txBody>
+        </p:sp>
+        <p:sp>
+          <p:nvSpPr>
+            <p:cNvPr id="117" name="Shape 117"/>
+            <p:cNvSpPr/>
+            <p:nvPr/>
+          </p:nvSpPr>
+          <p:spPr>
+            <a:xfrm>
+              <a:off x="2814911" y="1754061"/>
+              <a:ext cx="49950" cy="49950"/>
+            </a:xfrm>
+            <a:custGeom>
+              <a:avLst/>
+              <a:gdLst/>
+              <a:ahLst/>
+              <a:cxnLst/>
+              <a:rect l="0" t="0" r="0" b="0"/>
+              <a:pathLst>
+                <a:path w="1998" h="1998" fill="none" extrusionOk="0">
+                  <a:moveTo>
+                    <a:pt x="1" y="1997"/>
+                  </a:moveTo>
+                  <a:lnTo>
+                    <a:pt x="1998" y="0"/>
+                  </a:lnTo>
+                </a:path>
+              </a:pathLst>
+            </a:custGeom>
+            <a:noFill/>
+            <a:ln w="9525" cap="rnd" cmpd="sng">
+              <a:solidFill>
+                <a:srgbClr val="000000"/>
+              </a:solidFill>
+              <a:prstDash val="solid"/>
+              <a:round/>
+              <a:headEnd type="none" w="med" len="med"/>
+              <a:tailEnd type="none" w="med" len="med"/>
+            </a:ln>
+          </p:spPr>
+          <p:txBody>
+            <a:bodyPr lIns="91425" tIns="91425" rIns="91425" bIns="91425" anchor="ctr" anchorCtr="0">
+              <a:noAutofit/>
+            </a:bodyPr>
+            <a:lstStyle/>
+            <a:p>
+              <a:pPr lvl="0">
+                <a:spcBef>
+                  <a:spcPts val="0"/>
+                </a:spcBef>
+                <a:buNone/>
+              </a:pPr>
+              <a:endParaRPr/>
+            </a:p>
+          </p:txBody>
+        </p:sp>
+      </p:grpSp>
+    </p:spTree>
+    <p:extLst>
+      <p:ext uri="{BB962C8B-B14F-4D97-AF65-F5344CB8AC3E}">
+        <p14:creationId xmlns:p14="http://schemas.microsoft.com/office/powerpoint/2010/main" val="42543531"/>
+      </p:ext>
+    </p:extLst>
+  </p:cSld>
+  <p:clrMapOvr>
+    <a:masterClrMapping/>
+  </p:clrMapOvr>
+  <mc:AlternateContent xmlns:mc="http://schemas.openxmlformats.org/markup-compatibility/2006" xmlns:p14="http://schemas.microsoft.com/office/powerpoint/2010/main">
+    <mc:Choice Requires="p14">
+      <p:transition p14:dur="0"/>
+    </mc:Choice>
+    <mc:Fallback xmlns="">
+      <p:transition/>
+    </mc:Fallback>
+  </mc:AlternateContent>
+  <p:timing>
+    <p:tnLst>
+      <p:par>
+        <p:cTn id="1" dur="indefinite" restart="never" nodeType="tmRoot"/>
+      </p:par>
+    </p:tnLst>
+  </p:timing>
+</p:sld>
+</file>
+
+<file path=ppt/slides/slide13.xml><?xml version="1.0" encoding="utf-8"?>
 <p:sld xmlns:a="http://schemas.openxmlformats.org/drawingml/2006/main" xmlns:r="http://schemas.openxmlformats.org/officeDocument/2006/relationships" xmlns:p="http://schemas.openxmlformats.org/presentationml/2006/main">
   <p:cSld>
     <p:spTree>
@@ -4819,11 +6740,11 @@
   <p:clrMapOvr>
     <a:masterClrMapping/>
   </p:clrMapOvr>
-  <mc:AlternateContent xmlns:mc="http://schemas.openxmlformats.org/markup-compatibility/2006">
-    <mc:Choice xmlns:p14="http://schemas.microsoft.com/office/powerpoint/2010/main" Requires="p14">
+  <mc:AlternateContent xmlns:mc="http://schemas.openxmlformats.org/markup-compatibility/2006" xmlns:p14="http://schemas.microsoft.com/office/powerpoint/2010/main">
+    <mc:Choice Requires="p14">
       <p:transition p14:dur="0"/>
     </mc:Choice>
-    <mc:Fallback>
+    <mc:Fallback xmlns="">
       <p:transition/>
     </mc:Fallback>
   </mc:AlternateContent>
@@ -4837,7 +6758,7 @@
 </p:sld>
 </file>
 
-<file path=ppt/slides/slide11.xml><?xml version="1.0" encoding="utf-8"?>
+<file path=ppt/slides/slide14.xml><?xml version="1.0" encoding="utf-8"?>
 <p:sld xmlns:a="http://schemas.openxmlformats.org/drawingml/2006/main" xmlns:r="http://schemas.openxmlformats.org/officeDocument/2006/relationships" xmlns:p="http://schemas.openxmlformats.org/presentationml/2006/main">
   <p:cSld>
     <p:spTree>
@@ -5536,11 +7457,11 @@
   <p:clrMapOvr>
     <a:masterClrMapping/>
   </p:clrMapOvr>
-  <mc:AlternateContent xmlns:mc="http://schemas.openxmlformats.org/markup-compatibility/2006">
-    <mc:Choice xmlns:p14="http://schemas.microsoft.com/office/powerpoint/2010/main" Requires="p14">
+  <mc:AlternateContent xmlns:mc="http://schemas.openxmlformats.org/markup-compatibility/2006" xmlns:p14="http://schemas.microsoft.com/office/powerpoint/2010/main">
+    <mc:Choice Requires="p14">
       <p:transition p14:dur="0"/>
     </mc:Choice>
-    <mc:Fallback>
+    <mc:Fallback xmlns="">
       <p:transition/>
     </mc:Fallback>
   </mc:AlternateContent>
@@ -5554,7 +7475,7 @@
 </p:sld>
 </file>
 
-<file path=ppt/slides/slide12.xml><?xml version="1.0" encoding="utf-8"?>
+<file path=ppt/slides/slide15.xml><?xml version="1.0" encoding="utf-8"?>
 <p:sld xmlns:a="http://schemas.openxmlformats.org/drawingml/2006/main" xmlns:r="http://schemas.openxmlformats.org/officeDocument/2006/relationships" xmlns:p="http://schemas.openxmlformats.org/presentationml/2006/main">
   <p:cSld>
     <p:spTree>
@@ -5713,11 +7634,11 @@
   <p:clrMapOvr>
     <a:masterClrMapping/>
   </p:clrMapOvr>
-  <mc:AlternateContent xmlns:mc="http://schemas.openxmlformats.org/markup-compatibility/2006">
-    <mc:Choice xmlns:p14="http://schemas.microsoft.com/office/powerpoint/2010/main" Requires="p14">
+  <mc:AlternateContent xmlns:mc="http://schemas.openxmlformats.org/markup-compatibility/2006" xmlns:p14="http://schemas.microsoft.com/office/powerpoint/2010/main">
+    <mc:Choice Requires="p14">
       <p:transition p14:dur="0"/>
     </mc:Choice>
-    <mc:Fallback>
+    <mc:Fallback xmlns="">
       <p:transition/>
     </mc:Fallback>
   </mc:AlternateContent>
@@ -5731,7 +7652,7 @@
 </p:sld>
 </file>
 
-<file path=ppt/slides/slide13.xml><?xml version="1.0" encoding="utf-8"?>
+<file path=ppt/slides/slide16.xml><?xml version="1.0" encoding="utf-8"?>
 <p:sld xmlns:a="http://schemas.openxmlformats.org/drawingml/2006/main" xmlns:r="http://schemas.openxmlformats.org/officeDocument/2006/relationships" xmlns:p="http://schemas.openxmlformats.org/presentationml/2006/main">
   <p:cSld>
     <p:spTree>
@@ -6442,11 +8363,11 @@
   <p:clrMapOvr>
     <a:masterClrMapping/>
   </p:clrMapOvr>
-  <mc:AlternateContent xmlns:mc="http://schemas.openxmlformats.org/markup-compatibility/2006">
-    <mc:Choice xmlns:p14="http://schemas.microsoft.com/office/powerpoint/2010/main" Requires="p14">
+  <mc:AlternateContent xmlns:mc="http://schemas.openxmlformats.org/markup-compatibility/2006" xmlns:p14="http://schemas.microsoft.com/office/powerpoint/2010/main">
+    <mc:Choice Requires="p14">
       <p:transition p14:dur="0"/>
     </mc:Choice>
-    <mc:Fallback>
+    <mc:Fallback xmlns="">
       <p:transition/>
     </mc:Fallback>
   </mc:AlternateContent>
@@ -6460,7 +8381,7 @@
 </p:sld>
 </file>
 
-<file path=ppt/slides/slide14.xml><?xml version="1.0" encoding="utf-8"?>
+<file path=ppt/slides/slide17.xml><?xml version="1.0" encoding="utf-8"?>
 <p:sld xmlns:a="http://schemas.openxmlformats.org/drawingml/2006/main" xmlns:r="http://schemas.openxmlformats.org/officeDocument/2006/relationships" xmlns:p="http://schemas.openxmlformats.org/presentationml/2006/main">
   <p:cSld>
     <p:spTree>
@@ -8039,11 +9960,11 @@
   <p:clrMapOvr>
     <a:masterClrMapping/>
   </p:clrMapOvr>
-  <mc:AlternateContent xmlns:mc="http://schemas.openxmlformats.org/markup-compatibility/2006">
-    <mc:Choice xmlns:p14="http://schemas.microsoft.com/office/powerpoint/2010/main" Requires="p14">
+  <mc:AlternateContent xmlns:mc="http://schemas.openxmlformats.org/markup-compatibility/2006" xmlns:p14="http://schemas.microsoft.com/office/powerpoint/2010/main">
+    <mc:Choice Requires="p14">
       <p:transition p14:dur="0"/>
     </mc:Choice>
-    <mc:Fallback>
+    <mc:Fallback xmlns="">
       <p:transition/>
     </mc:Fallback>
   </mc:AlternateContent>
@@ -8208,11 +10129,11 @@
   <p:clrMapOvr>
     <a:masterClrMapping/>
   </p:clrMapOvr>
-  <mc:AlternateContent xmlns:mc="http://schemas.openxmlformats.org/markup-compatibility/2006">
-    <mc:Choice xmlns:p14="http://schemas.microsoft.com/office/powerpoint/2010/main" Requires="p14">
+  <mc:AlternateContent xmlns:mc="http://schemas.openxmlformats.org/markup-compatibility/2006" xmlns:p14="http://schemas.microsoft.com/office/powerpoint/2010/main">
+    <mc:Choice Requires="p14">
       <p:transition p14:dur="0"/>
     </mc:Choice>
-    <mc:Fallback>
+    <mc:Fallback xmlns="">
       <p:transition/>
     </mc:Fallback>
   </mc:AlternateContent>
@@ -8936,11 +10857,11 @@
   <p:clrMapOvr>
     <a:masterClrMapping/>
   </p:clrMapOvr>
-  <mc:AlternateContent xmlns:mc="http://schemas.openxmlformats.org/markup-compatibility/2006">
-    <mc:Choice xmlns:p14="http://schemas.microsoft.com/office/powerpoint/2010/main" Requires="p14">
+  <mc:AlternateContent xmlns:mc="http://schemas.openxmlformats.org/markup-compatibility/2006" xmlns:p14="http://schemas.microsoft.com/office/powerpoint/2010/main">
+    <mc:Choice Requires="p14">
       <p:transition p14:dur="0"/>
     </mc:Choice>
-    <mc:Fallback>
+    <mc:Fallback xmlns="">
       <p:transition/>
     </mc:Fallback>
   </mc:AlternateContent>
@@ -9050,37 +10971,18 @@
             </a:pPr>
             <a:r>
               <a:rPr lang="en" dirty="0" smtClean="0"/>
-              <a:t>Größe der Module</a:t>
+              <a:t>Lines of Code	 </a:t>
             </a:r>
-          </a:p>
-          <a:p>
-            <a:pPr marL="457200" lvl="0" indent="-228600" rtl="0">
-              <a:spcBef>
-                <a:spcPts val="0"/>
-              </a:spcBef>
-            </a:pPr>
+            <a:r>
+              <a:rPr lang="en" dirty="0" smtClean="0">
+                <a:sym typeface="Wingdings" pitchFamily="2" charset="2"/>
+              </a:rPr>
+              <a:t>   </a:t>
+            </a:r>
             <a:r>
               <a:rPr lang="en" dirty="0" smtClean="0"/>
-              <a:t>Lines of code</a:t>
+              <a:t>1239</a:t>
             </a:r>
-          </a:p>
-          <a:p>
-            <a:pPr marL="457200" lvl="0" indent="-228600" rtl="0">
-              <a:spcBef>
-                <a:spcPts val="0"/>
-              </a:spcBef>
-            </a:pPr>
-            <a:r>
-              <a:rPr lang="en" dirty="0" smtClean="0"/>
-              <a:t>Aufwand in Personentagen?</a:t>
-            </a:r>
-          </a:p>
-          <a:p>
-            <a:pPr marL="457200" lvl="0" indent="-228600" rtl="0">
-              <a:spcBef>
-                <a:spcPts val="0"/>
-              </a:spcBef>
-            </a:pPr>
             <a:endParaRPr lang="en" dirty="0"/>
           </a:p>
         </p:txBody>
@@ -9646,18 +11548,18 @@
     </p:spTree>
     <p:extLst>
       <p:ext uri="{BB962C8B-B14F-4D97-AF65-F5344CB8AC3E}">
-        <p14:creationId xmlns:p14="http://schemas.microsoft.com/office/powerpoint/2010/main" val="898315128"/>
+        <p14:creationId xmlns:p14="http://schemas.microsoft.com/office/powerpoint/2010/main" val="833175814"/>
       </p:ext>
     </p:extLst>
   </p:cSld>
   <p:clrMapOvr>
     <a:masterClrMapping/>
   </p:clrMapOvr>
-  <mc:AlternateContent xmlns:mc="http://schemas.openxmlformats.org/markup-compatibility/2006">
-    <mc:Choice xmlns:p14="http://schemas.microsoft.com/office/powerpoint/2010/main" Requires="p14">
+  <mc:AlternateContent xmlns:mc="http://schemas.openxmlformats.org/markup-compatibility/2006" xmlns:p14="http://schemas.microsoft.com/office/powerpoint/2010/main">
+    <mc:Choice Requires="p14">
       <p:transition p14:dur="0"/>
     </mc:Choice>
-    <mc:Fallback>
+    <mc:Fallback xmlns="">
       <p:transition/>
     </mc:Fallback>
   </mc:AlternateContent>
@@ -9676,7 +11578,7 @@
   <p:cSld>
     <p:spTree>
       <p:nvGrpSpPr>
-        <p:cNvPr id="1" name="Shape 98"/>
+        <p:cNvPr id="1" name="Shape 110"/>
         <p:cNvGrpSpPr/>
         <p:nvPr/>
       </p:nvGrpSpPr>
@@ -9690,57 +11592,65 @@
       </p:grpSpPr>
       <p:sp>
         <p:nvSpPr>
-          <p:cNvPr id="99" name="Shape 99"/>
+          <p:cNvPr id="111" name="Shape 111"/>
           <p:cNvSpPr txBox="1">
             <a:spLocks noGrp="1"/>
           </p:cNvSpPr>
           <p:nvPr>
-            <p:ph type="ctrTitle"/>
+            <p:ph type="title"/>
           </p:nvPr>
         </p:nvSpPr>
         <p:spPr>
           <a:xfrm>
-            <a:off x="2022225" y="1693523"/>
-            <a:ext cx="3787799" cy="1159799"/>
+            <a:off x="1381250" y="922668"/>
+            <a:ext cx="3878399" cy="435599"/>
           </a:xfrm>
           <a:prstGeom prst="rect">
             <a:avLst/>
           </a:prstGeom>
         </p:spPr>
         <p:txBody>
-          <a:bodyPr lIns="91425" tIns="91425" rIns="91425" bIns="91425" anchor="b" anchorCtr="0">
+          <a:bodyPr lIns="91425" tIns="91425" rIns="91425" bIns="91425" anchor="ctr" anchorCtr="0">
             <a:noAutofit/>
           </a:bodyPr>
           <a:lstStyle/>
           <a:p>
-            <a:pPr lvl="0" rtl="0">
+            <a:pPr lvl="0">
               <a:spcBef>
                 <a:spcPts val="0"/>
               </a:spcBef>
               <a:buNone/>
             </a:pPr>
             <a:r>
-              <a:rPr lang="en" dirty="0" smtClean="0"/>
-              <a:t>Analysten</a:t>
+              <a:rPr lang="en" dirty="0" smtClean="0">
+                <a:highlight>
+                  <a:srgbClr val="FFCD00"/>
+                </a:highlight>
+              </a:rPr>
+              <a:t>Projektaufwand</a:t>
             </a:r>
-            <a:endParaRPr lang="en" dirty="0"/>
+            <a:endParaRPr lang="en" dirty="0">
+              <a:highlight>
+                <a:srgbClr val="FFCD00"/>
+              </a:highlight>
+            </a:endParaRPr>
           </a:p>
         </p:txBody>
       </p:sp>
       <p:sp>
         <p:nvSpPr>
-          <p:cNvPr id="100" name="Shape 100"/>
+          <p:cNvPr id="112" name="Shape 112"/>
           <p:cNvSpPr txBox="1">
             <a:spLocks noGrp="1"/>
           </p:cNvSpPr>
           <p:nvPr>
-            <p:ph type="subTitle" idx="1"/>
+            <p:ph type="body" idx="1"/>
           </p:nvPr>
         </p:nvSpPr>
         <p:spPr>
           <a:xfrm>
-            <a:off x="2022300" y="2815923"/>
-            <a:ext cx="5591400" cy="784799"/>
+            <a:off x="1381250" y="1616470"/>
+            <a:ext cx="6809700" cy="3112200"/>
           </a:xfrm>
           <a:prstGeom prst="rect">
             <a:avLst/>
@@ -9752,90 +11662,666 @@
           </a:bodyPr>
           <a:lstStyle/>
           <a:p>
-            <a:pPr lvl="0" rtl="0">
+            <a:pPr marL="457200" lvl="0" indent="-228600">
+              <a:spcBef>
+                <a:spcPts val="0"/>
+              </a:spcBef>
+            </a:pPr>
+            <a:r>
+              <a:rPr lang="en" dirty="0" smtClean="0"/>
+              <a:t>Lines of Code	</a:t>
+            </a:r>
+            <a:r>
+              <a:rPr lang="en" dirty="0">
+                <a:sym typeface="Wingdings" pitchFamily="2" charset="2"/>
+              </a:rPr>
+              <a:t> </a:t>
+            </a:r>
+            <a:r>
+              <a:rPr lang="en" dirty="0" smtClean="0">
+                <a:sym typeface="Wingdings" pitchFamily="2" charset="2"/>
+              </a:rPr>
+              <a:t>  </a:t>
+            </a:r>
+            <a:r>
+              <a:rPr lang="en" dirty="0" smtClean="0"/>
+              <a:t> 1239</a:t>
+            </a:r>
+            <a:endParaRPr lang="en" dirty="0"/>
+          </a:p>
+          <a:p>
+            <a:pPr marL="228600" lvl="0">
               <a:spcBef>
                 <a:spcPts val="0"/>
               </a:spcBef>
               <a:buNone/>
             </a:pPr>
             <a:r>
+              <a:rPr lang="en" dirty="0" smtClean="0">
+                <a:sym typeface="Wingdings" pitchFamily="2" charset="2"/>
+              </a:rPr>
+              <a:t> </a:t>
+            </a:r>
+            <a:r>
               <a:rPr lang="en" dirty="0" smtClean="0"/>
-              <a:t>Richard Vladimirskij</a:t>
+              <a:t>Persistence     	     </a:t>
+            </a:r>
+            <a:r>
+              <a:rPr lang="en" dirty="0" smtClean="0">
+                <a:sym typeface="Wingdings" pitchFamily="2" charset="2"/>
+              </a:rPr>
+              <a:t>716</a:t>
+            </a:r>
+            <a:endParaRPr lang="en" dirty="0"/>
+          </a:p>
+          <a:p>
+            <a:pPr marL="228600" lvl="0">
+              <a:spcBef>
+                <a:spcPts val="0"/>
+              </a:spcBef>
+              <a:buNone/>
+            </a:pPr>
+            <a:r>
+              <a:rPr lang="en" dirty="0" smtClean="0">
+                <a:sym typeface="Wingdings" pitchFamily="2" charset="2"/>
+              </a:rPr>
+              <a:t> </a:t>
+            </a:r>
+            <a:r>
+              <a:rPr lang="en" dirty="0" smtClean="0"/>
+              <a:t>Game		     283</a:t>
+            </a:r>
+          </a:p>
+          <a:p>
+            <a:pPr marL="228600" lvl="0">
+              <a:spcBef>
+                <a:spcPts val="0"/>
+              </a:spcBef>
+              <a:buNone/>
+            </a:pPr>
+            <a:r>
+              <a:rPr lang="en" dirty="0" smtClean="0">
+                <a:sym typeface="Wingdings" pitchFamily="2" charset="2"/>
+              </a:rPr>
+              <a:t> Gui		     240</a:t>
             </a:r>
             <a:endParaRPr lang="en" dirty="0"/>
           </a:p>
         </p:txBody>
       </p:sp>
-      <p:sp>
-        <p:nvSpPr>
-          <p:cNvPr id="101" name="Shape 101"/>
-          <p:cNvSpPr txBox="1"/>
+      <p:grpSp>
+        <p:nvGrpSpPr>
+          <p:cNvPr id="113" name="Shape 113"/>
+          <p:cNvGrpSpPr/>
           <p:nvPr/>
-        </p:nvSpPr>
-        <p:spPr>
+        </p:nvGrpSpPr>
+        <p:grpSpPr>
           <a:xfrm>
-            <a:off x="1133975" y="2291150"/>
-            <a:ext cx="543899" cy="562199"/>
+            <a:off x="916458" y="1019750"/>
+            <a:ext cx="214624" cy="214624"/>
+            <a:chOff x="2594050" y="1631825"/>
+            <a:chExt cx="439625" cy="439625"/>
           </a:xfrm>
-          <a:prstGeom prst="rect">
-            <a:avLst/>
-          </a:prstGeom>
-          <a:noFill/>
-          <a:ln>
+        </p:grpSpPr>
+        <p:sp>
+          <p:nvSpPr>
+            <p:cNvPr id="114" name="Shape 114"/>
+            <p:cNvSpPr/>
+            <p:nvPr/>
+          </p:nvSpPr>
+          <p:spPr>
+            <a:xfrm>
+              <a:off x="2594050" y="1883300"/>
+              <a:ext cx="188175" cy="188150"/>
+            </a:xfrm>
+            <a:custGeom>
+              <a:avLst/>
+              <a:gdLst/>
+              <a:ahLst/>
+              <a:cxnLst/>
+              <a:rect l="0" t="0" r="0" b="0"/>
+              <a:pathLst>
+                <a:path w="7527" h="7526" fill="none" extrusionOk="0">
+                  <a:moveTo>
+                    <a:pt x="5992" y="0"/>
+                  </a:moveTo>
+                  <a:lnTo>
+                    <a:pt x="537" y="6430"/>
+                  </a:lnTo>
+                  <a:lnTo>
+                    <a:pt x="1" y="7526"/>
+                  </a:lnTo>
+                  <a:lnTo>
+                    <a:pt x="1097" y="6990"/>
+                  </a:lnTo>
+                  <a:lnTo>
+                    <a:pt x="7526" y="1534"/>
+                  </a:lnTo>
+                  <a:lnTo>
+                    <a:pt x="5992" y="0"/>
+                  </a:lnTo>
+                  <a:close/>
+                </a:path>
+              </a:pathLst>
+            </a:custGeom>
             <a:noFill/>
-          </a:ln>
-        </p:spPr>
-        <p:txBody>
-          <a:bodyPr lIns="91425" tIns="91425" rIns="91425" bIns="91425" anchor="ctr" anchorCtr="0">
-            <a:noAutofit/>
-          </a:bodyPr>
-          <a:lstStyle/>
-          <a:p>
-            <a:pPr lvl="0" algn="ctr">
-              <a:spcBef>
-                <a:spcPts val="0"/>
-              </a:spcBef>
-              <a:buNone/>
-            </a:pPr>
-            <a:r>
-              <a:rPr lang="en" sz="2400" dirty="0" smtClean="0">
-                <a:solidFill>
-                  <a:schemeClr val="dk1"/>
-                </a:solidFill>
-                <a:latin typeface="Lora"/>
-                <a:ea typeface="Lora"/>
-                <a:cs typeface="Lora"/>
-                <a:sym typeface="Lora"/>
-              </a:rPr>
-              <a:t>2</a:t>
-            </a:r>
-            <a:endParaRPr lang="en" sz="2400" dirty="0">
+            <a:ln w="9525" cap="rnd" cmpd="sng">
               <a:solidFill>
-                <a:schemeClr val="dk1"/>
+                <a:srgbClr val="000000"/>
               </a:solidFill>
-              <a:latin typeface="Lora"/>
-              <a:ea typeface="Lora"/>
-              <a:cs typeface="Lora"/>
-              <a:sym typeface="Lora"/>
-            </a:endParaRPr>
-          </a:p>
-        </p:txBody>
-      </p:sp>
+              <a:prstDash val="solid"/>
+              <a:round/>
+              <a:headEnd type="none" w="med" len="med"/>
+              <a:tailEnd type="none" w="med" len="med"/>
+            </a:ln>
+          </p:spPr>
+          <p:txBody>
+            <a:bodyPr lIns="91425" tIns="91425" rIns="91425" bIns="91425" anchor="ctr" anchorCtr="0">
+              <a:noAutofit/>
+            </a:bodyPr>
+            <a:lstStyle/>
+            <a:p>
+              <a:pPr lvl="0">
+                <a:spcBef>
+                  <a:spcPts val="0"/>
+                </a:spcBef>
+                <a:buNone/>
+              </a:pPr>
+              <a:endParaRPr/>
+            </a:p>
+          </p:txBody>
+        </p:sp>
+        <p:sp>
+          <p:nvSpPr>
+            <p:cNvPr id="115" name="Shape 115"/>
+            <p:cNvSpPr/>
+            <p:nvPr/>
+          </p:nvSpPr>
+          <p:spPr>
+            <a:xfrm>
+              <a:off x="2857700" y="1631825"/>
+              <a:ext cx="175975" cy="176000"/>
+            </a:xfrm>
+            <a:custGeom>
+              <a:avLst/>
+              <a:gdLst/>
+              <a:ahLst/>
+              <a:cxnLst/>
+              <a:rect l="0" t="0" r="0" b="0"/>
+              <a:pathLst>
+                <a:path w="7039" h="7040" fill="none" extrusionOk="0">
+                  <a:moveTo>
+                    <a:pt x="268" y="2704"/>
+                  </a:moveTo>
+                  <a:lnTo>
+                    <a:pt x="4336" y="6771"/>
+                  </a:lnTo>
+                  <a:lnTo>
+                    <a:pt x="4336" y="6771"/>
+                  </a:lnTo>
+                  <a:lnTo>
+                    <a:pt x="4336" y="6771"/>
+                  </a:lnTo>
+                  <a:lnTo>
+                    <a:pt x="4652" y="6917"/>
+                  </a:lnTo>
+                  <a:lnTo>
+                    <a:pt x="4993" y="7015"/>
+                  </a:lnTo>
+                  <a:lnTo>
+                    <a:pt x="5310" y="7039"/>
+                  </a:lnTo>
+                  <a:lnTo>
+                    <a:pt x="5651" y="7039"/>
+                  </a:lnTo>
+                  <a:lnTo>
+                    <a:pt x="5992" y="6966"/>
+                  </a:lnTo>
+                  <a:lnTo>
+                    <a:pt x="6308" y="6844"/>
+                  </a:lnTo>
+                  <a:lnTo>
+                    <a:pt x="6454" y="6747"/>
+                  </a:lnTo>
+                  <a:lnTo>
+                    <a:pt x="6601" y="6674"/>
+                  </a:lnTo>
+                  <a:lnTo>
+                    <a:pt x="6747" y="6552"/>
+                  </a:lnTo>
+                  <a:lnTo>
+                    <a:pt x="6893" y="6430"/>
+                  </a:lnTo>
+                  <a:lnTo>
+                    <a:pt x="6893" y="6430"/>
+                  </a:lnTo>
+                  <a:lnTo>
+                    <a:pt x="6942" y="6357"/>
+                  </a:lnTo>
+                  <a:lnTo>
+                    <a:pt x="7015" y="6260"/>
+                  </a:lnTo>
+                  <a:lnTo>
+                    <a:pt x="7039" y="6138"/>
+                  </a:lnTo>
+                  <a:lnTo>
+                    <a:pt x="7039" y="6041"/>
+                  </a:lnTo>
+                  <a:lnTo>
+                    <a:pt x="7039" y="6041"/>
+                  </a:lnTo>
+                  <a:lnTo>
+                    <a:pt x="7039" y="5943"/>
+                  </a:lnTo>
+                  <a:lnTo>
+                    <a:pt x="7015" y="5846"/>
+                  </a:lnTo>
+                  <a:lnTo>
+                    <a:pt x="6942" y="5748"/>
+                  </a:lnTo>
+                  <a:lnTo>
+                    <a:pt x="6893" y="5651"/>
+                  </a:lnTo>
+                  <a:lnTo>
+                    <a:pt x="1389" y="147"/>
+                  </a:lnTo>
+                  <a:lnTo>
+                    <a:pt x="1389" y="147"/>
+                  </a:lnTo>
+                  <a:lnTo>
+                    <a:pt x="1291" y="98"/>
+                  </a:lnTo>
+                  <a:lnTo>
+                    <a:pt x="1194" y="25"/>
+                  </a:lnTo>
+                  <a:lnTo>
+                    <a:pt x="1096" y="0"/>
+                  </a:lnTo>
+                  <a:lnTo>
+                    <a:pt x="999" y="0"/>
+                  </a:lnTo>
+                  <a:lnTo>
+                    <a:pt x="999" y="0"/>
+                  </a:lnTo>
+                  <a:lnTo>
+                    <a:pt x="902" y="0"/>
+                  </a:lnTo>
+                  <a:lnTo>
+                    <a:pt x="780" y="25"/>
+                  </a:lnTo>
+                  <a:lnTo>
+                    <a:pt x="682" y="98"/>
+                  </a:lnTo>
+                  <a:lnTo>
+                    <a:pt x="609" y="147"/>
+                  </a:lnTo>
+                  <a:lnTo>
+                    <a:pt x="609" y="147"/>
+                  </a:lnTo>
+                  <a:lnTo>
+                    <a:pt x="487" y="293"/>
+                  </a:lnTo>
+                  <a:lnTo>
+                    <a:pt x="366" y="439"/>
+                  </a:lnTo>
+                  <a:lnTo>
+                    <a:pt x="293" y="585"/>
+                  </a:lnTo>
+                  <a:lnTo>
+                    <a:pt x="195" y="731"/>
+                  </a:lnTo>
+                  <a:lnTo>
+                    <a:pt x="73" y="1048"/>
+                  </a:lnTo>
+                  <a:lnTo>
+                    <a:pt x="0" y="1389"/>
+                  </a:lnTo>
+                  <a:lnTo>
+                    <a:pt x="0" y="1730"/>
+                  </a:lnTo>
+                  <a:lnTo>
+                    <a:pt x="25" y="2046"/>
+                  </a:lnTo>
+                  <a:lnTo>
+                    <a:pt x="122" y="2387"/>
+                  </a:lnTo>
+                  <a:lnTo>
+                    <a:pt x="268" y="2704"/>
+                  </a:lnTo>
+                  <a:lnTo>
+                    <a:pt x="268" y="2704"/>
+                  </a:lnTo>
+                  <a:close/>
+                </a:path>
+              </a:pathLst>
+            </a:custGeom>
+            <a:noFill/>
+            <a:ln w="9525" cap="rnd" cmpd="sng">
+              <a:solidFill>
+                <a:srgbClr val="000000"/>
+              </a:solidFill>
+              <a:prstDash val="solid"/>
+              <a:round/>
+              <a:headEnd type="none" w="med" len="med"/>
+              <a:tailEnd type="none" w="med" len="med"/>
+            </a:ln>
+          </p:spPr>
+          <p:txBody>
+            <a:bodyPr lIns="91425" tIns="91425" rIns="91425" bIns="91425" anchor="ctr" anchorCtr="0">
+              <a:noAutofit/>
+            </a:bodyPr>
+            <a:lstStyle/>
+            <a:p>
+              <a:pPr lvl="0">
+                <a:spcBef>
+                  <a:spcPts val="0"/>
+                </a:spcBef>
+                <a:buNone/>
+              </a:pPr>
+              <a:endParaRPr/>
+            </a:p>
+          </p:txBody>
+        </p:sp>
+        <p:sp>
+          <p:nvSpPr>
+            <p:cNvPr id="116" name="Shape 116"/>
+            <p:cNvSpPr/>
+            <p:nvPr/>
+          </p:nvSpPr>
+          <p:spPr>
+            <a:xfrm>
+              <a:off x="2662850" y="1699400"/>
+              <a:ext cx="303250" cy="303250"/>
+            </a:xfrm>
+            <a:custGeom>
+              <a:avLst/>
+              <a:gdLst/>
+              <a:ahLst/>
+              <a:cxnLst/>
+              <a:rect l="0" t="0" r="0" b="0"/>
+              <a:pathLst>
+                <a:path w="12130" h="12130" fill="none" extrusionOk="0">
+                  <a:moveTo>
+                    <a:pt x="8038" y="1"/>
+                  </a:moveTo>
+                  <a:lnTo>
+                    <a:pt x="4872" y="3191"/>
+                  </a:lnTo>
+                  <a:lnTo>
+                    <a:pt x="4872" y="3191"/>
+                  </a:lnTo>
+                  <a:lnTo>
+                    <a:pt x="4628" y="3094"/>
+                  </a:lnTo>
+                  <a:lnTo>
+                    <a:pt x="4385" y="2997"/>
+                  </a:lnTo>
+                  <a:lnTo>
+                    <a:pt x="4092" y="2899"/>
+                  </a:lnTo>
+                  <a:lnTo>
+                    <a:pt x="3800" y="2850"/>
+                  </a:lnTo>
+                  <a:lnTo>
+                    <a:pt x="3484" y="2777"/>
+                  </a:lnTo>
+                  <a:lnTo>
+                    <a:pt x="3167" y="2729"/>
+                  </a:lnTo>
+                  <a:lnTo>
+                    <a:pt x="2850" y="2704"/>
+                  </a:lnTo>
+                  <a:lnTo>
+                    <a:pt x="2534" y="2704"/>
+                  </a:lnTo>
+                  <a:lnTo>
+                    <a:pt x="2534" y="2704"/>
+                  </a:lnTo>
+                  <a:lnTo>
+                    <a:pt x="2241" y="2704"/>
+                  </a:lnTo>
+                  <a:lnTo>
+                    <a:pt x="1949" y="2729"/>
+                  </a:lnTo>
+                  <a:lnTo>
+                    <a:pt x="1633" y="2777"/>
+                  </a:lnTo>
+                  <a:lnTo>
+                    <a:pt x="1316" y="2850"/>
+                  </a:lnTo>
+                  <a:lnTo>
+                    <a:pt x="999" y="2972"/>
+                  </a:lnTo>
+                  <a:lnTo>
+                    <a:pt x="707" y="3094"/>
+                  </a:lnTo>
+                  <a:lnTo>
+                    <a:pt x="415" y="3289"/>
+                  </a:lnTo>
+                  <a:lnTo>
+                    <a:pt x="147" y="3508"/>
+                  </a:lnTo>
+                  <a:lnTo>
+                    <a:pt x="147" y="3508"/>
+                  </a:lnTo>
+                  <a:lnTo>
+                    <a:pt x="74" y="3581"/>
+                  </a:lnTo>
+                  <a:lnTo>
+                    <a:pt x="25" y="3678"/>
+                  </a:lnTo>
+                  <a:lnTo>
+                    <a:pt x="1" y="3776"/>
+                  </a:lnTo>
+                  <a:lnTo>
+                    <a:pt x="1" y="3898"/>
+                  </a:lnTo>
+                  <a:lnTo>
+                    <a:pt x="1" y="3898"/>
+                  </a:lnTo>
+                  <a:lnTo>
+                    <a:pt x="1" y="3995"/>
+                  </a:lnTo>
+                  <a:lnTo>
+                    <a:pt x="25" y="4093"/>
+                  </a:lnTo>
+                  <a:lnTo>
+                    <a:pt x="74" y="4190"/>
+                  </a:lnTo>
+                  <a:lnTo>
+                    <a:pt x="147" y="4287"/>
+                  </a:lnTo>
+                  <a:lnTo>
+                    <a:pt x="7843" y="11984"/>
+                  </a:lnTo>
+                  <a:lnTo>
+                    <a:pt x="7843" y="11984"/>
+                  </a:lnTo>
+                  <a:lnTo>
+                    <a:pt x="7941" y="12057"/>
+                  </a:lnTo>
+                  <a:lnTo>
+                    <a:pt x="8038" y="12105"/>
+                  </a:lnTo>
+                  <a:lnTo>
+                    <a:pt x="8135" y="12130"/>
+                  </a:lnTo>
+                  <a:lnTo>
+                    <a:pt x="8233" y="12130"/>
+                  </a:lnTo>
+                  <a:lnTo>
+                    <a:pt x="8233" y="12130"/>
+                  </a:lnTo>
+                  <a:lnTo>
+                    <a:pt x="8355" y="12130"/>
+                  </a:lnTo>
+                  <a:lnTo>
+                    <a:pt x="8452" y="12105"/>
+                  </a:lnTo>
+                  <a:lnTo>
+                    <a:pt x="8549" y="12057"/>
+                  </a:lnTo>
+                  <a:lnTo>
+                    <a:pt x="8622" y="11984"/>
+                  </a:lnTo>
+                  <a:lnTo>
+                    <a:pt x="8622" y="11984"/>
+                  </a:lnTo>
+                  <a:lnTo>
+                    <a:pt x="8842" y="11716"/>
+                  </a:lnTo>
+                  <a:lnTo>
+                    <a:pt x="9036" y="11423"/>
+                  </a:lnTo>
+                  <a:lnTo>
+                    <a:pt x="9158" y="11131"/>
+                  </a:lnTo>
+                  <a:lnTo>
+                    <a:pt x="9280" y="10814"/>
+                  </a:lnTo>
+                  <a:lnTo>
+                    <a:pt x="9353" y="10498"/>
+                  </a:lnTo>
+                  <a:lnTo>
+                    <a:pt x="9402" y="10181"/>
+                  </a:lnTo>
+                  <a:lnTo>
+                    <a:pt x="9426" y="9889"/>
+                  </a:lnTo>
+                  <a:lnTo>
+                    <a:pt x="9426" y="9597"/>
+                  </a:lnTo>
+                  <a:lnTo>
+                    <a:pt x="9426" y="9597"/>
+                  </a:lnTo>
+                  <a:lnTo>
+                    <a:pt x="9426" y="9280"/>
+                  </a:lnTo>
+                  <a:lnTo>
+                    <a:pt x="9402" y="8964"/>
+                  </a:lnTo>
+                  <a:lnTo>
+                    <a:pt x="9353" y="8647"/>
+                  </a:lnTo>
+                  <a:lnTo>
+                    <a:pt x="9280" y="8330"/>
+                  </a:lnTo>
+                  <a:lnTo>
+                    <a:pt x="9231" y="8038"/>
+                  </a:lnTo>
+                  <a:lnTo>
+                    <a:pt x="9134" y="7746"/>
+                  </a:lnTo>
+                  <a:lnTo>
+                    <a:pt x="9036" y="7502"/>
+                  </a:lnTo>
+                  <a:lnTo>
+                    <a:pt x="8939" y="7259"/>
+                  </a:lnTo>
+                  <a:lnTo>
+                    <a:pt x="12130" y="4093"/>
+                  </a:lnTo>
+                </a:path>
+              </a:pathLst>
+            </a:custGeom>
+            <a:noFill/>
+            <a:ln w="9525" cap="rnd" cmpd="sng">
+              <a:solidFill>
+                <a:srgbClr val="000000"/>
+              </a:solidFill>
+              <a:prstDash val="solid"/>
+              <a:round/>
+              <a:headEnd type="none" w="med" len="med"/>
+              <a:tailEnd type="none" w="med" len="med"/>
+            </a:ln>
+          </p:spPr>
+          <p:txBody>
+            <a:bodyPr lIns="91425" tIns="91425" rIns="91425" bIns="91425" anchor="ctr" anchorCtr="0">
+              <a:noAutofit/>
+            </a:bodyPr>
+            <a:lstStyle/>
+            <a:p>
+              <a:pPr lvl="0">
+                <a:spcBef>
+                  <a:spcPts val="0"/>
+                </a:spcBef>
+                <a:buNone/>
+              </a:pPr>
+              <a:endParaRPr/>
+            </a:p>
+          </p:txBody>
+        </p:sp>
+        <p:sp>
+          <p:nvSpPr>
+            <p:cNvPr id="117" name="Shape 117"/>
+            <p:cNvSpPr/>
+            <p:nvPr/>
+          </p:nvSpPr>
+          <p:spPr>
+            <a:xfrm>
+              <a:off x="2814911" y="1754061"/>
+              <a:ext cx="49950" cy="49950"/>
+            </a:xfrm>
+            <a:custGeom>
+              <a:avLst/>
+              <a:gdLst/>
+              <a:ahLst/>
+              <a:cxnLst/>
+              <a:rect l="0" t="0" r="0" b="0"/>
+              <a:pathLst>
+                <a:path w="1998" h="1998" fill="none" extrusionOk="0">
+                  <a:moveTo>
+                    <a:pt x="1" y="1997"/>
+                  </a:moveTo>
+                  <a:lnTo>
+                    <a:pt x="1998" y="0"/>
+                  </a:lnTo>
+                </a:path>
+              </a:pathLst>
+            </a:custGeom>
+            <a:noFill/>
+            <a:ln w="9525" cap="rnd" cmpd="sng">
+              <a:solidFill>
+                <a:srgbClr val="000000"/>
+              </a:solidFill>
+              <a:prstDash val="solid"/>
+              <a:round/>
+              <a:headEnd type="none" w="med" len="med"/>
+              <a:tailEnd type="none" w="med" len="med"/>
+            </a:ln>
+          </p:spPr>
+          <p:txBody>
+            <a:bodyPr lIns="91425" tIns="91425" rIns="91425" bIns="91425" anchor="ctr" anchorCtr="0">
+              <a:noAutofit/>
+            </a:bodyPr>
+            <a:lstStyle/>
+            <a:p>
+              <a:pPr lvl="0">
+                <a:spcBef>
+                  <a:spcPts val="0"/>
+                </a:spcBef>
+                <a:buNone/>
+              </a:pPr>
+              <a:endParaRPr/>
+            </a:p>
+          </p:txBody>
+        </p:sp>
+      </p:grpSp>
     </p:spTree>
     <p:extLst>
       <p:ext uri="{BB962C8B-B14F-4D97-AF65-F5344CB8AC3E}">
-        <p14:creationId xmlns:p14="http://schemas.microsoft.com/office/powerpoint/2010/main" val="2145982150"/>
+        <p14:creationId xmlns:p14="http://schemas.microsoft.com/office/powerpoint/2010/main" val="1279202038"/>
       </p:ext>
     </p:extLst>
   </p:cSld>
   <p:clrMapOvr>
     <a:masterClrMapping/>
   </p:clrMapOvr>
-  <mc:AlternateContent xmlns:mc="http://schemas.openxmlformats.org/markup-compatibility/2006">
-    <mc:Choice xmlns:p14="http://schemas.microsoft.com/office/powerpoint/2010/main" Requires="p14">
+  <mc:AlternateContent xmlns:mc="http://schemas.openxmlformats.org/markup-compatibility/2006" xmlns:p14="http://schemas.microsoft.com/office/powerpoint/2010/main">
+    <mc:Choice Requires="p14">
       <p:transition p14:dur="0"/>
     </mc:Choice>
-    <mc:Fallback>
+    <mc:Fallback xmlns="">
       <p:transition/>
     </mc:Fallback>
   </mc:AlternateContent>
@@ -9903,7 +12389,7 @@
                   <a:srgbClr val="FFCD00"/>
                 </a:highlight>
               </a:rPr>
-              <a:t>Topic</a:t>
+              <a:t>Projektaufwand</a:t>
             </a:r>
             <a:endParaRPr lang="en" dirty="0">
               <a:highlight>
@@ -9945,7 +12431,17 @@
             </a:pPr>
             <a:r>
               <a:rPr lang="en" dirty="0" smtClean="0"/>
-              <a:t>Ursprünglicher Ansatz, Überarbeitungsbedarf</a:t>
+              <a:t>Lines of Code	</a:t>
+            </a:r>
+            <a:r>
+              <a:rPr lang="en" dirty="0" smtClean="0">
+                <a:sym typeface="Wingdings" pitchFamily="2" charset="2"/>
+              </a:rPr>
+              <a:t></a:t>
+            </a:r>
+            <a:r>
+              <a:rPr lang="en" dirty="0" smtClean="0"/>
+              <a:t> 1239</a:t>
             </a:r>
           </a:p>
           <a:p>
@@ -9956,7 +12452,17 @@
             </a:pPr>
             <a:r>
               <a:rPr lang="en" dirty="0" smtClean="0"/>
-              <a:t>Erfahrungen</a:t>
+              <a:t>Statements	</a:t>
+            </a:r>
+            <a:r>
+              <a:rPr lang="en" dirty="0" smtClean="0">
+                <a:sym typeface="Wingdings" pitchFamily="2" charset="2"/>
+              </a:rPr>
+              <a:t></a:t>
+            </a:r>
+            <a:r>
+              <a:rPr lang="en" dirty="0" smtClean="0"/>
+              <a:t> 431</a:t>
             </a:r>
           </a:p>
           <a:p>
@@ -9965,6 +12471,79 @@
                 <a:spcPts val="0"/>
               </a:spcBef>
             </a:pPr>
+            <a:r>
+              <a:rPr lang="en" dirty="0" smtClean="0"/>
+              <a:t>Functions		</a:t>
+            </a:r>
+            <a:r>
+              <a:rPr lang="en" dirty="0" smtClean="0">
+                <a:sym typeface="Wingdings" pitchFamily="2" charset="2"/>
+              </a:rPr>
+              <a:t></a:t>
+            </a:r>
+            <a:r>
+              <a:rPr lang="en" dirty="0" smtClean="0"/>
+              <a:t> 118</a:t>
+            </a:r>
+          </a:p>
+          <a:p>
+            <a:pPr marL="457200" lvl="0" indent="-228600" rtl="0">
+              <a:spcBef>
+                <a:spcPts val="0"/>
+              </a:spcBef>
+            </a:pPr>
+            <a:r>
+              <a:rPr lang="en" dirty="0" smtClean="0"/>
+              <a:t>Classes		</a:t>
+            </a:r>
+            <a:r>
+              <a:rPr lang="en" dirty="0" smtClean="0">
+                <a:sym typeface="Wingdings" pitchFamily="2" charset="2"/>
+              </a:rPr>
+              <a:t></a:t>
+            </a:r>
+            <a:r>
+              <a:rPr lang="en" dirty="0" smtClean="0"/>
+              <a:t> 38</a:t>
+            </a:r>
+          </a:p>
+          <a:p>
+            <a:pPr marL="457200" lvl="0" indent="-228600" rtl="0">
+              <a:spcBef>
+                <a:spcPts val="0"/>
+              </a:spcBef>
+            </a:pPr>
+            <a:r>
+              <a:rPr lang="en" dirty="0" smtClean="0"/>
+              <a:t>Files		</a:t>
+            </a:r>
+            <a:r>
+              <a:rPr lang="en" dirty="0" smtClean="0">
+                <a:sym typeface="Wingdings" pitchFamily="2" charset="2"/>
+              </a:rPr>
+              <a:t></a:t>
+            </a:r>
+            <a:r>
+              <a:rPr lang="en" dirty="0" smtClean="0"/>
+              <a:t> 37</a:t>
+            </a:r>
+          </a:p>
+          <a:p>
+            <a:pPr marL="457200" lvl="0" indent="-228600" rtl="0">
+              <a:spcBef>
+                <a:spcPts val="0"/>
+              </a:spcBef>
+            </a:pPr>
+            <a:r>
+              <a:rPr lang="en" dirty="0" smtClean="0"/>
+              <a:t>Directories	</a:t>
+            </a:r>
+            <a:r>
+              <a:rPr lang="en" dirty="0" smtClean="0">
+                <a:sym typeface="Wingdings" pitchFamily="2" charset="2"/>
+              </a:rPr>
+              <a:t> 12</a:t>
+            </a:r>
             <a:endParaRPr lang="en" dirty="0"/>
           </a:p>
         </p:txBody>
@@ -10530,18 +13109,18 @@
     </p:spTree>
     <p:extLst>
       <p:ext uri="{BB962C8B-B14F-4D97-AF65-F5344CB8AC3E}">
-        <p14:creationId xmlns:p14="http://schemas.microsoft.com/office/powerpoint/2010/main" val="1178456594"/>
+        <p14:creationId xmlns:p14="http://schemas.microsoft.com/office/powerpoint/2010/main" val="2522101649"/>
       </p:ext>
     </p:extLst>
   </p:cSld>
   <p:clrMapOvr>
     <a:masterClrMapping/>
   </p:clrMapOvr>
-  <mc:AlternateContent xmlns:mc="http://schemas.openxmlformats.org/markup-compatibility/2006">
-    <mc:Choice xmlns:p14="http://schemas.microsoft.com/office/powerpoint/2010/main" Requires="p14">
+  <mc:AlternateContent xmlns:mc="http://schemas.openxmlformats.org/markup-compatibility/2006" xmlns:p14="http://schemas.microsoft.com/office/powerpoint/2010/main">
+    <mc:Choice Requires="p14">
       <p:transition p14:dur="0"/>
     </mc:Choice>
-    <mc:Fallback>
+    <mc:Fallback xmlns="">
       <p:transition/>
     </mc:Fallback>
   </mc:AlternateContent>
@@ -10556,187 +13135,6 @@
 </file>
 
 <file path=ppt/slides/slide8.xml><?xml version="1.0" encoding="utf-8"?>
-<p:sld xmlns:a="http://schemas.openxmlformats.org/drawingml/2006/main" xmlns:r="http://schemas.openxmlformats.org/officeDocument/2006/relationships" xmlns:p="http://schemas.openxmlformats.org/presentationml/2006/main">
-  <p:cSld>
-    <p:spTree>
-      <p:nvGrpSpPr>
-        <p:cNvPr id="1" name="Shape 98"/>
-        <p:cNvGrpSpPr/>
-        <p:nvPr/>
-      </p:nvGrpSpPr>
-      <p:grpSpPr>
-        <a:xfrm>
-          <a:off x="0" y="0"/>
-          <a:ext cx="0" cy="0"/>
-          <a:chOff x="0" y="0"/>
-          <a:chExt cx="0" cy="0"/>
-        </a:xfrm>
-      </p:grpSpPr>
-      <p:sp>
-        <p:nvSpPr>
-          <p:cNvPr id="99" name="Shape 99"/>
-          <p:cNvSpPr txBox="1">
-            <a:spLocks noGrp="1"/>
-          </p:cNvSpPr>
-          <p:nvPr>
-            <p:ph type="ctrTitle"/>
-          </p:nvPr>
-        </p:nvSpPr>
-        <p:spPr>
-          <a:xfrm>
-            <a:off x="2022225" y="1693523"/>
-            <a:ext cx="3787799" cy="1159799"/>
-          </a:xfrm>
-          <a:prstGeom prst="rect">
-            <a:avLst/>
-          </a:prstGeom>
-        </p:spPr>
-        <p:txBody>
-          <a:bodyPr lIns="91425" tIns="91425" rIns="91425" bIns="91425" anchor="b" anchorCtr="0">
-            <a:noAutofit/>
-          </a:bodyPr>
-          <a:lstStyle/>
-          <a:p>
-            <a:pPr lvl="0" rtl="0">
-              <a:spcBef>
-                <a:spcPts val="0"/>
-              </a:spcBef>
-              <a:buNone/>
-            </a:pPr>
-            <a:r>
-              <a:rPr lang="en" dirty="0" smtClean="0"/>
-              <a:t>Designer</a:t>
-            </a:r>
-            <a:endParaRPr lang="en" dirty="0"/>
-          </a:p>
-        </p:txBody>
-      </p:sp>
-      <p:sp>
-        <p:nvSpPr>
-          <p:cNvPr id="100" name="Shape 100"/>
-          <p:cNvSpPr txBox="1">
-            <a:spLocks noGrp="1"/>
-          </p:cNvSpPr>
-          <p:nvPr>
-            <p:ph type="subTitle" idx="1"/>
-          </p:nvPr>
-        </p:nvSpPr>
-        <p:spPr>
-          <a:xfrm>
-            <a:off x="2022300" y="2815923"/>
-            <a:ext cx="5591400" cy="784799"/>
-          </a:xfrm>
-          <a:prstGeom prst="rect">
-            <a:avLst/>
-          </a:prstGeom>
-        </p:spPr>
-        <p:txBody>
-          <a:bodyPr lIns="91425" tIns="91425" rIns="91425" bIns="91425" anchor="t" anchorCtr="0">
-            <a:noAutofit/>
-          </a:bodyPr>
-          <a:lstStyle/>
-          <a:p>
-            <a:pPr lvl="0"/>
-            <a:r>
-              <a:rPr lang="en" dirty="0" smtClean="0"/>
-              <a:t>Marcel Herd </a:t>
-            </a:r>
-            <a:r>
-              <a:rPr lang="de-DE" dirty="0" smtClean="0"/>
-              <a:t>• Eugen </a:t>
-            </a:r>
-            <a:r>
-              <a:rPr lang="de-DE" dirty="0" err="1" smtClean="0"/>
-              <a:t>Krizki</a:t>
-            </a:r>
-            <a:endParaRPr lang="en" dirty="0"/>
-          </a:p>
-        </p:txBody>
-      </p:sp>
-      <p:sp>
-        <p:nvSpPr>
-          <p:cNvPr id="101" name="Shape 101"/>
-          <p:cNvSpPr txBox="1"/>
-          <p:nvPr/>
-        </p:nvSpPr>
-        <p:spPr>
-          <a:xfrm>
-            <a:off x="1133975" y="2291150"/>
-            <a:ext cx="543899" cy="562199"/>
-          </a:xfrm>
-          <a:prstGeom prst="rect">
-            <a:avLst/>
-          </a:prstGeom>
-          <a:noFill/>
-          <a:ln>
-            <a:noFill/>
-          </a:ln>
-        </p:spPr>
-        <p:txBody>
-          <a:bodyPr lIns="91425" tIns="91425" rIns="91425" bIns="91425" anchor="ctr" anchorCtr="0">
-            <a:noAutofit/>
-          </a:bodyPr>
-          <a:lstStyle/>
-          <a:p>
-            <a:pPr lvl="0" algn="ctr">
-              <a:spcBef>
-                <a:spcPts val="0"/>
-              </a:spcBef>
-              <a:buNone/>
-            </a:pPr>
-            <a:r>
-              <a:rPr lang="en" sz="2400" dirty="0" smtClean="0">
-                <a:solidFill>
-                  <a:schemeClr val="dk1"/>
-                </a:solidFill>
-                <a:latin typeface="Lora"/>
-                <a:ea typeface="Lora"/>
-                <a:cs typeface="Lora"/>
-                <a:sym typeface="Lora"/>
-              </a:rPr>
-              <a:t>3</a:t>
-            </a:r>
-            <a:endParaRPr lang="en" sz="2400" dirty="0">
-              <a:solidFill>
-                <a:schemeClr val="dk1"/>
-              </a:solidFill>
-              <a:latin typeface="Lora"/>
-              <a:ea typeface="Lora"/>
-              <a:cs typeface="Lora"/>
-              <a:sym typeface="Lora"/>
-            </a:endParaRPr>
-          </a:p>
-        </p:txBody>
-      </p:sp>
-    </p:spTree>
-    <p:extLst>
-      <p:ext uri="{BB962C8B-B14F-4D97-AF65-F5344CB8AC3E}">
-        <p14:creationId xmlns:p14="http://schemas.microsoft.com/office/powerpoint/2010/main" val="3669912151"/>
-      </p:ext>
-    </p:extLst>
-  </p:cSld>
-  <p:clrMapOvr>
-    <a:masterClrMapping/>
-  </p:clrMapOvr>
-  <mc:AlternateContent xmlns:mc="http://schemas.openxmlformats.org/markup-compatibility/2006">
-    <mc:Choice xmlns:p14="http://schemas.microsoft.com/office/powerpoint/2010/main" Requires="p14">
-      <p:transition p14:dur="0"/>
-    </mc:Choice>
-    <mc:Fallback>
-      <p:transition/>
-    </mc:Fallback>
-  </mc:AlternateContent>
-  <p:timing>
-    <p:tnLst>
-      <p:par>
-        <p:cTn id="1" dur="indefinite" restart="never" nodeType="tmRoot"/>
-      </p:par>
-    </p:tnLst>
-  </p:timing>
-</p:sld>
-</file>
-
-<file path=ppt/slides/slide9.xml><?xml version="1.0" encoding="utf-8"?>
 <p:sld xmlns:a="http://schemas.openxmlformats.org/drawingml/2006/main" xmlns:r="http://schemas.openxmlformats.org/officeDocument/2006/relationships" xmlns:p="http://schemas.openxmlformats.org/presentationml/2006/main">
   <p:cSld>
     <p:spTree>
@@ -10790,7 +13188,7 @@
                   <a:srgbClr val="FFCD00"/>
                 </a:highlight>
               </a:rPr>
-              <a:t>Topic</a:t>
+              <a:t>Dokumentation</a:t>
             </a:r>
             <a:endParaRPr lang="en" dirty="0">
               <a:highlight>
@@ -10832,7 +13230,17 @@
             </a:pPr>
             <a:r>
               <a:rPr lang="en" dirty="0" smtClean="0"/>
-              <a:t>Kommentare zum Analyseergebnis</a:t>
+              <a:t>Comment lines			</a:t>
+            </a:r>
+            <a:r>
+              <a:rPr lang="en" dirty="0" smtClean="0">
+                <a:sym typeface="Wingdings" pitchFamily="2" charset="2"/>
+              </a:rPr>
+              <a:t></a:t>
+            </a:r>
+            <a:r>
+              <a:rPr lang="en" dirty="0" smtClean="0"/>
+              <a:t> 259</a:t>
             </a:r>
           </a:p>
           <a:p>
@@ -10843,7 +13251,17 @@
             </a:pPr>
             <a:r>
               <a:rPr lang="en" dirty="0" smtClean="0"/>
-              <a:t>Darstellung typischer Teile</a:t>
+              <a:t>Public Documented API		</a:t>
+            </a:r>
+            <a:r>
+              <a:rPr lang="en" dirty="0" smtClean="0">
+                <a:sym typeface="Wingdings" pitchFamily="2" charset="2"/>
+              </a:rPr>
+              <a:t></a:t>
+            </a:r>
+            <a:r>
+              <a:rPr lang="en" dirty="0" smtClean="0"/>
+              <a:t> 82,9%</a:t>
             </a:r>
           </a:p>
           <a:p>
@@ -10854,7 +13272,17 @@
             </a:pPr>
             <a:r>
               <a:rPr lang="en" dirty="0" smtClean="0"/>
-              <a:t>Begründung für Designentscheidungen</a:t>
+              <a:t>Public Undocumented API	</a:t>
+            </a:r>
+            <a:r>
+              <a:rPr lang="en" dirty="0" smtClean="0">
+                <a:sym typeface="Wingdings" pitchFamily="2" charset="2"/>
+              </a:rPr>
+              <a:t></a:t>
+            </a:r>
+            <a:r>
+              <a:rPr lang="en" dirty="0" smtClean="0"/>
+              <a:t> 19</a:t>
             </a:r>
           </a:p>
           <a:p>
@@ -10863,10 +13291,9 @@
                 <a:spcPts val="0"/>
               </a:spcBef>
             </a:pPr>
-            <a:r>
-              <a:rPr lang="en" dirty="0" smtClean="0"/>
-              <a:t>Erfahrungen</a:t>
-            </a:r>
+            <a:endParaRPr lang="en" dirty="0" smtClean="0">
+              <a:sym typeface="Wingdings" pitchFamily="2" charset="2"/>
+            </a:endParaRPr>
           </a:p>
           <a:p>
             <a:pPr marL="457200" lvl="0" indent="-228600" rtl="0">
@@ -10874,6 +13301,12 @@
                 <a:spcPts val="0"/>
               </a:spcBef>
             </a:pPr>
+            <a:r>
+              <a:rPr lang="en" dirty="0" smtClean="0">
+                <a:sym typeface="Wingdings" pitchFamily="2" charset="2"/>
+              </a:rPr>
+              <a:t> 17.3% Comments</a:t>
+            </a:r>
             <a:endParaRPr lang="en" dirty="0"/>
           </a:p>
         </p:txBody>
@@ -11439,18 +13872,196 @@
     </p:spTree>
     <p:extLst>
       <p:ext uri="{BB962C8B-B14F-4D97-AF65-F5344CB8AC3E}">
-        <p14:creationId xmlns:p14="http://schemas.microsoft.com/office/powerpoint/2010/main" val="42543531"/>
+        <p14:creationId xmlns:p14="http://schemas.microsoft.com/office/powerpoint/2010/main" val="4147062136"/>
       </p:ext>
     </p:extLst>
   </p:cSld>
   <p:clrMapOvr>
     <a:masterClrMapping/>
   </p:clrMapOvr>
-  <mc:AlternateContent xmlns:mc="http://schemas.openxmlformats.org/markup-compatibility/2006">
-    <mc:Choice xmlns:p14="http://schemas.microsoft.com/office/powerpoint/2010/main" Requires="p14">
+  <mc:AlternateContent xmlns:mc="http://schemas.openxmlformats.org/markup-compatibility/2006" xmlns:p14="http://schemas.microsoft.com/office/powerpoint/2010/main">
+    <mc:Choice Requires="p14">
       <p:transition p14:dur="0"/>
     </mc:Choice>
-    <mc:Fallback>
+    <mc:Fallback xmlns="">
+      <p:transition/>
+    </mc:Fallback>
+  </mc:AlternateContent>
+  <p:timing>
+    <p:tnLst>
+      <p:par>
+        <p:cTn id="1" dur="indefinite" restart="never" nodeType="tmRoot"/>
+      </p:par>
+    </p:tnLst>
+  </p:timing>
+</p:sld>
+</file>
+
+<file path=ppt/slides/slide9.xml><?xml version="1.0" encoding="utf-8"?>
+<p:sld xmlns:a="http://schemas.openxmlformats.org/drawingml/2006/main" xmlns:r="http://schemas.openxmlformats.org/officeDocument/2006/relationships" xmlns:p="http://schemas.openxmlformats.org/presentationml/2006/main">
+  <p:cSld>
+    <p:spTree>
+      <p:nvGrpSpPr>
+        <p:cNvPr id="1" name="Shape 98"/>
+        <p:cNvGrpSpPr/>
+        <p:nvPr/>
+      </p:nvGrpSpPr>
+      <p:grpSpPr>
+        <a:xfrm>
+          <a:off x="0" y="0"/>
+          <a:ext cx="0" cy="0"/>
+          <a:chOff x="0" y="0"/>
+          <a:chExt cx="0" cy="0"/>
+        </a:xfrm>
+      </p:grpSpPr>
+      <p:sp>
+        <p:nvSpPr>
+          <p:cNvPr id="99" name="Shape 99"/>
+          <p:cNvSpPr txBox="1">
+            <a:spLocks noGrp="1"/>
+          </p:cNvSpPr>
+          <p:nvPr>
+            <p:ph type="ctrTitle"/>
+          </p:nvPr>
+        </p:nvSpPr>
+        <p:spPr>
+          <a:xfrm>
+            <a:off x="2022225" y="1693523"/>
+            <a:ext cx="3787799" cy="1159799"/>
+          </a:xfrm>
+          <a:prstGeom prst="rect">
+            <a:avLst/>
+          </a:prstGeom>
+        </p:spPr>
+        <p:txBody>
+          <a:bodyPr lIns="91425" tIns="91425" rIns="91425" bIns="91425" anchor="b" anchorCtr="0">
+            <a:noAutofit/>
+          </a:bodyPr>
+          <a:lstStyle/>
+          <a:p>
+            <a:pPr lvl="0" rtl="0">
+              <a:spcBef>
+                <a:spcPts val="0"/>
+              </a:spcBef>
+              <a:buNone/>
+            </a:pPr>
+            <a:r>
+              <a:rPr lang="en" dirty="0" smtClean="0"/>
+              <a:t>Analysten</a:t>
+            </a:r>
+            <a:endParaRPr lang="en" dirty="0"/>
+          </a:p>
+        </p:txBody>
+      </p:sp>
+      <p:sp>
+        <p:nvSpPr>
+          <p:cNvPr id="100" name="Shape 100"/>
+          <p:cNvSpPr txBox="1">
+            <a:spLocks noGrp="1"/>
+          </p:cNvSpPr>
+          <p:nvPr>
+            <p:ph type="subTitle" idx="1"/>
+          </p:nvPr>
+        </p:nvSpPr>
+        <p:spPr>
+          <a:xfrm>
+            <a:off x="2022300" y="2815923"/>
+            <a:ext cx="5591400" cy="784799"/>
+          </a:xfrm>
+          <a:prstGeom prst="rect">
+            <a:avLst/>
+          </a:prstGeom>
+        </p:spPr>
+        <p:txBody>
+          <a:bodyPr lIns="91425" tIns="91425" rIns="91425" bIns="91425" anchor="t" anchorCtr="0">
+            <a:noAutofit/>
+          </a:bodyPr>
+          <a:lstStyle/>
+          <a:p>
+            <a:pPr lvl="0" rtl="0">
+              <a:spcBef>
+                <a:spcPts val="0"/>
+              </a:spcBef>
+              <a:buNone/>
+            </a:pPr>
+            <a:r>
+              <a:rPr lang="en" dirty="0" smtClean="0"/>
+              <a:t>Richard Vladimirskij</a:t>
+            </a:r>
+            <a:endParaRPr lang="en" dirty="0"/>
+          </a:p>
+        </p:txBody>
+      </p:sp>
+      <p:sp>
+        <p:nvSpPr>
+          <p:cNvPr id="101" name="Shape 101"/>
+          <p:cNvSpPr txBox="1"/>
+          <p:nvPr/>
+        </p:nvSpPr>
+        <p:spPr>
+          <a:xfrm>
+            <a:off x="1133975" y="2291150"/>
+            <a:ext cx="543899" cy="562199"/>
+          </a:xfrm>
+          <a:prstGeom prst="rect">
+            <a:avLst/>
+          </a:prstGeom>
+          <a:noFill/>
+          <a:ln>
+            <a:noFill/>
+          </a:ln>
+        </p:spPr>
+        <p:txBody>
+          <a:bodyPr lIns="91425" tIns="91425" rIns="91425" bIns="91425" anchor="ctr" anchorCtr="0">
+            <a:noAutofit/>
+          </a:bodyPr>
+          <a:lstStyle/>
+          <a:p>
+            <a:pPr lvl="0" algn="ctr">
+              <a:spcBef>
+                <a:spcPts val="0"/>
+              </a:spcBef>
+              <a:buNone/>
+            </a:pPr>
+            <a:r>
+              <a:rPr lang="en" sz="2400" dirty="0" smtClean="0">
+                <a:solidFill>
+                  <a:schemeClr val="dk1"/>
+                </a:solidFill>
+                <a:latin typeface="Lora"/>
+                <a:ea typeface="Lora"/>
+                <a:cs typeface="Lora"/>
+                <a:sym typeface="Lora"/>
+              </a:rPr>
+              <a:t>2</a:t>
+            </a:r>
+            <a:endParaRPr lang="en" sz="2400" dirty="0">
+              <a:solidFill>
+                <a:schemeClr val="dk1"/>
+              </a:solidFill>
+              <a:latin typeface="Lora"/>
+              <a:ea typeface="Lora"/>
+              <a:cs typeface="Lora"/>
+              <a:sym typeface="Lora"/>
+            </a:endParaRPr>
+          </a:p>
+        </p:txBody>
+      </p:sp>
+    </p:spTree>
+    <p:extLst>
+      <p:ext uri="{BB962C8B-B14F-4D97-AF65-F5344CB8AC3E}">
+        <p14:creationId xmlns:p14="http://schemas.microsoft.com/office/powerpoint/2010/main" val="2145982150"/>
+      </p:ext>
+    </p:extLst>
+  </p:cSld>
+  <p:clrMapOvr>
+    <a:masterClrMapping/>
+  </p:clrMapOvr>
+  <mc:AlternateContent xmlns:mc="http://schemas.openxmlformats.org/markup-compatibility/2006" xmlns:p14="http://schemas.microsoft.com/office/powerpoint/2010/main">
+    <mc:Choice Requires="p14">
+      <p:transition p14:dur="0"/>
+    </mc:Choice>
+    <mc:Fallback xmlns="">
       <p:transition/>
     </mc:Fallback>
   </mc:AlternateContent>

</xml_diff>

<commit_message>
Final metrics in presentation
</commit_message>
<xml_diff>
--- a/Presentation/Presentation.pptx
+++ b/Presentation/Presentation.pptx
@@ -8149,11 +8149,11 @@
   <p:clrMapOvr>
     <a:masterClrMapping/>
   </p:clrMapOvr>
-  <mc:AlternateContent xmlns:mc="http://schemas.openxmlformats.org/markup-compatibility/2006">
-    <mc:Choice xmlns:p14="http://schemas.microsoft.com/office/powerpoint/2010/main" Requires="p14">
+  <mc:AlternateContent xmlns:mc="http://schemas.openxmlformats.org/markup-compatibility/2006" xmlns:p14="http://schemas.microsoft.com/office/powerpoint/2010/main">
+    <mc:Choice Requires="p14">
       <p:transition p14:dur="0"/>
     </mc:Choice>
-    <mc:Fallback>
+    <mc:Fallback xmlns="">
       <p:transition/>
     </mc:Fallback>
   </mc:AlternateContent>
@@ -8865,11 +8865,11 @@
   <p:clrMapOvr>
     <a:masterClrMapping/>
   </p:clrMapOvr>
-  <mc:AlternateContent xmlns:mc="http://schemas.openxmlformats.org/markup-compatibility/2006">
-    <mc:Choice xmlns:p14="http://schemas.microsoft.com/office/powerpoint/2010/main" Requires="p14">
+  <mc:AlternateContent xmlns:mc="http://schemas.openxmlformats.org/markup-compatibility/2006" xmlns:p14="http://schemas.microsoft.com/office/powerpoint/2010/main">
+    <mc:Choice Requires="p14">
       <p:transition p14:dur="0"/>
     </mc:Choice>
-    <mc:Fallback>
+    <mc:Fallback xmlns="">
       <p:transition/>
     </mc:Fallback>
   </mc:AlternateContent>
@@ -9577,11 +9577,11 @@
   <p:clrMapOvr>
     <a:masterClrMapping/>
   </p:clrMapOvr>
-  <mc:AlternateContent xmlns:mc="http://schemas.openxmlformats.org/markup-compatibility/2006">
-    <mc:Choice xmlns:p14="http://schemas.microsoft.com/office/powerpoint/2010/main" Requires="p14">
+  <mc:AlternateContent xmlns:mc="http://schemas.openxmlformats.org/markup-compatibility/2006" xmlns:p14="http://schemas.microsoft.com/office/powerpoint/2010/main">
+    <mc:Choice Requires="p14">
       <p:transition p14:dur="0"/>
     </mc:Choice>
-    <mc:Fallback>
+    <mc:Fallback xmlns="">
       <p:transition/>
     </mc:Fallback>
   </mc:AlternateContent>
@@ -10363,11 +10363,11 @@
   <p:clrMapOvr>
     <a:masterClrMapping/>
   </p:clrMapOvr>
-  <mc:AlternateContent xmlns:mc="http://schemas.openxmlformats.org/markup-compatibility/2006">
-    <mc:Choice xmlns:p14="http://schemas.microsoft.com/office/powerpoint/2010/main" Requires="p14">
+  <mc:AlternateContent xmlns:mc="http://schemas.openxmlformats.org/markup-compatibility/2006" xmlns:p14="http://schemas.microsoft.com/office/powerpoint/2010/main">
+    <mc:Choice Requires="p14">
       <p:transition p14:dur="0"/>
     </mc:Choice>
-    <mc:Fallback>
+    <mc:Fallback xmlns="">
       <p:transition/>
     </mc:Fallback>
   </mc:AlternateContent>
@@ -11160,11 +11160,11 @@
   <p:clrMapOvr>
     <a:masterClrMapping/>
   </p:clrMapOvr>
-  <mc:AlternateContent xmlns:mc="http://schemas.openxmlformats.org/markup-compatibility/2006">
-    <mc:Choice xmlns:p14="http://schemas.microsoft.com/office/powerpoint/2010/main" Requires="p14">
+  <mc:AlternateContent xmlns:mc="http://schemas.openxmlformats.org/markup-compatibility/2006" xmlns:p14="http://schemas.microsoft.com/office/powerpoint/2010/main">
+    <mc:Choice Requires="p14">
       <p:transition p14:dur="0"/>
     </mc:Choice>
-    <mc:Fallback>
+    <mc:Fallback xmlns="">
       <p:transition/>
     </mc:Fallback>
   </mc:AlternateContent>
@@ -12037,11 +12037,11 @@
   <p:clrMapOvr>
     <a:masterClrMapping/>
   </p:clrMapOvr>
-  <mc:AlternateContent xmlns:mc="http://schemas.openxmlformats.org/markup-compatibility/2006">
-    <mc:Choice xmlns:p14="http://schemas.microsoft.com/office/powerpoint/2010/main" Requires="p14">
+  <mc:AlternateContent xmlns:mc="http://schemas.openxmlformats.org/markup-compatibility/2006" xmlns:p14="http://schemas.microsoft.com/office/powerpoint/2010/main">
+    <mc:Choice Requires="p14">
       <p:transition p14:dur="0"/>
     </mc:Choice>
-    <mc:Fallback>
+    <mc:Fallback xmlns="">
       <p:transition/>
     </mc:Fallback>
   </mc:AlternateContent>
@@ -12926,11 +12926,11 @@
   <p:clrMapOvr>
     <a:masterClrMapping/>
   </p:clrMapOvr>
-  <mc:AlternateContent xmlns:mc="http://schemas.openxmlformats.org/markup-compatibility/2006">
-    <mc:Choice xmlns:p14="http://schemas.microsoft.com/office/powerpoint/2010/main" Requires="p14">
+  <mc:AlternateContent xmlns:mc="http://schemas.openxmlformats.org/markup-compatibility/2006" xmlns:p14="http://schemas.microsoft.com/office/powerpoint/2010/main">
+    <mc:Choice Requires="p14">
       <p:transition p14:dur="0"/>
     </mc:Choice>
-    <mc:Fallback>
+    <mc:Fallback xmlns="">
       <p:transition/>
     </mc:Fallback>
   </mc:AlternateContent>
@@ -13889,11 +13889,11 @@
   <p:clrMapOvr>
     <a:masterClrMapping/>
   </p:clrMapOvr>
-  <mc:AlternateContent xmlns:mc="http://schemas.openxmlformats.org/markup-compatibility/2006">
-    <mc:Choice xmlns:p14="http://schemas.microsoft.com/office/powerpoint/2010/main" Requires="p14">
+  <mc:AlternateContent xmlns:mc="http://schemas.openxmlformats.org/markup-compatibility/2006" xmlns:p14="http://schemas.microsoft.com/office/powerpoint/2010/main">
+    <mc:Choice Requires="p14">
       <p:transition p14:dur="0"/>
     </mc:Choice>
-    <mc:Fallback>
+    <mc:Fallback xmlns="">
       <p:transition/>
     </mc:Fallback>
   </mc:AlternateContent>
@@ -14567,11 +14567,11 @@
   <p:clrMapOvr>
     <a:masterClrMapping/>
   </p:clrMapOvr>
-  <mc:AlternateContent xmlns:mc="http://schemas.openxmlformats.org/markup-compatibility/2006">
-    <mc:Choice xmlns:p14="http://schemas.microsoft.com/office/powerpoint/2010/main" Requires="p14">
+  <mc:AlternateContent xmlns:mc="http://schemas.openxmlformats.org/markup-compatibility/2006" xmlns:p14="http://schemas.microsoft.com/office/powerpoint/2010/main">
+    <mc:Choice Requires="p14">
       <p:transition p14:dur="0"/>
     </mc:Choice>
-    <mc:Fallback>
+    <mc:Fallback xmlns="">
       <p:transition/>
     </mc:Fallback>
   </mc:AlternateContent>
@@ -15212,11 +15212,11 @@
   <p:clrMapOvr>
     <a:masterClrMapping/>
   </p:clrMapOvr>
-  <mc:AlternateContent xmlns:mc="http://schemas.openxmlformats.org/markup-compatibility/2006">
-    <mc:Choice xmlns:p14="http://schemas.microsoft.com/office/powerpoint/2010/main" Requires="p14">
+  <mc:AlternateContent xmlns:mc="http://schemas.openxmlformats.org/markup-compatibility/2006" xmlns:p14="http://schemas.microsoft.com/office/powerpoint/2010/main">
+    <mc:Choice Requires="p14">
       <p:transition p14:dur="0"/>
     </mc:Choice>
-    <mc:Fallback>
+    <mc:Fallback xmlns="">
       <p:transition/>
     </mc:Fallback>
   </mc:AlternateContent>
@@ -15927,11 +15927,11 @@
   <p:clrMapOvr>
     <a:masterClrMapping/>
   </p:clrMapOvr>
-  <mc:AlternateContent xmlns:mc="http://schemas.openxmlformats.org/markup-compatibility/2006">
-    <mc:Choice xmlns:p14="http://schemas.microsoft.com/office/powerpoint/2010/main" Requires="p14">
+  <mc:AlternateContent xmlns:mc="http://schemas.openxmlformats.org/markup-compatibility/2006" xmlns:p14="http://schemas.microsoft.com/office/powerpoint/2010/main">
+    <mc:Choice Requires="p14">
       <p:transition p14:dur="0"/>
     </mc:Choice>
-    <mc:Fallback>
+    <mc:Fallback xmlns="">
       <p:transition/>
     </mc:Fallback>
   </mc:AlternateContent>
@@ -16096,11 +16096,11 @@
   <p:clrMapOvr>
     <a:masterClrMapping/>
   </p:clrMapOvr>
-  <mc:AlternateContent xmlns:mc="http://schemas.openxmlformats.org/markup-compatibility/2006">
-    <mc:Choice xmlns:p14="http://schemas.microsoft.com/office/powerpoint/2010/main" Requires="p14">
+  <mc:AlternateContent xmlns:mc="http://schemas.openxmlformats.org/markup-compatibility/2006" xmlns:p14="http://schemas.microsoft.com/office/powerpoint/2010/main">
+    <mc:Choice Requires="p14">
       <p:transition p14:dur="0"/>
     </mc:Choice>
-    <mc:Fallback>
+    <mc:Fallback xmlns="">
       <p:transition/>
     </mc:Fallback>
   </mc:AlternateContent>
@@ -16822,11 +16822,11 @@
   <p:clrMapOvr>
     <a:masterClrMapping/>
   </p:clrMapOvr>
-  <mc:AlternateContent xmlns:mc="http://schemas.openxmlformats.org/markup-compatibility/2006">
-    <mc:Choice xmlns:p14="http://schemas.microsoft.com/office/powerpoint/2010/main" Requires="p14">
+  <mc:AlternateContent xmlns:mc="http://schemas.openxmlformats.org/markup-compatibility/2006" xmlns:p14="http://schemas.microsoft.com/office/powerpoint/2010/main">
+    <mc:Choice Requires="p14">
       <p:transition p14:dur="0"/>
     </mc:Choice>
-    <mc:Fallback>
+    <mc:Fallback xmlns="">
       <p:transition/>
     </mc:Fallback>
   </mc:AlternateContent>
@@ -17559,11 +17559,11 @@
   <p:clrMapOvr>
     <a:masterClrMapping/>
   </p:clrMapOvr>
-  <mc:AlternateContent xmlns:mc="http://schemas.openxmlformats.org/markup-compatibility/2006">
-    <mc:Choice xmlns:p14="http://schemas.microsoft.com/office/powerpoint/2010/main" Requires="p14">
+  <mc:AlternateContent xmlns:mc="http://schemas.openxmlformats.org/markup-compatibility/2006" xmlns:p14="http://schemas.microsoft.com/office/powerpoint/2010/main">
+    <mc:Choice Requires="p14">
       <p:transition p14:dur="0"/>
     </mc:Choice>
-    <mc:Fallback>
+    <mc:Fallback xmlns="">
       <p:transition/>
     </mc:Fallback>
   </mc:AlternateContent>
@@ -18204,11 +18204,11 @@
   <p:clrMapOvr>
     <a:masterClrMapping/>
   </p:clrMapOvr>
-  <mc:AlternateContent xmlns:mc="http://schemas.openxmlformats.org/markup-compatibility/2006">
-    <mc:Choice xmlns:p14="http://schemas.microsoft.com/office/powerpoint/2010/main" Requires="p14">
+  <mc:AlternateContent xmlns:mc="http://schemas.openxmlformats.org/markup-compatibility/2006" xmlns:p14="http://schemas.microsoft.com/office/powerpoint/2010/main">
+    <mc:Choice Requires="p14">
       <p:transition p14:dur="0"/>
     </mc:Choice>
-    <mc:Fallback>
+    <mc:Fallback xmlns="">
       <p:transition/>
     </mc:Fallback>
   </mc:AlternateContent>
@@ -18928,11 +18928,11 @@
   <p:clrMapOvr>
     <a:masterClrMapping/>
   </p:clrMapOvr>
-  <mc:AlternateContent xmlns:mc="http://schemas.openxmlformats.org/markup-compatibility/2006">
-    <mc:Choice xmlns:p14="http://schemas.microsoft.com/office/powerpoint/2010/main" Requires="p14">
+  <mc:AlternateContent xmlns:mc="http://schemas.openxmlformats.org/markup-compatibility/2006" xmlns:p14="http://schemas.microsoft.com/office/powerpoint/2010/main">
+    <mc:Choice Requires="p14">
       <p:transition p14:dur="0"/>
     </mc:Choice>
-    <mc:Fallback>
+    <mc:Fallback xmlns="">
       <p:transition/>
     </mc:Fallback>
   </mc:AlternateContent>
@@ -19663,11 +19663,11 @@
   <p:clrMapOvr>
     <a:masterClrMapping/>
   </p:clrMapOvr>
-  <mc:AlternateContent xmlns:mc="http://schemas.openxmlformats.org/markup-compatibility/2006">
-    <mc:Choice xmlns:p14="http://schemas.microsoft.com/office/powerpoint/2010/main" Requires="p14">
+  <mc:AlternateContent xmlns:mc="http://schemas.openxmlformats.org/markup-compatibility/2006" xmlns:p14="http://schemas.microsoft.com/office/powerpoint/2010/main">
+    <mc:Choice Requires="p14">
       <p:transition p14:dur="0"/>
     </mc:Choice>
-    <mc:Fallback>
+    <mc:Fallback xmlns="">
       <p:transition/>
     </mc:Fallback>
   </mc:AlternateContent>
@@ -20408,11 +20408,11 @@
   <p:clrMapOvr>
     <a:masterClrMapping/>
   </p:clrMapOvr>
-  <mc:AlternateContent xmlns:mc="http://schemas.openxmlformats.org/markup-compatibility/2006">
-    <mc:Choice xmlns:p14="http://schemas.microsoft.com/office/powerpoint/2010/main" Requires="p14">
+  <mc:AlternateContent xmlns:mc="http://schemas.openxmlformats.org/markup-compatibility/2006" xmlns:p14="http://schemas.microsoft.com/office/powerpoint/2010/main">
+    <mc:Choice Requires="p14">
       <p:transition p14:dur="0"/>
     </mc:Choice>
-    <mc:Fallback>
+    <mc:Fallback xmlns="">
       <p:transition/>
     </mc:Fallback>
   </mc:AlternateContent>
@@ -21053,11 +21053,11 @@
   <p:clrMapOvr>
     <a:masterClrMapping/>
   </p:clrMapOvr>
-  <mc:AlternateContent xmlns:mc="http://schemas.openxmlformats.org/markup-compatibility/2006">
-    <mc:Choice xmlns:p14="http://schemas.microsoft.com/office/powerpoint/2010/main" Requires="p14">
+  <mc:AlternateContent xmlns:mc="http://schemas.openxmlformats.org/markup-compatibility/2006" xmlns:p14="http://schemas.microsoft.com/office/powerpoint/2010/main">
+    <mc:Choice Requires="p14">
       <p:transition p14:dur="0"/>
     </mc:Choice>
-    <mc:Fallback>
+    <mc:Fallback xmlns="">
       <p:transition/>
     </mc:Fallback>
   </mc:AlternateContent>
@@ -21720,11 +21720,11 @@
   <p:clrMapOvr>
     <a:masterClrMapping/>
   </p:clrMapOvr>
-  <mc:AlternateContent xmlns:mc="http://schemas.openxmlformats.org/markup-compatibility/2006">
-    <mc:Choice xmlns:p14="http://schemas.microsoft.com/office/powerpoint/2010/main" Requires="p14">
+  <mc:AlternateContent xmlns:mc="http://schemas.openxmlformats.org/markup-compatibility/2006" xmlns:p14="http://schemas.microsoft.com/office/powerpoint/2010/main">
+    <mc:Choice Requires="p14">
       <p:transition p14:dur="0"/>
     </mc:Choice>
-    <mc:Fallback>
+    <mc:Fallback xmlns="">
       <p:transition/>
     </mc:Fallback>
   </mc:AlternateContent>
@@ -22393,11 +22393,11 @@
   <p:clrMapOvr>
     <a:masterClrMapping/>
   </p:clrMapOvr>
-  <mc:AlternateContent xmlns:mc="http://schemas.openxmlformats.org/markup-compatibility/2006">
-    <mc:Choice xmlns:p14="http://schemas.microsoft.com/office/powerpoint/2010/main" Requires="p14">
+  <mc:AlternateContent xmlns:mc="http://schemas.openxmlformats.org/markup-compatibility/2006" xmlns:p14="http://schemas.microsoft.com/office/powerpoint/2010/main">
+    <mc:Choice Requires="p14">
       <p:transition p14:dur="0"/>
     </mc:Choice>
-    <mc:Fallback>
+    <mc:Fallback xmlns="">
       <p:transition/>
     </mc:Fallback>
   </mc:AlternateContent>
@@ -23072,11 +23072,11 @@
   <p:clrMapOvr>
     <a:masterClrMapping/>
   </p:clrMapOvr>
-  <mc:AlternateContent xmlns:mc="http://schemas.openxmlformats.org/markup-compatibility/2006">
-    <mc:Choice xmlns:p14="http://schemas.microsoft.com/office/powerpoint/2010/main" Requires="p14">
+  <mc:AlternateContent xmlns:mc="http://schemas.openxmlformats.org/markup-compatibility/2006" xmlns:p14="http://schemas.microsoft.com/office/powerpoint/2010/main">
+    <mc:Choice Requires="p14">
       <p:transition p14:dur="0"/>
     </mc:Choice>
-    <mc:Fallback>
+    <mc:Fallback xmlns="">
       <p:transition/>
     </mc:Fallback>
   </mc:AlternateContent>
@@ -23840,11 +23840,11 @@
   <p:clrMapOvr>
     <a:masterClrMapping/>
   </p:clrMapOvr>
-  <mc:AlternateContent xmlns:mc="http://schemas.openxmlformats.org/markup-compatibility/2006">
-    <mc:Choice xmlns:p14="http://schemas.microsoft.com/office/powerpoint/2010/main" Requires="p14">
+  <mc:AlternateContent xmlns:mc="http://schemas.openxmlformats.org/markup-compatibility/2006" xmlns:p14="http://schemas.microsoft.com/office/powerpoint/2010/main">
+    <mc:Choice Requires="p14">
       <p:transition p14:dur="0"/>
     </mc:Choice>
-    <mc:Fallback>
+    <mc:Fallback xmlns="">
       <p:transition/>
     </mc:Fallback>
   </mc:AlternateContent>
@@ -24522,11 +24522,11 @@
   <p:clrMapOvr>
     <a:masterClrMapping/>
   </p:clrMapOvr>
-  <mc:AlternateContent xmlns:mc="http://schemas.openxmlformats.org/markup-compatibility/2006">
-    <mc:Choice xmlns:p14="http://schemas.microsoft.com/office/powerpoint/2010/main" Requires="p14">
+  <mc:AlternateContent xmlns:mc="http://schemas.openxmlformats.org/markup-compatibility/2006" xmlns:p14="http://schemas.microsoft.com/office/powerpoint/2010/main">
+    <mc:Choice Requires="p14">
       <p:transition p14:dur="0"/>
     </mc:Choice>
-    <mc:Fallback>
+    <mc:Fallback xmlns="">
       <p:transition/>
     </mc:Fallback>
   </mc:AlternateContent>
@@ -25255,11 +25255,11 @@
   <p:clrMapOvr>
     <a:masterClrMapping/>
   </p:clrMapOvr>
-  <mc:AlternateContent xmlns:mc="http://schemas.openxmlformats.org/markup-compatibility/2006">
-    <mc:Choice xmlns:p14="http://schemas.microsoft.com/office/powerpoint/2010/main" Requires="p14">
+  <mc:AlternateContent xmlns:mc="http://schemas.openxmlformats.org/markup-compatibility/2006" xmlns:p14="http://schemas.microsoft.com/office/powerpoint/2010/main">
+    <mc:Choice Requires="p14">
       <p:transition p14:dur="0"/>
     </mc:Choice>
-    <mc:Fallback>
+    <mc:Fallback xmlns="">
       <p:transition/>
     </mc:Fallback>
   </mc:AlternateContent>
@@ -25446,11 +25446,11 @@
   <p:clrMapOvr>
     <a:masterClrMapping/>
   </p:clrMapOvr>
-  <mc:AlternateContent xmlns:mc="http://schemas.openxmlformats.org/markup-compatibility/2006">
-    <mc:Choice xmlns:p14="http://schemas.microsoft.com/office/powerpoint/2010/main" Requires="p14">
+  <mc:AlternateContent xmlns:mc="http://schemas.openxmlformats.org/markup-compatibility/2006" xmlns:p14="http://schemas.microsoft.com/office/powerpoint/2010/main">
+    <mc:Choice Requires="p14">
       <p:transition p14:dur="0"/>
     </mc:Choice>
-    <mc:Fallback>
+    <mc:Fallback xmlns="">
       <p:transition/>
     </mc:Fallback>
   </mc:AlternateContent>
@@ -25627,11 +25627,11 @@
   <p:clrMapOvr>
     <a:masterClrMapping/>
   </p:clrMapOvr>
-  <mc:AlternateContent xmlns:mc="http://schemas.openxmlformats.org/markup-compatibility/2006">
-    <mc:Choice xmlns:p14="http://schemas.microsoft.com/office/powerpoint/2010/main" Requires="p14">
+  <mc:AlternateContent xmlns:mc="http://schemas.openxmlformats.org/markup-compatibility/2006" xmlns:p14="http://schemas.microsoft.com/office/powerpoint/2010/main">
+    <mc:Choice Requires="p14">
       <p:transition p14:dur="0"/>
     </mc:Choice>
-    <mc:Fallback>
+    <mc:Fallback xmlns="">
       <p:transition/>
     </mc:Fallback>
   </mc:AlternateContent>
@@ -26335,11 +26335,11 @@
   <p:clrMapOvr>
     <a:masterClrMapping/>
   </p:clrMapOvr>
-  <mc:AlternateContent xmlns:mc="http://schemas.openxmlformats.org/markup-compatibility/2006">
-    <mc:Choice xmlns:p14="http://schemas.microsoft.com/office/powerpoint/2010/main" Requires="p14">
+  <mc:AlternateContent xmlns:mc="http://schemas.openxmlformats.org/markup-compatibility/2006" xmlns:p14="http://schemas.microsoft.com/office/powerpoint/2010/main">
+    <mc:Choice Requires="p14">
       <p:transition p14:dur="0"/>
     </mc:Choice>
-    <mc:Fallback>
+    <mc:Fallback xmlns="">
       <p:transition/>
     </mc:Fallback>
   </mc:AlternateContent>
@@ -27063,11 +27063,11 @@
   <p:clrMapOvr>
     <a:masterClrMapping/>
   </p:clrMapOvr>
-  <mc:AlternateContent xmlns:mc="http://schemas.openxmlformats.org/markup-compatibility/2006">
-    <mc:Choice xmlns:p14="http://schemas.microsoft.com/office/powerpoint/2010/main" Requires="p14">
+  <mc:AlternateContent xmlns:mc="http://schemas.openxmlformats.org/markup-compatibility/2006" xmlns:p14="http://schemas.microsoft.com/office/powerpoint/2010/main">
+    <mc:Choice Requires="p14">
       <p:transition p14:dur="0"/>
     </mc:Choice>
-    <mc:Fallback>
+    <mc:Fallback xmlns="">
       <p:transition/>
     </mc:Fallback>
   </mc:AlternateContent>
@@ -27777,11 +27777,11 @@
   <p:clrMapOvr>
     <a:masterClrMapping/>
   </p:clrMapOvr>
-  <mc:AlternateContent xmlns:mc="http://schemas.openxmlformats.org/markup-compatibility/2006">
-    <mc:Choice xmlns:p14="http://schemas.microsoft.com/office/powerpoint/2010/main" Requires="p14">
+  <mc:AlternateContent xmlns:mc="http://schemas.openxmlformats.org/markup-compatibility/2006" xmlns:p14="http://schemas.microsoft.com/office/powerpoint/2010/main">
+    <mc:Choice Requires="p14">
       <p:transition p14:dur="0"/>
     </mc:Choice>
-    <mc:Fallback>
+    <mc:Fallback xmlns="">
       <p:transition/>
     </mc:Fallback>
   </mc:AlternateContent>
@@ -28491,11 +28491,11 @@
   <p:clrMapOvr>
     <a:masterClrMapping/>
   </p:clrMapOvr>
-  <mc:AlternateContent xmlns:mc="http://schemas.openxmlformats.org/markup-compatibility/2006">
-    <mc:Choice xmlns:p14="http://schemas.microsoft.com/office/powerpoint/2010/main" Requires="p14">
+  <mc:AlternateContent xmlns:mc="http://schemas.openxmlformats.org/markup-compatibility/2006" xmlns:p14="http://schemas.microsoft.com/office/powerpoint/2010/main">
+    <mc:Choice Requires="p14">
       <p:transition p14:dur="0"/>
     </mc:Choice>
-    <mc:Fallback>
+    <mc:Fallback xmlns="">
       <p:transition/>
     </mc:Fallback>
   </mc:AlternateContent>
@@ -29205,11 +29205,11 @@
   <p:clrMapOvr>
     <a:masterClrMapping/>
   </p:clrMapOvr>
-  <mc:AlternateContent xmlns:mc="http://schemas.openxmlformats.org/markup-compatibility/2006">
-    <mc:Choice xmlns:p14="http://schemas.microsoft.com/office/powerpoint/2010/main" Requires="p14">
+  <mc:AlternateContent xmlns:mc="http://schemas.openxmlformats.org/markup-compatibility/2006" xmlns:p14="http://schemas.microsoft.com/office/powerpoint/2010/main">
+    <mc:Choice Requires="p14">
       <p:transition p14:dur="0"/>
     </mc:Choice>
-    <mc:Fallback>
+    <mc:Fallback xmlns="">
       <p:transition/>
     </mc:Fallback>
   </mc:AlternateContent>
@@ -29983,11 +29983,11 @@
   <p:clrMapOvr>
     <a:masterClrMapping/>
   </p:clrMapOvr>
-  <mc:AlternateContent xmlns:mc="http://schemas.openxmlformats.org/markup-compatibility/2006">
-    <mc:Choice xmlns:p14="http://schemas.microsoft.com/office/powerpoint/2010/main" Requires="p14">
+  <mc:AlternateContent xmlns:mc="http://schemas.openxmlformats.org/markup-compatibility/2006" xmlns:p14="http://schemas.microsoft.com/office/powerpoint/2010/main">
+    <mc:Choice Requires="p14">
       <p:transition p14:dur="0"/>
     </mc:Choice>
-    <mc:Fallback>
+    <mc:Fallback xmlns="">
       <p:transition/>
     </mc:Fallback>
   </mc:AlternateContent>
@@ -30107,7 +30107,7 @@
             </a:r>
             <a:r>
               <a:rPr lang="en" dirty="0" smtClean="0"/>
-              <a:t>1239</a:t>
+              <a:t>1941</a:t>
             </a:r>
             <a:endParaRPr lang="en" dirty="0"/>
           </a:p>
@@ -30681,11 +30681,11 @@
   <p:clrMapOvr>
     <a:masterClrMapping/>
   </p:clrMapOvr>
-  <mc:AlternateContent xmlns:mc="http://schemas.openxmlformats.org/markup-compatibility/2006">
-    <mc:Choice xmlns:p14="http://schemas.microsoft.com/office/powerpoint/2010/main" Requires="p14">
+  <mc:AlternateContent xmlns:mc="http://schemas.openxmlformats.org/markup-compatibility/2006" xmlns:p14="http://schemas.microsoft.com/office/powerpoint/2010/main">
+    <mc:Choice Requires="p14">
       <p:transition p14:dur="0"/>
     </mc:Choice>
-    <mc:Fallback>
+    <mc:Fallback xmlns="">
       <p:transition/>
     </mc:Fallback>
   </mc:AlternateContent>
@@ -31395,11 +31395,11 @@
   <p:clrMapOvr>
     <a:masterClrMapping/>
   </p:clrMapOvr>
-  <mc:AlternateContent xmlns:mc="http://schemas.openxmlformats.org/markup-compatibility/2006">
-    <mc:Choice xmlns:p14="http://schemas.microsoft.com/office/powerpoint/2010/main" Requires="p14">
+  <mc:AlternateContent xmlns:mc="http://schemas.openxmlformats.org/markup-compatibility/2006" xmlns:p14="http://schemas.microsoft.com/office/powerpoint/2010/main">
+    <mc:Choice Requires="p14">
       <p:transition p14:dur="0"/>
     </mc:Choice>
-    <mc:Fallback>
+    <mc:Fallback xmlns="">
       <p:transition/>
     </mc:Fallback>
   </mc:AlternateContent>
@@ -32090,11 +32090,11 @@
   <p:clrMapOvr>
     <a:masterClrMapping/>
   </p:clrMapOvr>
-  <mc:AlternateContent xmlns:mc="http://schemas.openxmlformats.org/markup-compatibility/2006">
-    <mc:Choice xmlns:p14="http://schemas.microsoft.com/office/powerpoint/2010/main" Requires="p14">
+  <mc:AlternateContent xmlns:mc="http://schemas.openxmlformats.org/markup-compatibility/2006" xmlns:p14="http://schemas.microsoft.com/office/powerpoint/2010/main">
+    <mc:Choice Requires="p14">
       <p:transition p14:dur="0"/>
     </mc:Choice>
-    <mc:Fallback>
+    <mc:Fallback xmlns="">
       <p:transition/>
     </mc:Fallback>
   </mc:AlternateContent>
@@ -32804,11 +32804,11 @@
   <p:clrMapOvr>
     <a:masterClrMapping/>
   </p:clrMapOvr>
-  <mc:AlternateContent xmlns:mc="http://schemas.openxmlformats.org/markup-compatibility/2006">
-    <mc:Choice xmlns:p14="http://schemas.microsoft.com/office/powerpoint/2010/main" Requires="p14">
+  <mc:AlternateContent xmlns:mc="http://schemas.openxmlformats.org/markup-compatibility/2006" xmlns:p14="http://schemas.microsoft.com/office/powerpoint/2010/main">
+    <mc:Choice Requires="p14">
       <p:transition p14:dur="0"/>
     </mc:Choice>
-    <mc:Fallback>
+    <mc:Fallback xmlns="">
       <p:transition/>
     </mc:Fallback>
   </mc:AlternateContent>
@@ -32973,11 +32973,11 @@
   <p:clrMapOvr>
     <a:masterClrMapping/>
   </p:clrMapOvr>
-  <mc:AlternateContent xmlns:mc="http://schemas.openxmlformats.org/markup-compatibility/2006">
-    <mc:Choice xmlns:p14="http://schemas.microsoft.com/office/powerpoint/2010/main" Requires="p14">
+  <mc:AlternateContent xmlns:mc="http://schemas.openxmlformats.org/markup-compatibility/2006" xmlns:p14="http://schemas.microsoft.com/office/powerpoint/2010/main">
+    <mc:Choice Requires="p14">
       <p:transition p14:dur="0"/>
     </mc:Choice>
-    <mc:Fallback>
+    <mc:Fallback xmlns="">
       <p:transition/>
     </mc:Fallback>
   </mc:AlternateContent>
@@ -33690,11 +33690,11 @@
   <p:clrMapOvr>
     <a:masterClrMapping/>
   </p:clrMapOvr>
-  <mc:AlternateContent xmlns:mc="http://schemas.openxmlformats.org/markup-compatibility/2006">
-    <mc:Choice xmlns:p14="http://schemas.microsoft.com/office/powerpoint/2010/main" Requires="p14">
+  <mc:AlternateContent xmlns:mc="http://schemas.openxmlformats.org/markup-compatibility/2006" xmlns:p14="http://schemas.microsoft.com/office/powerpoint/2010/main">
+    <mc:Choice Requires="p14">
       <p:transition p14:dur="0"/>
     </mc:Choice>
-    <mc:Fallback>
+    <mc:Fallback xmlns="">
       <p:transition/>
     </mc:Fallback>
   </mc:AlternateContent>
@@ -33867,11 +33867,11 @@
   <p:clrMapOvr>
     <a:masterClrMapping/>
   </p:clrMapOvr>
-  <mc:AlternateContent xmlns:mc="http://schemas.openxmlformats.org/markup-compatibility/2006">
-    <mc:Choice xmlns:p14="http://schemas.microsoft.com/office/powerpoint/2010/main" Requires="p14">
+  <mc:AlternateContent xmlns:mc="http://schemas.openxmlformats.org/markup-compatibility/2006" xmlns:p14="http://schemas.microsoft.com/office/powerpoint/2010/main">
+    <mc:Choice Requires="p14">
       <p:transition p14:dur="0"/>
     </mc:Choice>
-    <mc:Fallback>
+    <mc:Fallback xmlns="">
       <p:transition/>
     </mc:Fallback>
   </mc:AlternateContent>
@@ -34596,11 +34596,11 @@
   <p:clrMapOvr>
     <a:masterClrMapping/>
   </p:clrMapOvr>
-  <mc:AlternateContent xmlns:mc="http://schemas.openxmlformats.org/markup-compatibility/2006">
-    <mc:Choice xmlns:p14="http://schemas.microsoft.com/office/powerpoint/2010/main" Requires="p14">
+  <mc:AlternateContent xmlns:mc="http://schemas.openxmlformats.org/markup-compatibility/2006" xmlns:p14="http://schemas.microsoft.com/office/powerpoint/2010/main">
+    <mc:Choice Requires="p14">
       <p:transition p14:dur="0"/>
     </mc:Choice>
-    <mc:Fallback>
+    <mc:Fallback xmlns="">
       <p:transition/>
     </mc:Fallback>
   </mc:AlternateContent>
@@ -35498,11 +35498,11 @@
   <p:clrMapOvr>
     <a:masterClrMapping/>
   </p:clrMapOvr>
-  <mc:AlternateContent xmlns:mc="http://schemas.openxmlformats.org/markup-compatibility/2006">
-    <mc:Choice xmlns:p14="http://schemas.microsoft.com/office/powerpoint/2010/main" Requires="p14">
+  <mc:AlternateContent xmlns:mc="http://schemas.openxmlformats.org/markup-compatibility/2006" xmlns:p14="http://schemas.microsoft.com/office/powerpoint/2010/main">
+    <mc:Choice Requires="p14">
       <p:transition p14:dur="0"/>
     </mc:Choice>
-    <mc:Fallback>
+    <mc:Fallback xmlns="">
       <p:transition/>
     </mc:Fallback>
   </mc:AlternateContent>
@@ -35653,7 +35653,7 @@
               <a:rPr lang="en" dirty="0" smtClean="0">
                 <a:sym typeface="Wingdings" pitchFamily="2" charset="2"/>
               </a:rPr>
-              <a:t>716</a:t>
+              <a:t>843</a:t>
             </a:r>
             <a:endParaRPr lang="en" dirty="0"/>
           </a:p>
@@ -35672,8 +35672,13 @@
             </a:r>
             <a:r>
               <a:rPr lang="en" dirty="0" smtClean="0"/>
-              <a:t>Game		     283</a:t>
+              <a:t>Game		     </a:t>
             </a:r>
+            <a:r>
+              <a:rPr lang="en" dirty="0" smtClean="0"/>
+              <a:t>511</a:t>
+            </a:r>
+            <a:endParaRPr lang="en" dirty="0" smtClean="0"/>
           </a:p>
           <a:p>
             <a:pPr marL="228600" lvl="0">
@@ -35686,7 +35691,13 @@
               <a:rPr lang="en" dirty="0" smtClean="0">
                 <a:sym typeface="Wingdings" pitchFamily="2" charset="2"/>
               </a:rPr>
-              <a:t> Gui		     240</a:t>
+              <a:t> Gui		     </a:t>
+            </a:r>
+            <a:r>
+              <a:rPr lang="en" dirty="0" smtClean="0">
+                <a:sym typeface="Wingdings" pitchFamily="2" charset="2"/>
+              </a:rPr>
+              <a:t>587</a:t>
             </a:r>
             <a:endParaRPr lang="en" dirty="0"/>
           </a:p>
@@ -36260,11 +36271,11 @@
   <p:clrMapOvr>
     <a:masterClrMapping/>
   </p:clrMapOvr>
-  <mc:AlternateContent xmlns:mc="http://schemas.openxmlformats.org/markup-compatibility/2006">
-    <mc:Choice xmlns:p14="http://schemas.microsoft.com/office/powerpoint/2010/main" Requires="p14">
+  <mc:AlternateContent xmlns:mc="http://schemas.openxmlformats.org/markup-compatibility/2006" xmlns:p14="http://schemas.microsoft.com/office/powerpoint/2010/main">
+    <mc:Choice Requires="p14">
       <p:transition p14:dur="0"/>
     </mc:Choice>
-    <mc:Fallback>
+    <mc:Fallback xmlns="">
       <p:transition/>
     </mc:Fallback>
   </mc:AlternateContent>
@@ -36384,8 +36395,13 @@
             </a:r>
             <a:r>
               <a:rPr lang="en" dirty="0" smtClean="0"/>
-              <a:t> 1239</a:t>
+              <a:t> </a:t>
             </a:r>
+            <a:r>
+              <a:rPr lang="en" dirty="0" smtClean="0"/>
+              <a:t>1941</a:t>
+            </a:r>
+            <a:endParaRPr lang="en" dirty="0" smtClean="0"/>
           </a:p>
           <a:p>
             <a:pPr marL="457200" lvl="0" indent="-228600" rtl="0">
@@ -36405,8 +36421,13 @@
             </a:r>
             <a:r>
               <a:rPr lang="en" dirty="0" smtClean="0"/>
-              <a:t> 431</a:t>
+              <a:t> </a:t>
             </a:r>
+            <a:r>
+              <a:rPr lang="en" dirty="0" smtClean="0"/>
+              <a:t>854</a:t>
+            </a:r>
+            <a:endParaRPr lang="en" dirty="0" smtClean="0"/>
           </a:p>
           <a:p>
             <a:pPr marL="457200" lvl="0" indent="-228600" rtl="0">
@@ -36426,8 +36447,13 @@
             </a:r>
             <a:r>
               <a:rPr lang="en" dirty="0" smtClean="0"/>
-              <a:t> 118</a:t>
+              <a:t> </a:t>
             </a:r>
+            <a:r>
+              <a:rPr lang="en" dirty="0" smtClean="0"/>
+              <a:t>152</a:t>
+            </a:r>
+            <a:endParaRPr lang="en" dirty="0" smtClean="0"/>
           </a:p>
           <a:p>
             <a:pPr marL="457200" lvl="0" indent="-228600" rtl="0">
@@ -36447,8 +36473,13 @@
             </a:r>
             <a:r>
               <a:rPr lang="en" dirty="0" smtClean="0"/>
-              <a:t> 38</a:t>
+              <a:t> </a:t>
             </a:r>
+            <a:r>
+              <a:rPr lang="en" dirty="0" smtClean="0"/>
+              <a:t>48</a:t>
+            </a:r>
+            <a:endParaRPr lang="en" dirty="0" smtClean="0"/>
           </a:p>
           <a:p>
             <a:pPr marL="457200" lvl="0" indent="-228600" rtl="0">
@@ -36468,8 +36499,13 @@
             </a:r>
             <a:r>
               <a:rPr lang="en" dirty="0" smtClean="0"/>
-              <a:t> 37</a:t>
+              <a:t> </a:t>
             </a:r>
+            <a:r>
+              <a:rPr lang="en" dirty="0" smtClean="0"/>
+              <a:t>44</a:t>
+            </a:r>
+            <a:endParaRPr lang="en" dirty="0" smtClean="0"/>
           </a:p>
           <a:p>
             <a:pPr marL="457200" lvl="0" indent="-228600" rtl="0">
@@ -37059,11 +37095,11 @@
   <p:clrMapOvr>
     <a:masterClrMapping/>
   </p:clrMapOvr>
-  <mc:AlternateContent xmlns:mc="http://schemas.openxmlformats.org/markup-compatibility/2006">
-    <mc:Choice xmlns:p14="http://schemas.microsoft.com/office/powerpoint/2010/main" Requires="p14">
+  <mc:AlternateContent xmlns:mc="http://schemas.openxmlformats.org/markup-compatibility/2006" xmlns:p14="http://schemas.microsoft.com/office/powerpoint/2010/main">
+    <mc:Choice Requires="p14">
       <p:transition p14:dur="0"/>
     </mc:Choice>
-    <mc:Fallback>
+    <mc:Fallback xmlns="">
       <p:transition/>
     </mc:Fallback>
   </mc:AlternateContent>
@@ -37183,8 +37219,13 @@
             </a:r>
             <a:r>
               <a:rPr lang="en" dirty="0" smtClean="0"/>
-              <a:t> 259</a:t>
+              <a:t> </a:t>
             </a:r>
+            <a:r>
+              <a:rPr lang="en" dirty="0" smtClean="0"/>
+              <a:t>308</a:t>
+            </a:r>
+            <a:endParaRPr lang="en" dirty="0" smtClean="0"/>
           </a:p>
           <a:p>
             <a:pPr marL="457200" lvl="0" indent="-228600" rtl="0">
@@ -37204,7 +37245,15 @@
             </a:r>
             <a:r>
               <a:rPr lang="en" dirty="0" smtClean="0"/>
-              <a:t> 82,9%</a:t>
+              <a:t> </a:t>
+            </a:r>
+            <a:r>
+              <a:rPr lang="en" dirty="0" smtClean="0"/>
+              <a:t>78.9</a:t>
+            </a:r>
+            <a:r>
+              <a:rPr lang="en" dirty="0" smtClean="0"/>
+              <a:t>%</a:t>
             </a:r>
           </a:p>
           <a:p>
@@ -37225,8 +37274,13 @@
             </a:r>
             <a:r>
               <a:rPr lang="en" dirty="0" smtClean="0"/>
-              <a:t> 19</a:t>
+              <a:t> </a:t>
             </a:r>
+            <a:r>
+              <a:rPr lang="en" dirty="0" smtClean="0"/>
+              <a:t>30</a:t>
+            </a:r>
+            <a:endParaRPr lang="en" dirty="0" smtClean="0"/>
           </a:p>
           <a:p>
             <a:pPr marL="457200" lvl="0" indent="-228600" rtl="0">
@@ -37248,7 +37302,19 @@
               <a:rPr lang="en" dirty="0" smtClean="0">
                 <a:sym typeface="Wingdings" pitchFamily="2" charset="2"/>
               </a:rPr>
-              <a:t> 17.3% Comments</a:t>
+              <a:t> </a:t>
+            </a:r>
+            <a:r>
+              <a:rPr lang="en" dirty="0" smtClean="0">
+                <a:sym typeface="Wingdings" pitchFamily="2" charset="2"/>
+              </a:rPr>
+              <a:t>13.7% </a:t>
+            </a:r>
+            <a:r>
+              <a:rPr lang="en" dirty="0" smtClean="0">
+                <a:sym typeface="Wingdings" pitchFamily="2" charset="2"/>
+              </a:rPr>
+              <a:t>Comments</a:t>
             </a:r>
             <a:endParaRPr lang="en" dirty="0"/>
           </a:p>
@@ -37822,11 +37888,11 @@
   <p:clrMapOvr>
     <a:masterClrMapping/>
   </p:clrMapOvr>
-  <mc:AlternateContent xmlns:mc="http://schemas.openxmlformats.org/markup-compatibility/2006">
-    <mc:Choice xmlns:p14="http://schemas.microsoft.com/office/powerpoint/2010/main" Requires="p14">
+  <mc:AlternateContent xmlns:mc="http://schemas.openxmlformats.org/markup-compatibility/2006" xmlns:p14="http://schemas.microsoft.com/office/powerpoint/2010/main">
+    <mc:Choice Requires="p14">
       <p:transition p14:dur="0"/>
     </mc:Choice>
-    <mc:Fallback>
+    <mc:Fallback xmlns="">
       <p:transition/>
     </mc:Fallback>
   </mc:AlternateContent>
@@ -38000,11 +38066,11 @@
   <p:clrMapOvr>
     <a:masterClrMapping/>
   </p:clrMapOvr>
-  <mc:AlternateContent xmlns:mc="http://schemas.openxmlformats.org/markup-compatibility/2006">
-    <mc:Choice xmlns:p14="http://schemas.microsoft.com/office/powerpoint/2010/main" Requires="p14">
+  <mc:AlternateContent xmlns:mc="http://schemas.openxmlformats.org/markup-compatibility/2006" xmlns:p14="http://schemas.microsoft.com/office/powerpoint/2010/main">
+    <mc:Choice Requires="p14">
       <p:transition p14:dur="0"/>
     </mc:Choice>
-    <mc:Fallback>
+    <mc:Fallback xmlns="">
       <p:transition/>
     </mc:Fallback>
   </mc:AlternateContent>
@@ -38706,11 +38772,11 @@
   <p:clrMapOvr>
     <a:masterClrMapping/>
   </p:clrMapOvr>
-  <mc:AlternateContent xmlns:mc="http://schemas.openxmlformats.org/markup-compatibility/2006">
-    <mc:Choice xmlns:p14="http://schemas.microsoft.com/office/powerpoint/2010/main" Requires="p14">
+  <mc:AlternateContent xmlns:mc="http://schemas.openxmlformats.org/markup-compatibility/2006" xmlns:p14="http://schemas.microsoft.com/office/powerpoint/2010/main">
+    <mc:Choice Requires="p14">
       <p:transition p14:dur="0"/>
     </mc:Choice>
-    <mc:Fallback>
+    <mc:Fallback xmlns="">
       <p:transition/>
     </mc:Fallback>
   </mc:AlternateContent>

</xml_diff>

<commit_message>
Added Arbeitsaufteilung to presentation
</commit_message>
<xml_diff>
--- a/Presentation/Presentation.pptx
+++ b/Presentation/Presentation.pptx
@@ -5,7 +5,7 @@
     <p:sldMasterId id="2147483658" r:id="rId1"/>
   </p:sldMasterIdLst>
   <p:notesMasterIdLst>
-    <p:notesMasterId r:id="rId49"/>
+    <p:notesMasterId r:id="rId50"/>
   </p:notesMasterIdLst>
   <p:sldIdLst>
     <p:sldId id="256" r:id="rId2"/>
@@ -52,26 +52,27 @@
     <p:sldId id="284" r:id="rId43"/>
     <p:sldId id="265" r:id="rId44"/>
     <p:sldId id="266" r:id="rId45"/>
-    <p:sldId id="267" r:id="rId46"/>
-    <p:sldId id="268" r:id="rId47"/>
-    <p:sldId id="269" r:id="rId48"/>
+    <p:sldId id="315" r:id="rId46"/>
+    <p:sldId id="267" r:id="rId47"/>
+    <p:sldId id="268" r:id="rId48"/>
+    <p:sldId id="269" r:id="rId49"/>
   </p:sldIdLst>
   <p:sldSz cx="9144000" cy="5143500" type="screen16x9"/>
   <p:notesSz cx="6858000" cy="9144000"/>
   <p:embeddedFontLst>
     <p:embeddedFont>
-      <p:font typeface="Lora" charset="0"/>
-      <p:regular r:id="rId50"/>
-      <p:bold r:id="rId51"/>
-      <p:italic r:id="rId52"/>
-      <p:boldItalic r:id="rId53"/>
+      <p:font typeface="Quattrocento Sans" charset="0"/>
+      <p:regular r:id="rId51"/>
+      <p:bold r:id="rId52"/>
+      <p:italic r:id="rId53"/>
+      <p:boldItalic r:id="rId54"/>
     </p:embeddedFont>
     <p:embeddedFont>
-      <p:font typeface="Quattrocento Sans" charset="0"/>
-      <p:regular r:id="rId54"/>
-      <p:bold r:id="rId55"/>
-      <p:italic r:id="rId56"/>
-      <p:boldItalic r:id="rId57"/>
+      <p:font typeface="Lora" charset="0"/>
+      <p:regular r:id="rId55"/>
+      <p:bold r:id="rId56"/>
+      <p:italic r:id="rId57"/>
+      <p:boldItalic r:id="rId58"/>
     </p:embeddedFont>
   </p:embeddedFontLst>
   <p:defaultTextStyle>
@@ -4621,6 +4622,107 @@
   <p:cSld>
     <p:spTree>
       <p:nvGrpSpPr>
+        <p:cNvPr id="1" name="Shape 107"/>
+        <p:cNvGrpSpPr/>
+        <p:nvPr/>
+      </p:nvGrpSpPr>
+      <p:grpSpPr>
+        <a:xfrm>
+          <a:off x="0" y="0"/>
+          <a:ext cx="0" cy="0"/>
+          <a:chOff x="0" y="0"/>
+          <a:chExt cx="0" cy="0"/>
+        </a:xfrm>
+      </p:grpSpPr>
+      <p:sp>
+        <p:nvSpPr>
+          <p:cNvPr id="108" name="Shape 108"/>
+          <p:cNvSpPr>
+            <a:spLocks noGrp="1" noRot="1" noChangeAspect="1"/>
+          </p:cNvSpPr>
+          <p:nvPr>
+            <p:ph type="sldImg" idx="2"/>
+          </p:nvPr>
+        </p:nvSpPr>
+        <p:spPr>
+          <a:xfrm>
+            <a:off x="381000" y="685800"/>
+            <a:ext cx="6096000" cy="3429000"/>
+          </a:xfrm>
+          <a:custGeom>
+            <a:avLst/>
+            <a:gdLst/>
+            <a:ahLst/>
+            <a:cxnLst/>
+            <a:rect l="0" t="0" r="0" b="0"/>
+            <a:pathLst>
+              <a:path w="120000" h="120000" extrusionOk="0">
+                <a:moveTo>
+                  <a:pt x="0" y="0"/>
+                </a:moveTo>
+                <a:lnTo>
+                  <a:pt x="120000" y="0"/>
+                </a:lnTo>
+                <a:lnTo>
+                  <a:pt x="120000" y="120000"/>
+                </a:lnTo>
+                <a:lnTo>
+                  <a:pt x="0" y="120000"/>
+                </a:lnTo>
+                <a:close/>
+              </a:path>
+            </a:pathLst>
+          </a:custGeom>
+        </p:spPr>
+      </p:sp>
+      <p:sp>
+        <p:nvSpPr>
+          <p:cNvPr id="109" name="Shape 109"/>
+          <p:cNvSpPr txBox="1">
+            <a:spLocks noGrp="1"/>
+          </p:cNvSpPr>
+          <p:nvPr>
+            <p:ph type="body" idx="1"/>
+          </p:nvPr>
+        </p:nvSpPr>
+        <p:spPr>
+          <a:xfrm>
+            <a:off x="685800" y="4343400"/>
+            <a:ext cx="5486399" cy="4114800"/>
+          </a:xfrm>
+          <a:prstGeom prst="rect">
+            <a:avLst/>
+          </a:prstGeom>
+        </p:spPr>
+        <p:txBody>
+          <a:bodyPr lIns="91425" tIns="91425" rIns="91425" bIns="91425" anchor="t" anchorCtr="0">
+            <a:noAutofit/>
+          </a:bodyPr>
+          <a:lstStyle/>
+          <a:p>
+            <a:pPr lvl="0">
+              <a:spcBef>
+                <a:spcPts val="0"/>
+              </a:spcBef>
+              <a:buNone/>
+            </a:pPr>
+            <a:endParaRPr dirty="0"/>
+          </a:p>
+        </p:txBody>
+      </p:sp>
+    </p:spTree>
+  </p:cSld>
+  <p:clrMapOvr>
+    <a:masterClrMapping/>
+  </p:clrMapOvr>
+</p:notes>
+</file>
+
+<file path=ppt/notesSlides/notesSlide46.xml><?xml version="1.0" encoding="utf-8"?>
+<p:notes xmlns:a="http://schemas.openxmlformats.org/drawingml/2006/main" xmlns:r="http://schemas.openxmlformats.org/officeDocument/2006/relationships" xmlns:p="http://schemas.openxmlformats.org/presentationml/2006/main" showMasterSp="0" showMasterPhAnim="0">
+  <p:cSld>
+    <p:spTree>
+      <p:nvGrpSpPr>
         <p:cNvPr id="1" name="Shape 95"/>
         <p:cNvGrpSpPr/>
         <p:nvPr/>
@@ -4717,7 +4819,7 @@
 </p:notes>
 </file>
 
-<file path=ppt/notesSlides/notesSlide46.xml><?xml version="1.0" encoding="utf-8"?>
+<file path=ppt/notesSlides/notesSlide47.xml><?xml version="1.0" encoding="utf-8"?>
 <p:notes xmlns:a="http://schemas.openxmlformats.org/drawingml/2006/main" xmlns:r="http://schemas.openxmlformats.org/officeDocument/2006/relationships" xmlns:p="http://schemas.openxmlformats.org/presentationml/2006/main" showMasterSp="0" showMasterPhAnim="0">
   <p:cSld>
     <p:spTree>
@@ -4818,7 +4920,7 @@
 </p:notes>
 </file>
 
-<file path=ppt/notesSlides/notesSlide47.xml><?xml version="1.0" encoding="utf-8"?>
+<file path=ppt/notesSlides/notesSlide48.xml><?xml version="1.0" encoding="utf-8"?>
 <p:notes xmlns:a="http://schemas.openxmlformats.org/drawingml/2006/main" xmlns:r="http://schemas.openxmlformats.org/officeDocument/2006/relationships" xmlns:p="http://schemas.openxmlformats.org/presentationml/2006/main" showMasterSp="0" showMasterPhAnim="0">
   <p:cSld>
     <p:spTree>
@@ -33713,6 +33815,1439 @@
   <p:cSld>
     <p:spTree>
       <p:nvGrpSpPr>
+        <p:cNvPr id="1" name="Shape 110"/>
+        <p:cNvGrpSpPr/>
+        <p:nvPr/>
+      </p:nvGrpSpPr>
+      <p:grpSpPr>
+        <a:xfrm>
+          <a:off x="0" y="0"/>
+          <a:ext cx="0" cy="0"/>
+          <a:chOff x="0" y="0"/>
+          <a:chExt cx="0" cy="0"/>
+        </a:xfrm>
+      </p:grpSpPr>
+      <p:sp>
+        <p:nvSpPr>
+          <p:cNvPr id="111" name="Shape 111"/>
+          <p:cNvSpPr txBox="1">
+            <a:spLocks noGrp="1"/>
+          </p:cNvSpPr>
+          <p:nvPr>
+            <p:ph type="title"/>
+          </p:nvPr>
+        </p:nvSpPr>
+        <p:spPr>
+          <a:xfrm>
+            <a:off x="1381250" y="922668"/>
+            <a:ext cx="3878399" cy="435599"/>
+          </a:xfrm>
+          <a:prstGeom prst="rect">
+            <a:avLst/>
+          </a:prstGeom>
+        </p:spPr>
+        <p:txBody>
+          <a:bodyPr lIns="91425" tIns="91425" rIns="91425" bIns="91425" anchor="ctr" anchorCtr="0">
+            <a:noAutofit/>
+          </a:bodyPr>
+          <a:lstStyle/>
+          <a:p>
+            <a:pPr lvl="0">
+              <a:spcBef>
+                <a:spcPts val="0"/>
+              </a:spcBef>
+              <a:buNone/>
+            </a:pPr>
+            <a:r>
+              <a:rPr lang="en" dirty="0" smtClean="0">
+                <a:highlight>
+                  <a:srgbClr val="FFCD00"/>
+                </a:highlight>
+              </a:rPr>
+              <a:t>Arbeitsaufteilung</a:t>
+            </a:r>
+            <a:endParaRPr lang="en" dirty="0">
+              <a:highlight>
+                <a:srgbClr val="FFCD00"/>
+              </a:highlight>
+            </a:endParaRPr>
+          </a:p>
+        </p:txBody>
+      </p:sp>
+      <p:grpSp>
+        <p:nvGrpSpPr>
+          <p:cNvPr id="113" name="Shape 113"/>
+          <p:cNvGrpSpPr/>
+          <p:nvPr/>
+        </p:nvGrpSpPr>
+        <p:grpSpPr>
+          <a:xfrm>
+            <a:off x="916458" y="1019750"/>
+            <a:ext cx="214624" cy="214624"/>
+            <a:chOff x="2594050" y="1631825"/>
+            <a:chExt cx="439625" cy="439625"/>
+          </a:xfrm>
+        </p:grpSpPr>
+        <p:sp>
+          <p:nvSpPr>
+            <p:cNvPr id="114" name="Shape 114"/>
+            <p:cNvSpPr/>
+            <p:nvPr/>
+          </p:nvSpPr>
+          <p:spPr>
+            <a:xfrm>
+              <a:off x="2594050" y="1883300"/>
+              <a:ext cx="188175" cy="188150"/>
+            </a:xfrm>
+            <a:custGeom>
+              <a:avLst/>
+              <a:gdLst/>
+              <a:ahLst/>
+              <a:cxnLst/>
+              <a:rect l="0" t="0" r="0" b="0"/>
+              <a:pathLst>
+                <a:path w="7527" h="7526" fill="none" extrusionOk="0">
+                  <a:moveTo>
+                    <a:pt x="5992" y="0"/>
+                  </a:moveTo>
+                  <a:lnTo>
+                    <a:pt x="537" y="6430"/>
+                  </a:lnTo>
+                  <a:lnTo>
+                    <a:pt x="1" y="7526"/>
+                  </a:lnTo>
+                  <a:lnTo>
+                    <a:pt x="1097" y="6990"/>
+                  </a:lnTo>
+                  <a:lnTo>
+                    <a:pt x="7526" y="1534"/>
+                  </a:lnTo>
+                  <a:lnTo>
+                    <a:pt x="5992" y="0"/>
+                  </a:lnTo>
+                  <a:close/>
+                </a:path>
+              </a:pathLst>
+            </a:custGeom>
+            <a:noFill/>
+            <a:ln w="9525" cap="rnd" cmpd="sng">
+              <a:solidFill>
+                <a:srgbClr val="000000"/>
+              </a:solidFill>
+              <a:prstDash val="solid"/>
+              <a:round/>
+              <a:headEnd type="none" w="med" len="med"/>
+              <a:tailEnd type="none" w="med" len="med"/>
+            </a:ln>
+          </p:spPr>
+          <p:txBody>
+            <a:bodyPr lIns="91425" tIns="91425" rIns="91425" bIns="91425" anchor="ctr" anchorCtr="0">
+              <a:noAutofit/>
+            </a:bodyPr>
+            <a:lstStyle/>
+            <a:p>
+              <a:pPr lvl="0">
+                <a:spcBef>
+                  <a:spcPts val="0"/>
+                </a:spcBef>
+                <a:buNone/>
+              </a:pPr>
+              <a:endParaRPr/>
+            </a:p>
+          </p:txBody>
+        </p:sp>
+        <p:sp>
+          <p:nvSpPr>
+            <p:cNvPr id="115" name="Shape 115"/>
+            <p:cNvSpPr/>
+            <p:nvPr/>
+          </p:nvSpPr>
+          <p:spPr>
+            <a:xfrm>
+              <a:off x="2857700" y="1631825"/>
+              <a:ext cx="175975" cy="176000"/>
+            </a:xfrm>
+            <a:custGeom>
+              <a:avLst/>
+              <a:gdLst/>
+              <a:ahLst/>
+              <a:cxnLst/>
+              <a:rect l="0" t="0" r="0" b="0"/>
+              <a:pathLst>
+                <a:path w="7039" h="7040" fill="none" extrusionOk="0">
+                  <a:moveTo>
+                    <a:pt x="268" y="2704"/>
+                  </a:moveTo>
+                  <a:lnTo>
+                    <a:pt x="4336" y="6771"/>
+                  </a:lnTo>
+                  <a:lnTo>
+                    <a:pt x="4336" y="6771"/>
+                  </a:lnTo>
+                  <a:lnTo>
+                    <a:pt x="4336" y="6771"/>
+                  </a:lnTo>
+                  <a:lnTo>
+                    <a:pt x="4652" y="6917"/>
+                  </a:lnTo>
+                  <a:lnTo>
+                    <a:pt x="4993" y="7015"/>
+                  </a:lnTo>
+                  <a:lnTo>
+                    <a:pt x="5310" y="7039"/>
+                  </a:lnTo>
+                  <a:lnTo>
+                    <a:pt x="5651" y="7039"/>
+                  </a:lnTo>
+                  <a:lnTo>
+                    <a:pt x="5992" y="6966"/>
+                  </a:lnTo>
+                  <a:lnTo>
+                    <a:pt x="6308" y="6844"/>
+                  </a:lnTo>
+                  <a:lnTo>
+                    <a:pt x="6454" y="6747"/>
+                  </a:lnTo>
+                  <a:lnTo>
+                    <a:pt x="6601" y="6674"/>
+                  </a:lnTo>
+                  <a:lnTo>
+                    <a:pt x="6747" y="6552"/>
+                  </a:lnTo>
+                  <a:lnTo>
+                    <a:pt x="6893" y="6430"/>
+                  </a:lnTo>
+                  <a:lnTo>
+                    <a:pt x="6893" y="6430"/>
+                  </a:lnTo>
+                  <a:lnTo>
+                    <a:pt x="6942" y="6357"/>
+                  </a:lnTo>
+                  <a:lnTo>
+                    <a:pt x="7015" y="6260"/>
+                  </a:lnTo>
+                  <a:lnTo>
+                    <a:pt x="7039" y="6138"/>
+                  </a:lnTo>
+                  <a:lnTo>
+                    <a:pt x="7039" y="6041"/>
+                  </a:lnTo>
+                  <a:lnTo>
+                    <a:pt x="7039" y="6041"/>
+                  </a:lnTo>
+                  <a:lnTo>
+                    <a:pt x="7039" y="5943"/>
+                  </a:lnTo>
+                  <a:lnTo>
+                    <a:pt x="7015" y="5846"/>
+                  </a:lnTo>
+                  <a:lnTo>
+                    <a:pt x="6942" y="5748"/>
+                  </a:lnTo>
+                  <a:lnTo>
+                    <a:pt x="6893" y="5651"/>
+                  </a:lnTo>
+                  <a:lnTo>
+                    <a:pt x="1389" y="147"/>
+                  </a:lnTo>
+                  <a:lnTo>
+                    <a:pt x="1389" y="147"/>
+                  </a:lnTo>
+                  <a:lnTo>
+                    <a:pt x="1291" y="98"/>
+                  </a:lnTo>
+                  <a:lnTo>
+                    <a:pt x="1194" y="25"/>
+                  </a:lnTo>
+                  <a:lnTo>
+                    <a:pt x="1096" y="0"/>
+                  </a:lnTo>
+                  <a:lnTo>
+                    <a:pt x="999" y="0"/>
+                  </a:lnTo>
+                  <a:lnTo>
+                    <a:pt x="999" y="0"/>
+                  </a:lnTo>
+                  <a:lnTo>
+                    <a:pt x="902" y="0"/>
+                  </a:lnTo>
+                  <a:lnTo>
+                    <a:pt x="780" y="25"/>
+                  </a:lnTo>
+                  <a:lnTo>
+                    <a:pt x="682" y="98"/>
+                  </a:lnTo>
+                  <a:lnTo>
+                    <a:pt x="609" y="147"/>
+                  </a:lnTo>
+                  <a:lnTo>
+                    <a:pt x="609" y="147"/>
+                  </a:lnTo>
+                  <a:lnTo>
+                    <a:pt x="487" y="293"/>
+                  </a:lnTo>
+                  <a:lnTo>
+                    <a:pt x="366" y="439"/>
+                  </a:lnTo>
+                  <a:lnTo>
+                    <a:pt x="293" y="585"/>
+                  </a:lnTo>
+                  <a:lnTo>
+                    <a:pt x="195" y="731"/>
+                  </a:lnTo>
+                  <a:lnTo>
+                    <a:pt x="73" y="1048"/>
+                  </a:lnTo>
+                  <a:lnTo>
+                    <a:pt x="0" y="1389"/>
+                  </a:lnTo>
+                  <a:lnTo>
+                    <a:pt x="0" y="1730"/>
+                  </a:lnTo>
+                  <a:lnTo>
+                    <a:pt x="25" y="2046"/>
+                  </a:lnTo>
+                  <a:lnTo>
+                    <a:pt x="122" y="2387"/>
+                  </a:lnTo>
+                  <a:lnTo>
+                    <a:pt x="268" y="2704"/>
+                  </a:lnTo>
+                  <a:lnTo>
+                    <a:pt x="268" y="2704"/>
+                  </a:lnTo>
+                  <a:close/>
+                </a:path>
+              </a:pathLst>
+            </a:custGeom>
+            <a:noFill/>
+            <a:ln w="9525" cap="rnd" cmpd="sng">
+              <a:solidFill>
+                <a:srgbClr val="000000"/>
+              </a:solidFill>
+              <a:prstDash val="solid"/>
+              <a:round/>
+              <a:headEnd type="none" w="med" len="med"/>
+              <a:tailEnd type="none" w="med" len="med"/>
+            </a:ln>
+          </p:spPr>
+          <p:txBody>
+            <a:bodyPr lIns="91425" tIns="91425" rIns="91425" bIns="91425" anchor="ctr" anchorCtr="0">
+              <a:noAutofit/>
+            </a:bodyPr>
+            <a:lstStyle/>
+            <a:p>
+              <a:pPr lvl="0">
+                <a:spcBef>
+                  <a:spcPts val="0"/>
+                </a:spcBef>
+                <a:buNone/>
+              </a:pPr>
+              <a:endParaRPr/>
+            </a:p>
+          </p:txBody>
+        </p:sp>
+        <p:sp>
+          <p:nvSpPr>
+            <p:cNvPr id="116" name="Shape 116"/>
+            <p:cNvSpPr/>
+            <p:nvPr/>
+          </p:nvSpPr>
+          <p:spPr>
+            <a:xfrm>
+              <a:off x="2662850" y="1699400"/>
+              <a:ext cx="303250" cy="303250"/>
+            </a:xfrm>
+            <a:custGeom>
+              <a:avLst/>
+              <a:gdLst/>
+              <a:ahLst/>
+              <a:cxnLst/>
+              <a:rect l="0" t="0" r="0" b="0"/>
+              <a:pathLst>
+                <a:path w="12130" h="12130" fill="none" extrusionOk="0">
+                  <a:moveTo>
+                    <a:pt x="8038" y="1"/>
+                  </a:moveTo>
+                  <a:lnTo>
+                    <a:pt x="4872" y="3191"/>
+                  </a:lnTo>
+                  <a:lnTo>
+                    <a:pt x="4872" y="3191"/>
+                  </a:lnTo>
+                  <a:lnTo>
+                    <a:pt x="4628" y="3094"/>
+                  </a:lnTo>
+                  <a:lnTo>
+                    <a:pt x="4385" y="2997"/>
+                  </a:lnTo>
+                  <a:lnTo>
+                    <a:pt x="4092" y="2899"/>
+                  </a:lnTo>
+                  <a:lnTo>
+                    <a:pt x="3800" y="2850"/>
+                  </a:lnTo>
+                  <a:lnTo>
+                    <a:pt x="3484" y="2777"/>
+                  </a:lnTo>
+                  <a:lnTo>
+                    <a:pt x="3167" y="2729"/>
+                  </a:lnTo>
+                  <a:lnTo>
+                    <a:pt x="2850" y="2704"/>
+                  </a:lnTo>
+                  <a:lnTo>
+                    <a:pt x="2534" y="2704"/>
+                  </a:lnTo>
+                  <a:lnTo>
+                    <a:pt x="2534" y="2704"/>
+                  </a:lnTo>
+                  <a:lnTo>
+                    <a:pt x="2241" y="2704"/>
+                  </a:lnTo>
+                  <a:lnTo>
+                    <a:pt x="1949" y="2729"/>
+                  </a:lnTo>
+                  <a:lnTo>
+                    <a:pt x="1633" y="2777"/>
+                  </a:lnTo>
+                  <a:lnTo>
+                    <a:pt x="1316" y="2850"/>
+                  </a:lnTo>
+                  <a:lnTo>
+                    <a:pt x="999" y="2972"/>
+                  </a:lnTo>
+                  <a:lnTo>
+                    <a:pt x="707" y="3094"/>
+                  </a:lnTo>
+                  <a:lnTo>
+                    <a:pt x="415" y="3289"/>
+                  </a:lnTo>
+                  <a:lnTo>
+                    <a:pt x="147" y="3508"/>
+                  </a:lnTo>
+                  <a:lnTo>
+                    <a:pt x="147" y="3508"/>
+                  </a:lnTo>
+                  <a:lnTo>
+                    <a:pt x="74" y="3581"/>
+                  </a:lnTo>
+                  <a:lnTo>
+                    <a:pt x="25" y="3678"/>
+                  </a:lnTo>
+                  <a:lnTo>
+                    <a:pt x="1" y="3776"/>
+                  </a:lnTo>
+                  <a:lnTo>
+                    <a:pt x="1" y="3898"/>
+                  </a:lnTo>
+                  <a:lnTo>
+                    <a:pt x="1" y="3898"/>
+                  </a:lnTo>
+                  <a:lnTo>
+                    <a:pt x="1" y="3995"/>
+                  </a:lnTo>
+                  <a:lnTo>
+                    <a:pt x="25" y="4093"/>
+                  </a:lnTo>
+                  <a:lnTo>
+                    <a:pt x="74" y="4190"/>
+                  </a:lnTo>
+                  <a:lnTo>
+                    <a:pt x="147" y="4287"/>
+                  </a:lnTo>
+                  <a:lnTo>
+                    <a:pt x="7843" y="11984"/>
+                  </a:lnTo>
+                  <a:lnTo>
+                    <a:pt x="7843" y="11984"/>
+                  </a:lnTo>
+                  <a:lnTo>
+                    <a:pt x="7941" y="12057"/>
+                  </a:lnTo>
+                  <a:lnTo>
+                    <a:pt x="8038" y="12105"/>
+                  </a:lnTo>
+                  <a:lnTo>
+                    <a:pt x="8135" y="12130"/>
+                  </a:lnTo>
+                  <a:lnTo>
+                    <a:pt x="8233" y="12130"/>
+                  </a:lnTo>
+                  <a:lnTo>
+                    <a:pt x="8233" y="12130"/>
+                  </a:lnTo>
+                  <a:lnTo>
+                    <a:pt x="8355" y="12130"/>
+                  </a:lnTo>
+                  <a:lnTo>
+                    <a:pt x="8452" y="12105"/>
+                  </a:lnTo>
+                  <a:lnTo>
+                    <a:pt x="8549" y="12057"/>
+                  </a:lnTo>
+                  <a:lnTo>
+                    <a:pt x="8622" y="11984"/>
+                  </a:lnTo>
+                  <a:lnTo>
+                    <a:pt x="8622" y="11984"/>
+                  </a:lnTo>
+                  <a:lnTo>
+                    <a:pt x="8842" y="11716"/>
+                  </a:lnTo>
+                  <a:lnTo>
+                    <a:pt x="9036" y="11423"/>
+                  </a:lnTo>
+                  <a:lnTo>
+                    <a:pt x="9158" y="11131"/>
+                  </a:lnTo>
+                  <a:lnTo>
+                    <a:pt x="9280" y="10814"/>
+                  </a:lnTo>
+                  <a:lnTo>
+                    <a:pt x="9353" y="10498"/>
+                  </a:lnTo>
+                  <a:lnTo>
+                    <a:pt x="9402" y="10181"/>
+                  </a:lnTo>
+                  <a:lnTo>
+                    <a:pt x="9426" y="9889"/>
+                  </a:lnTo>
+                  <a:lnTo>
+                    <a:pt x="9426" y="9597"/>
+                  </a:lnTo>
+                  <a:lnTo>
+                    <a:pt x="9426" y="9597"/>
+                  </a:lnTo>
+                  <a:lnTo>
+                    <a:pt x="9426" y="9280"/>
+                  </a:lnTo>
+                  <a:lnTo>
+                    <a:pt x="9402" y="8964"/>
+                  </a:lnTo>
+                  <a:lnTo>
+                    <a:pt x="9353" y="8647"/>
+                  </a:lnTo>
+                  <a:lnTo>
+                    <a:pt x="9280" y="8330"/>
+                  </a:lnTo>
+                  <a:lnTo>
+                    <a:pt x="9231" y="8038"/>
+                  </a:lnTo>
+                  <a:lnTo>
+                    <a:pt x="9134" y="7746"/>
+                  </a:lnTo>
+                  <a:lnTo>
+                    <a:pt x="9036" y="7502"/>
+                  </a:lnTo>
+                  <a:lnTo>
+                    <a:pt x="8939" y="7259"/>
+                  </a:lnTo>
+                  <a:lnTo>
+                    <a:pt x="12130" y="4093"/>
+                  </a:lnTo>
+                </a:path>
+              </a:pathLst>
+            </a:custGeom>
+            <a:noFill/>
+            <a:ln w="9525" cap="rnd" cmpd="sng">
+              <a:solidFill>
+                <a:srgbClr val="000000"/>
+              </a:solidFill>
+              <a:prstDash val="solid"/>
+              <a:round/>
+              <a:headEnd type="none" w="med" len="med"/>
+              <a:tailEnd type="none" w="med" len="med"/>
+            </a:ln>
+          </p:spPr>
+          <p:txBody>
+            <a:bodyPr lIns="91425" tIns="91425" rIns="91425" bIns="91425" anchor="ctr" anchorCtr="0">
+              <a:noAutofit/>
+            </a:bodyPr>
+            <a:lstStyle/>
+            <a:p>
+              <a:pPr lvl="0">
+                <a:spcBef>
+                  <a:spcPts val="0"/>
+                </a:spcBef>
+                <a:buNone/>
+              </a:pPr>
+              <a:endParaRPr/>
+            </a:p>
+          </p:txBody>
+        </p:sp>
+        <p:sp>
+          <p:nvSpPr>
+            <p:cNvPr id="117" name="Shape 117"/>
+            <p:cNvSpPr/>
+            <p:nvPr/>
+          </p:nvSpPr>
+          <p:spPr>
+            <a:xfrm>
+              <a:off x="2814911" y="1754061"/>
+              <a:ext cx="49950" cy="49950"/>
+            </a:xfrm>
+            <a:custGeom>
+              <a:avLst/>
+              <a:gdLst/>
+              <a:ahLst/>
+              <a:cxnLst/>
+              <a:rect l="0" t="0" r="0" b="0"/>
+              <a:pathLst>
+                <a:path w="1998" h="1998" fill="none" extrusionOk="0">
+                  <a:moveTo>
+                    <a:pt x="1" y="1997"/>
+                  </a:moveTo>
+                  <a:lnTo>
+                    <a:pt x="1998" y="0"/>
+                  </a:lnTo>
+                </a:path>
+              </a:pathLst>
+            </a:custGeom>
+            <a:noFill/>
+            <a:ln w="9525" cap="rnd" cmpd="sng">
+              <a:solidFill>
+                <a:srgbClr val="000000"/>
+              </a:solidFill>
+              <a:prstDash val="solid"/>
+              <a:round/>
+              <a:headEnd type="none" w="med" len="med"/>
+              <a:tailEnd type="none" w="med" len="med"/>
+            </a:ln>
+          </p:spPr>
+          <p:txBody>
+            <a:bodyPr lIns="91425" tIns="91425" rIns="91425" bIns="91425" anchor="ctr" anchorCtr="0">
+              <a:noAutofit/>
+            </a:bodyPr>
+            <a:lstStyle/>
+            <a:p>
+              <a:pPr lvl="0">
+                <a:spcBef>
+                  <a:spcPts val="0"/>
+                </a:spcBef>
+                <a:buNone/>
+              </a:pPr>
+              <a:endParaRPr/>
+            </a:p>
+          </p:txBody>
+        </p:sp>
+      </p:grpSp>
+      <p:pic>
+        <p:nvPicPr>
+          <p:cNvPr id="11" name="Picture 2"/>
+          <p:cNvPicPr>
+            <a:picLocks noChangeAspect="1" noChangeArrowheads="1"/>
+          </p:cNvPicPr>
+          <p:nvPr/>
+        </p:nvPicPr>
+        <p:blipFill>
+          <a:blip r:embed="rId3">
+            <a:extLst>
+              <a:ext uri="{28A0092B-C50C-407E-A947-70E740481C1C}">
+                <a14:useLocalDpi xmlns:a14="http://schemas.microsoft.com/office/drawing/2010/main" val="0"/>
+              </a:ext>
+            </a:extLst>
+          </a:blip>
+          <a:srcRect/>
+          <a:stretch>
+            <a:fillRect/>
+          </a:stretch>
+        </p:blipFill>
+        <p:spPr bwMode="auto">
+          <a:xfrm>
+            <a:off x="1475657" y="1635646"/>
+            <a:ext cx="1512168" cy="3259838"/>
+          </a:xfrm>
+          <a:prstGeom prst="rect">
+            <a:avLst/>
+          </a:prstGeom>
+          <a:noFill/>
+          <a:ln>
+            <a:noFill/>
+          </a:ln>
+          <a:effectLst/>
+          <a:extLst>
+            <a:ext uri="{909E8E84-426E-40DD-AFC4-6F175D3DCCD1}">
+              <a14:hiddenFill xmlns:a14="http://schemas.microsoft.com/office/drawing/2010/main">
+                <a:solidFill>
+                  <a:schemeClr val="accent1"/>
+                </a:solidFill>
+              </a14:hiddenFill>
+            </a:ext>
+            <a:ext uri="{91240B29-F687-4F45-9708-019B960494DF}">
+              <a14:hiddenLine xmlns:a14="http://schemas.microsoft.com/office/drawing/2010/main" w="9525">
+                <a:solidFill>
+                  <a:schemeClr val="tx1"/>
+                </a:solidFill>
+                <a:miter lim="800000"/>
+                <a:headEnd/>
+                <a:tailEnd/>
+              </a14:hiddenLine>
+            </a:ext>
+            <a:ext uri="{AF507438-7753-43E0-B8FC-AC1667EBCBE1}">
+              <a14:hiddenEffects xmlns:a14="http://schemas.microsoft.com/office/drawing/2010/main">
+                <a:effectLst>
+                  <a:outerShdw dist="35921" dir="2700000" algn="ctr" rotWithShape="0">
+                    <a:schemeClr val="bg2"/>
+                  </a:outerShdw>
+                </a:effectLst>
+              </a14:hiddenEffects>
+            </a:ext>
+          </a:extLst>
+        </p:spPr>
+      </p:pic>
+      <p:sp>
+        <p:nvSpPr>
+          <p:cNvPr id="14" name="Shape 112"/>
+          <p:cNvSpPr txBox="1">
+            <a:spLocks noGrp="1"/>
+          </p:cNvSpPr>
+          <p:nvPr>
+            <p:ph type="body" idx="1"/>
+          </p:nvPr>
+        </p:nvSpPr>
+        <p:spPr>
+          <a:xfrm>
+            <a:off x="3355918" y="1490636"/>
+            <a:ext cx="3690958" cy="1224136"/>
+          </a:xfrm>
+          <a:prstGeom prst="rect">
+            <a:avLst/>
+          </a:prstGeom>
+        </p:spPr>
+        <p:txBody>
+          <a:bodyPr lIns="91425" tIns="91425" rIns="91425" bIns="91425" anchor="t" anchorCtr="0">
+            <a:noAutofit/>
+          </a:bodyPr>
+          <a:lstStyle/>
+          <a:p>
+            <a:pPr marL="457200" lvl="0" indent="-228600" rtl="0">
+              <a:spcBef>
+                <a:spcPts val="0"/>
+              </a:spcBef>
+            </a:pPr>
+            <a:r>
+              <a:rPr lang="en" sz="2000" dirty="0" smtClean="0">
+                <a:solidFill>
+                  <a:schemeClr val="accent6">
+                    <a:lumMod val="50000"/>
+                  </a:schemeClr>
+                </a:solidFill>
+              </a:rPr>
+              <a:t>Christian Hahn</a:t>
+            </a:r>
+          </a:p>
+          <a:p>
+            <a:pPr marL="457200" lvl="0" indent="-228600" rtl="0">
+              <a:spcBef>
+                <a:spcPts val="0"/>
+              </a:spcBef>
+            </a:pPr>
+            <a:r>
+              <a:rPr lang="en" sz="2000" dirty="0" smtClean="0">
+                <a:solidFill>
+                  <a:schemeClr val="accent5">
+                    <a:lumMod val="50000"/>
+                  </a:schemeClr>
+                </a:solidFill>
+              </a:rPr>
+              <a:t>Richard Vladimirskij</a:t>
+            </a:r>
+          </a:p>
+          <a:p>
+            <a:pPr marL="457200" indent="-228600">
+              <a:spcBef>
+                <a:spcPts val="0"/>
+              </a:spcBef>
+            </a:pPr>
+            <a:r>
+              <a:rPr lang="en" sz="2000" dirty="0">
+                <a:solidFill>
+                  <a:schemeClr val="accent4">
+                    <a:lumMod val="50000"/>
+                  </a:schemeClr>
+                </a:solidFill>
+              </a:rPr>
+              <a:t>Manuel Schwalm</a:t>
+            </a:r>
+          </a:p>
+          <a:p>
+            <a:pPr marL="457200" lvl="0" indent="-228600" rtl="0">
+              <a:spcBef>
+                <a:spcPts val="0"/>
+              </a:spcBef>
+            </a:pPr>
+            <a:endParaRPr lang="en" dirty="0" smtClean="0"/>
+          </a:p>
+        </p:txBody>
+      </p:sp>
+      <p:sp>
+        <p:nvSpPr>
+          <p:cNvPr id="15" name="Shape 112"/>
+          <p:cNvSpPr txBox="1">
+            <a:spLocks/>
+          </p:cNvSpPr>
+          <p:nvPr/>
+        </p:nvSpPr>
+        <p:spPr>
+          <a:xfrm>
+            <a:off x="3355918" y="2715766"/>
+            <a:ext cx="3690958" cy="1296144"/>
+          </a:xfrm>
+          <a:prstGeom prst="rect">
+            <a:avLst/>
+          </a:prstGeom>
+          <a:noFill/>
+          <a:ln>
+            <a:noFill/>
+          </a:ln>
+        </p:spPr>
+        <p:txBody>
+          <a:bodyPr lIns="91425" tIns="91425" rIns="91425" bIns="91425" anchor="t" anchorCtr="0">
+            <a:noAutofit/>
+          </a:bodyPr>
+          <a:lstStyle>
+            <a:defPPr marR="0" lvl="0" algn="l" rtl="0">
+              <a:lnSpc>
+                <a:spcPct val="100000"/>
+              </a:lnSpc>
+              <a:spcBef>
+                <a:spcPts val="0"/>
+              </a:spcBef>
+              <a:spcAft>
+                <a:spcPts val="0"/>
+              </a:spcAft>
+            </a:defPPr>
+            <a:lvl1pPr marR="0" lvl="0" algn="l" rtl="0">
+              <a:lnSpc>
+                <a:spcPct val="100000"/>
+              </a:lnSpc>
+              <a:spcBef>
+                <a:spcPts val="600"/>
+              </a:spcBef>
+              <a:spcAft>
+                <a:spcPts val="0"/>
+              </a:spcAft>
+              <a:buClr>
+                <a:srgbClr val="FFCD00"/>
+              </a:buClr>
+              <a:buSzPct val="100000"/>
+              <a:buFont typeface="Quattrocento Sans"/>
+              <a:buChar char="◉"/>
+              <a:defRPr sz="2400" b="0" i="0" u="none" strike="noStrike" cap="none">
+                <a:solidFill>
+                  <a:srgbClr val="000000"/>
+                </a:solidFill>
+                <a:latin typeface="Quattrocento Sans"/>
+                <a:ea typeface="Quattrocento Sans"/>
+                <a:cs typeface="Quattrocento Sans"/>
+                <a:sym typeface="Quattrocento Sans"/>
+              </a:defRPr>
+            </a:lvl1pPr>
+            <a:lvl2pPr marR="0" lvl="1" algn="l" rtl="0">
+              <a:lnSpc>
+                <a:spcPct val="100000"/>
+              </a:lnSpc>
+              <a:spcBef>
+                <a:spcPts val="480"/>
+              </a:spcBef>
+              <a:spcAft>
+                <a:spcPts val="0"/>
+              </a:spcAft>
+              <a:buClr>
+                <a:srgbClr val="FFCD00"/>
+              </a:buClr>
+              <a:buSzPct val="100000"/>
+              <a:buFont typeface="Quattrocento Sans"/>
+              <a:buNone/>
+              <a:defRPr sz="2000" b="0" i="0" u="none" strike="noStrike" cap="none">
+                <a:solidFill>
+                  <a:srgbClr val="000000"/>
+                </a:solidFill>
+                <a:latin typeface="Quattrocento Sans"/>
+                <a:ea typeface="Quattrocento Sans"/>
+                <a:cs typeface="Quattrocento Sans"/>
+                <a:sym typeface="Quattrocento Sans"/>
+              </a:defRPr>
+            </a:lvl2pPr>
+            <a:lvl3pPr marR="0" lvl="2" algn="l" rtl="0">
+              <a:lnSpc>
+                <a:spcPct val="100000"/>
+              </a:lnSpc>
+              <a:spcBef>
+                <a:spcPts val="480"/>
+              </a:spcBef>
+              <a:spcAft>
+                <a:spcPts val="0"/>
+              </a:spcAft>
+              <a:buClr>
+                <a:srgbClr val="FFCD00"/>
+              </a:buClr>
+              <a:buSzPct val="100000"/>
+              <a:buFont typeface="Quattrocento Sans"/>
+              <a:buNone/>
+              <a:defRPr sz="2000" b="0" i="0" u="none" strike="noStrike" cap="none">
+                <a:solidFill>
+                  <a:srgbClr val="000000"/>
+                </a:solidFill>
+                <a:latin typeface="Quattrocento Sans"/>
+                <a:ea typeface="Quattrocento Sans"/>
+                <a:cs typeface="Quattrocento Sans"/>
+                <a:sym typeface="Quattrocento Sans"/>
+              </a:defRPr>
+            </a:lvl3pPr>
+            <a:lvl4pPr marR="0" lvl="3" algn="l" rtl="0">
+              <a:lnSpc>
+                <a:spcPct val="100000"/>
+              </a:lnSpc>
+              <a:spcBef>
+                <a:spcPts val="360"/>
+              </a:spcBef>
+              <a:spcAft>
+                <a:spcPts val="0"/>
+              </a:spcAft>
+              <a:buClr>
+                <a:srgbClr val="FFCD00"/>
+              </a:buClr>
+              <a:buSzPct val="100000"/>
+              <a:buFont typeface="Quattrocento Sans"/>
+              <a:buNone/>
+              <a:defRPr sz="1800" b="0" i="0" u="none" strike="noStrike" cap="none">
+                <a:solidFill>
+                  <a:srgbClr val="000000"/>
+                </a:solidFill>
+                <a:latin typeface="Quattrocento Sans"/>
+                <a:ea typeface="Quattrocento Sans"/>
+                <a:cs typeface="Quattrocento Sans"/>
+                <a:sym typeface="Quattrocento Sans"/>
+              </a:defRPr>
+            </a:lvl4pPr>
+            <a:lvl5pPr marR="0" lvl="4" algn="l" rtl="0">
+              <a:lnSpc>
+                <a:spcPct val="100000"/>
+              </a:lnSpc>
+              <a:spcBef>
+                <a:spcPts val="360"/>
+              </a:spcBef>
+              <a:spcAft>
+                <a:spcPts val="0"/>
+              </a:spcAft>
+              <a:buClr>
+                <a:srgbClr val="FFCD00"/>
+              </a:buClr>
+              <a:buSzPct val="100000"/>
+              <a:buFont typeface="Quattrocento Sans"/>
+              <a:buNone/>
+              <a:defRPr sz="1800" b="0" i="0" u="none" strike="noStrike" cap="none">
+                <a:solidFill>
+                  <a:srgbClr val="000000"/>
+                </a:solidFill>
+                <a:latin typeface="Quattrocento Sans"/>
+                <a:ea typeface="Quattrocento Sans"/>
+                <a:cs typeface="Quattrocento Sans"/>
+                <a:sym typeface="Quattrocento Sans"/>
+              </a:defRPr>
+            </a:lvl5pPr>
+            <a:lvl6pPr marR="0" lvl="5" algn="l" rtl="0">
+              <a:lnSpc>
+                <a:spcPct val="100000"/>
+              </a:lnSpc>
+              <a:spcBef>
+                <a:spcPts val="360"/>
+              </a:spcBef>
+              <a:spcAft>
+                <a:spcPts val="0"/>
+              </a:spcAft>
+              <a:buClr>
+                <a:srgbClr val="FFCD00"/>
+              </a:buClr>
+              <a:buSzPct val="100000"/>
+              <a:buFont typeface="Quattrocento Sans"/>
+              <a:buNone/>
+              <a:defRPr sz="1800" b="0" i="0" u="none" strike="noStrike" cap="none">
+                <a:solidFill>
+                  <a:srgbClr val="000000"/>
+                </a:solidFill>
+                <a:latin typeface="Quattrocento Sans"/>
+                <a:ea typeface="Quattrocento Sans"/>
+                <a:cs typeface="Quattrocento Sans"/>
+                <a:sym typeface="Quattrocento Sans"/>
+              </a:defRPr>
+            </a:lvl6pPr>
+            <a:lvl7pPr marR="0" lvl="6" algn="l" rtl="0">
+              <a:lnSpc>
+                <a:spcPct val="100000"/>
+              </a:lnSpc>
+              <a:spcBef>
+                <a:spcPts val="360"/>
+              </a:spcBef>
+              <a:spcAft>
+                <a:spcPts val="0"/>
+              </a:spcAft>
+              <a:buClr>
+                <a:srgbClr val="FFCD00"/>
+              </a:buClr>
+              <a:buSzPct val="100000"/>
+              <a:buFont typeface="Quattrocento Sans"/>
+              <a:buNone/>
+              <a:defRPr sz="1800" b="0" i="0" u="none" strike="noStrike" cap="none">
+                <a:solidFill>
+                  <a:srgbClr val="000000"/>
+                </a:solidFill>
+                <a:latin typeface="Quattrocento Sans"/>
+                <a:ea typeface="Quattrocento Sans"/>
+                <a:cs typeface="Quattrocento Sans"/>
+                <a:sym typeface="Quattrocento Sans"/>
+              </a:defRPr>
+            </a:lvl7pPr>
+            <a:lvl8pPr marR="0" lvl="7" algn="l" rtl="0">
+              <a:lnSpc>
+                <a:spcPct val="100000"/>
+              </a:lnSpc>
+              <a:spcBef>
+                <a:spcPts val="360"/>
+              </a:spcBef>
+              <a:spcAft>
+                <a:spcPts val="0"/>
+              </a:spcAft>
+              <a:buClr>
+                <a:srgbClr val="FFCD00"/>
+              </a:buClr>
+              <a:buSzPct val="100000"/>
+              <a:buFont typeface="Quattrocento Sans"/>
+              <a:buNone/>
+              <a:defRPr sz="1800" b="0" i="0" u="none" strike="noStrike" cap="none">
+                <a:solidFill>
+                  <a:srgbClr val="000000"/>
+                </a:solidFill>
+                <a:latin typeface="Quattrocento Sans"/>
+                <a:ea typeface="Quattrocento Sans"/>
+                <a:cs typeface="Quattrocento Sans"/>
+                <a:sym typeface="Quattrocento Sans"/>
+              </a:defRPr>
+            </a:lvl8pPr>
+            <a:lvl9pPr marR="0" lvl="8" algn="l" rtl="0">
+              <a:lnSpc>
+                <a:spcPct val="100000"/>
+              </a:lnSpc>
+              <a:spcBef>
+                <a:spcPts val="360"/>
+              </a:spcBef>
+              <a:spcAft>
+                <a:spcPts val="0"/>
+              </a:spcAft>
+              <a:buClr>
+                <a:srgbClr val="FFCD00"/>
+              </a:buClr>
+              <a:buSzPct val="100000"/>
+              <a:buFont typeface="Quattrocento Sans"/>
+              <a:buNone/>
+              <a:defRPr sz="1800" b="0" i="0" u="none" strike="noStrike" cap="none">
+                <a:solidFill>
+                  <a:srgbClr val="000000"/>
+                </a:solidFill>
+                <a:latin typeface="Quattrocento Sans"/>
+                <a:ea typeface="Quattrocento Sans"/>
+                <a:cs typeface="Quattrocento Sans"/>
+                <a:sym typeface="Quattrocento Sans"/>
+              </a:defRPr>
+            </a:lvl9pPr>
+          </a:lstStyle>
+          <a:p>
+            <a:pPr marL="457200" indent="-228600">
+              <a:spcBef>
+                <a:spcPts val="0"/>
+              </a:spcBef>
+            </a:pPr>
+            <a:r>
+              <a:rPr lang="en" sz="2000" dirty="0" smtClean="0">
+                <a:solidFill>
+                  <a:schemeClr val="accent4">
+                    <a:lumMod val="50000"/>
+                  </a:schemeClr>
+                </a:solidFill>
+              </a:rPr>
+              <a:t>Manuel Schwalm</a:t>
+            </a:r>
+          </a:p>
+          <a:p>
+            <a:pPr marL="457200" indent="-228600">
+              <a:spcBef>
+                <a:spcPts val="0"/>
+              </a:spcBef>
+            </a:pPr>
+            <a:r>
+              <a:rPr lang="en" sz="2000" dirty="0" smtClean="0">
+                <a:solidFill>
+                  <a:schemeClr val="accent2">
+                    <a:lumMod val="50000"/>
+                  </a:schemeClr>
+                </a:solidFill>
+              </a:rPr>
+              <a:t>Eugen Krizki</a:t>
+            </a:r>
+          </a:p>
+          <a:p>
+            <a:pPr marL="457200" indent="-228600">
+              <a:spcBef>
+                <a:spcPts val="0"/>
+              </a:spcBef>
+            </a:pPr>
+            <a:r>
+              <a:rPr lang="en" sz="2000" dirty="0" smtClean="0">
+                <a:solidFill>
+                  <a:schemeClr val="tx1">
+                    <a:lumMod val="95000"/>
+                    <a:lumOff val="5000"/>
+                  </a:schemeClr>
+                </a:solidFill>
+              </a:rPr>
+              <a:t>Marcel Herd</a:t>
+            </a:r>
+            <a:endParaRPr lang="en" sz="2000" dirty="0">
+              <a:solidFill>
+                <a:schemeClr val="tx1">
+                  <a:lumMod val="95000"/>
+                  <a:lumOff val="5000"/>
+                </a:schemeClr>
+              </a:solidFill>
+            </a:endParaRPr>
+          </a:p>
+        </p:txBody>
+      </p:sp>
+      <p:sp>
+        <p:nvSpPr>
+          <p:cNvPr id="16" name="Shape 112"/>
+          <p:cNvSpPr txBox="1">
+            <a:spLocks/>
+          </p:cNvSpPr>
+          <p:nvPr/>
+        </p:nvSpPr>
+        <p:spPr>
+          <a:xfrm>
+            <a:off x="3329314" y="4182708"/>
+            <a:ext cx="3690958" cy="800472"/>
+          </a:xfrm>
+          <a:prstGeom prst="rect">
+            <a:avLst/>
+          </a:prstGeom>
+          <a:noFill/>
+          <a:ln>
+            <a:noFill/>
+          </a:ln>
+        </p:spPr>
+        <p:txBody>
+          <a:bodyPr lIns="91425" tIns="91425" rIns="91425" bIns="91425" anchor="t" anchorCtr="0">
+            <a:noAutofit/>
+          </a:bodyPr>
+          <a:lstStyle>
+            <a:defPPr marR="0" lvl="0" algn="l" rtl="0">
+              <a:lnSpc>
+                <a:spcPct val="100000"/>
+              </a:lnSpc>
+              <a:spcBef>
+                <a:spcPts val="0"/>
+              </a:spcBef>
+              <a:spcAft>
+                <a:spcPts val="0"/>
+              </a:spcAft>
+            </a:defPPr>
+            <a:lvl1pPr marR="0" lvl="0" algn="l" rtl="0">
+              <a:lnSpc>
+                <a:spcPct val="100000"/>
+              </a:lnSpc>
+              <a:spcBef>
+                <a:spcPts val="600"/>
+              </a:spcBef>
+              <a:spcAft>
+                <a:spcPts val="0"/>
+              </a:spcAft>
+              <a:buClr>
+                <a:srgbClr val="FFCD00"/>
+              </a:buClr>
+              <a:buSzPct val="100000"/>
+              <a:buFont typeface="Quattrocento Sans"/>
+              <a:buChar char="◉"/>
+              <a:defRPr sz="2400" b="0" i="0" u="none" strike="noStrike" cap="none">
+                <a:solidFill>
+                  <a:srgbClr val="000000"/>
+                </a:solidFill>
+                <a:latin typeface="Quattrocento Sans"/>
+                <a:ea typeface="Quattrocento Sans"/>
+                <a:cs typeface="Quattrocento Sans"/>
+                <a:sym typeface="Quattrocento Sans"/>
+              </a:defRPr>
+            </a:lvl1pPr>
+            <a:lvl2pPr marR="0" lvl="1" algn="l" rtl="0">
+              <a:lnSpc>
+                <a:spcPct val="100000"/>
+              </a:lnSpc>
+              <a:spcBef>
+                <a:spcPts val="480"/>
+              </a:spcBef>
+              <a:spcAft>
+                <a:spcPts val="0"/>
+              </a:spcAft>
+              <a:buClr>
+                <a:srgbClr val="FFCD00"/>
+              </a:buClr>
+              <a:buSzPct val="100000"/>
+              <a:buFont typeface="Quattrocento Sans"/>
+              <a:buNone/>
+              <a:defRPr sz="2000" b="0" i="0" u="none" strike="noStrike" cap="none">
+                <a:solidFill>
+                  <a:srgbClr val="000000"/>
+                </a:solidFill>
+                <a:latin typeface="Quattrocento Sans"/>
+                <a:ea typeface="Quattrocento Sans"/>
+                <a:cs typeface="Quattrocento Sans"/>
+                <a:sym typeface="Quattrocento Sans"/>
+              </a:defRPr>
+            </a:lvl2pPr>
+            <a:lvl3pPr marR="0" lvl="2" algn="l" rtl="0">
+              <a:lnSpc>
+                <a:spcPct val="100000"/>
+              </a:lnSpc>
+              <a:spcBef>
+                <a:spcPts val="480"/>
+              </a:spcBef>
+              <a:spcAft>
+                <a:spcPts val="0"/>
+              </a:spcAft>
+              <a:buClr>
+                <a:srgbClr val="FFCD00"/>
+              </a:buClr>
+              <a:buSzPct val="100000"/>
+              <a:buFont typeface="Quattrocento Sans"/>
+              <a:buNone/>
+              <a:defRPr sz="2000" b="0" i="0" u="none" strike="noStrike" cap="none">
+                <a:solidFill>
+                  <a:srgbClr val="000000"/>
+                </a:solidFill>
+                <a:latin typeface="Quattrocento Sans"/>
+                <a:ea typeface="Quattrocento Sans"/>
+                <a:cs typeface="Quattrocento Sans"/>
+                <a:sym typeface="Quattrocento Sans"/>
+              </a:defRPr>
+            </a:lvl3pPr>
+            <a:lvl4pPr marR="0" lvl="3" algn="l" rtl="0">
+              <a:lnSpc>
+                <a:spcPct val="100000"/>
+              </a:lnSpc>
+              <a:spcBef>
+                <a:spcPts val="360"/>
+              </a:spcBef>
+              <a:spcAft>
+                <a:spcPts val="0"/>
+              </a:spcAft>
+              <a:buClr>
+                <a:srgbClr val="FFCD00"/>
+              </a:buClr>
+              <a:buSzPct val="100000"/>
+              <a:buFont typeface="Quattrocento Sans"/>
+              <a:buNone/>
+              <a:defRPr sz="1800" b="0" i="0" u="none" strike="noStrike" cap="none">
+                <a:solidFill>
+                  <a:srgbClr val="000000"/>
+                </a:solidFill>
+                <a:latin typeface="Quattrocento Sans"/>
+                <a:ea typeface="Quattrocento Sans"/>
+                <a:cs typeface="Quattrocento Sans"/>
+                <a:sym typeface="Quattrocento Sans"/>
+              </a:defRPr>
+            </a:lvl4pPr>
+            <a:lvl5pPr marR="0" lvl="4" algn="l" rtl="0">
+              <a:lnSpc>
+                <a:spcPct val="100000"/>
+              </a:lnSpc>
+              <a:spcBef>
+                <a:spcPts val="360"/>
+              </a:spcBef>
+              <a:spcAft>
+                <a:spcPts val="0"/>
+              </a:spcAft>
+              <a:buClr>
+                <a:srgbClr val="FFCD00"/>
+              </a:buClr>
+              <a:buSzPct val="100000"/>
+              <a:buFont typeface="Quattrocento Sans"/>
+              <a:buNone/>
+              <a:defRPr sz="1800" b="0" i="0" u="none" strike="noStrike" cap="none">
+                <a:solidFill>
+                  <a:srgbClr val="000000"/>
+                </a:solidFill>
+                <a:latin typeface="Quattrocento Sans"/>
+                <a:ea typeface="Quattrocento Sans"/>
+                <a:cs typeface="Quattrocento Sans"/>
+                <a:sym typeface="Quattrocento Sans"/>
+              </a:defRPr>
+            </a:lvl5pPr>
+            <a:lvl6pPr marR="0" lvl="5" algn="l" rtl="0">
+              <a:lnSpc>
+                <a:spcPct val="100000"/>
+              </a:lnSpc>
+              <a:spcBef>
+                <a:spcPts val="360"/>
+              </a:spcBef>
+              <a:spcAft>
+                <a:spcPts val="0"/>
+              </a:spcAft>
+              <a:buClr>
+                <a:srgbClr val="FFCD00"/>
+              </a:buClr>
+              <a:buSzPct val="100000"/>
+              <a:buFont typeface="Quattrocento Sans"/>
+              <a:buNone/>
+              <a:defRPr sz="1800" b="0" i="0" u="none" strike="noStrike" cap="none">
+                <a:solidFill>
+                  <a:srgbClr val="000000"/>
+                </a:solidFill>
+                <a:latin typeface="Quattrocento Sans"/>
+                <a:ea typeface="Quattrocento Sans"/>
+                <a:cs typeface="Quattrocento Sans"/>
+                <a:sym typeface="Quattrocento Sans"/>
+              </a:defRPr>
+            </a:lvl6pPr>
+            <a:lvl7pPr marR="0" lvl="6" algn="l" rtl="0">
+              <a:lnSpc>
+                <a:spcPct val="100000"/>
+              </a:lnSpc>
+              <a:spcBef>
+                <a:spcPts val="360"/>
+              </a:spcBef>
+              <a:spcAft>
+                <a:spcPts val="0"/>
+              </a:spcAft>
+              <a:buClr>
+                <a:srgbClr val="FFCD00"/>
+              </a:buClr>
+              <a:buSzPct val="100000"/>
+              <a:buFont typeface="Quattrocento Sans"/>
+              <a:buNone/>
+              <a:defRPr sz="1800" b="0" i="0" u="none" strike="noStrike" cap="none">
+                <a:solidFill>
+                  <a:srgbClr val="000000"/>
+                </a:solidFill>
+                <a:latin typeface="Quattrocento Sans"/>
+                <a:ea typeface="Quattrocento Sans"/>
+                <a:cs typeface="Quattrocento Sans"/>
+                <a:sym typeface="Quattrocento Sans"/>
+              </a:defRPr>
+            </a:lvl7pPr>
+            <a:lvl8pPr marR="0" lvl="7" algn="l" rtl="0">
+              <a:lnSpc>
+                <a:spcPct val="100000"/>
+              </a:lnSpc>
+              <a:spcBef>
+                <a:spcPts val="360"/>
+              </a:spcBef>
+              <a:spcAft>
+                <a:spcPts val="0"/>
+              </a:spcAft>
+              <a:buClr>
+                <a:srgbClr val="FFCD00"/>
+              </a:buClr>
+              <a:buSzPct val="100000"/>
+              <a:buFont typeface="Quattrocento Sans"/>
+              <a:buNone/>
+              <a:defRPr sz="1800" b="0" i="0" u="none" strike="noStrike" cap="none">
+                <a:solidFill>
+                  <a:srgbClr val="000000"/>
+                </a:solidFill>
+                <a:latin typeface="Quattrocento Sans"/>
+                <a:ea typeface="Quattrocento Sans"/>
+                <a:cs typeface="Quattrocento Sans"/>
+                <a:sym typeface="Quattrocento Sans"/>
+              </a:defRPr>
+            </a:lvl8pPr>
+            <a:lvl9pPr marR="0" lvl="8" algn="l" rtl="0">
+              <a:lnSpc>
+                <a:spcPct val="100000"/>
+              </a:lnSpc>
+              <a:spcBef>
+                <a:spcPts val="360"/>
+              </a:spcBef>
+              <a:spcAft>
+                <a:spcPts val="0"/>
+              </a:spcAft>
+              <a:buClr>
+                <a:srgbClr val="FFCD00"/>
+              </a:buClr>
+              <a:buSzPct val="100000"/>
+              <a:buFont typeface="Quattrocento Sans"/>
+              <a:buNone/>
+              <a:defRPr sz="1800" b="0" i="0" u="none" strike="noStrike" cap="none">
+                <a:solidFill>
+                  <a:srgbClr val="000000"/>
+                </a:solidFill>
+                <a:latin typeface="Quattrocento Sans"/>
+                <a:ea typeface="Quattrocento Sans"/>
+                <a:cs typeface="Quattrocento Sans"/>
+                <a:sym typeface="Quattrocento Sans"/>
+              </a:defRPr>
+            </a:lvl9pPr>
+          </a:lstStyle>
+          <a:p>
+            <a:pPr marL="457200" indent="-228600">
+              <a:spcBef>
+                <a:spcPts val="0"/>
+              </a:spcBef>
+            </a:pPr>
+            <a:r>
+              <a:rPr lang="en" sz="2000" dirty="0" smtClean="0">
+                <a:solidFill>
+                  <a:schemeClr val="tx1">
+                    <a:lumMod val="95000"/>
+                    <a:lumOff val="5000"/>
+                  </a:schemeClr>
+                </a:solidFill>
+              </a:rPr>
+              <a:t>Marcel Herd</a:t>
+            </a:r>
+            <a:endParaRPr lang="en" sz="2000" dirty="0">
+              <a:solidFill>
+                <a:schemeClr val="tx1">
+                  <a:lumMod val="95000"/>
+                  <a:lumOff val="5000"/>
+                </a:schemeClr>
+              </a:solidFill>
+            </a:endParaRPr>
+          </a:p>
+        </p:txBody>
+      </p:sp>
+    </p:spTree>
+    <p:extLst>
+      <p:ext uri="{BB962C8B-B14F-4D97-AF65-F5344CB8AC3E}">
+        <p14:creationId xmlns:p14="http://schemas.microsoft.com/office/powerpoint/2010/main" val="806404324"/>
+      </p:ext>
+    </p:extLst>
+  </p:cSld>
+  <p:clrMapOvr>
+    <a:masterClrMapping/>
+  </p:clrMapOvr>
+  <mc:AlternateContent xmlns:mc="http://schemas.openxmlformats.org/markup-compatibility/2006" xmlns:p14="http://schemas.microsoft.com/office/powerpoint/2010/main">
+    <mc:Choice Requires="p14">
+      <p:transition p14:dur="0"/>
+    </mc:Choice>
+    <mc:Fallback xmlns="">
+      <p:transition/>
+    </mc:Fallback>
+  </mc:AlternateContent>
+  <p:timing>
+    <p:tnLst>
+      <p:par>
+        <p:cTn id="1" dur="indefinite" restart="never" nodeType="tmRoot"/>
+      </p:par>
+    </p:tnLst>
+  </p:timing>
+</p:sld>
+</file>
+
+<file path=ppt/slides/slide46.xml><?xml version="1.0" encoding="utf-8"?>
+<p:sld xmlns:a="http://schemas.openxmlformats.org/drawingml/2006/main" xmlns:r="http://schemas.openxmlformats.org/officeDocument/2006/relationships" xmlns:p="http://schemas.openxmlformats.org/presentationml/2006/main">
+  <p:cSld>
+    <p:spTree>
+      <p:nvGrpSpPr>
         <p:cNvPr id="1" name="Shape 98"/>
         <p:cNvGrpSpPr/>
         <p:nvPr/>
@@ -33885,7 +35420,7 @@
 </p:sld>
 </file>
 
-<file path=ppt/slides/slide46.xml><?xml version="1.0" encoding="utf-8"?>
+<file path=ppt/slides/slide47.xml><?xml version="1.0" encoding="utf-8"?>
 <p:sld xmlns:a="http://schemas.openxmlformats.org/drawingml/2006/main" xmlns:r="http://schemas.openxmlformats.org/officeDocument/2006/relationships" xmlns:p="http://schemas.openxmlformats.org/presentationml/2006/main">
   <p:cSld>
     <p:spTree>
@@ -34614,7 +36149,7 @@
 </p:sld>
 </file>
 
-<file path=ppt/slides/slide47.xml><?xml version="1.0" encoding="utf-8"?>
+<file path=ppt/slides/slide48.xml><?xml version="1.0" encoding="utf-8"?>
 <p:sld xmlns:a="http://schemas.openxmlformats.org/drawingml/2006/main" xmlns:r="http://schemas.openxmlformats.org/officeDocument/2006/relationships" xmlns:p="http://schemas.openxmlformats.org/presentationml/2006/main">
   <p:cSld>
     <p:spTree>
@@ -35628,7 +37163,11 @@
             </a:r>
             <a:r>
               <a:rPr lang="en" dirty="0" smtClean="0"/>
-              <a:t> 1239</a:t>
+              <a:t> </a:t>
+            </a:r>
+            <a:r>
+              <a:rPr lang="en" dirty="0" smtClean="0"/>
+              <a:t>1941</a:t>
             </a:r>
             <a:endParaRPr lang="en" dirty="0"/>
           </a:p>
@@ -35672,13 +37211,8 @@
             </a:r>
             <a:r>
               <a:rPr lang="en" dirty="0" smtClean="0"/>
-              <a:t>Game		     </a:t>
+              <a:t>Game		     511</a:t>
             </a:r>
-            <a:r>
-              <a:rPr lang="en" dirty="0" smtClean="0"/>
-              <a:t>511</a:t>
-            </a:r>
-            <a:endParaRPr lang="en" dirty="0" smtClean="0"/>
           </a:p>
           <a:p>
             <a:pPr marL="228600" lvl="0">
@@ -35691,13 +37225,7 @@
               <a:rPr lang="en" dirty="0" smtClean="0">
                 <a:sym typeface="Wingdings" pitchFamily="2" charset="2"/>
               </a:rPr>
-              <a:t> Gui		     </a:t>
-            </a:r>
-            <a:r>
-              <a:rPr lang="en" dirty="0" smtClean="0">
-                <a:sym typeface="Wingdings" pitchFamily="2" charset="2"/>
-              </a:rPr>
-              <a:t>587</a:t>
+              <a:t> Gui		     587</a:t>
             </a:r>
             <a:endParaRPr lang="en" dirty="0"/>
           </a:p>
@@ -36395,13 +37923,8 @@
             </a:r>
             <a:r>
               <a:rPr lang="en" dirty="0" smtClean="0"/>
-              <a:t> </a:t>
+              <a:t> 1941</a:t>
             </a:r>
-            <a:r>
-              <a:rPr lang="en" dirty="0" smtClean="0"/>
-              <a:t>1941</a:t>
-            </a:r>
-            <a:endParaRPr lang="en" dirty="0" smtClean="0"/>
           </a:p>
           <a:p>
             <a:pPr marL="457200" lvl="0" indent="-228600" rtl="0">
@@ -36421,13 +37944,8 @@
             </a:r>
             <a:r>
               <a:rPr lang="en" dirty="0" smtClean="0"/>
-              <a:t> </a:t>
+              <a:t> 854</a:t>
             </a:r>
-            <a:r>
-              <a:rPr lang="en" dirty="0" smtClean="0"/>
-              <a:t>854</a:t>
-            </a:r>
-            <a:endParaRPr lang="en" dirty="0" smtClean="0"/>
           </a:p>
           <a:p>
             <a:pPr marL="457200" lvl="0" indent="-228600" rtl="0">
@@ -36447,13 +37965,8 @@
             </a:r>
             <a:r>
               <a:rPr lang="en" dirty="0" smtClean="0"/>
-              <a:t> </a:t>
+              <a:t> 152</a:t>
             </a:r>
-            <a:r>
-              <a:rPr lang="en" dirty="0" smtClean="0"/>
-              <a:t>152</a:t>
-            </a:r>
-            <a:endParaRPr lang="en" dirty="0" smtClean="0"/>
           </a:p>
           <a:p>
             <a:pPr marL="457200" lvl="0" indent="-228600" rtl="0">
@@ -36473,13 +37986,8 @@
             </a:r>
             <a:r>
               <a:rPr lang="en" dirty="0" smtClean="0"/>
-              <a:t> </a:t>
+              <a:t> 48</a:t>
             </a:r>
-            <a:r>
-              <a:rPr lang="en" dirty="0" smtClean="0"/>
-              <a:t>48</a:t>
-            </a:r>
-            <a:endParaRPr lang="en" dirty="0" smtClean="0"/>
           </a:p>
           <a:p>
             <a:pPr marL="457200" lvl="0" indent="-228600" rtl="0">
@@ -36499,13 +38007,8 @@
             </a:r>
             <a:r>
               <a:rPr lang="en" dirty="0" smtClean="0"/>
-              <a:t> </a:t>
+              <a:t> 44</a:t>
             </a:r>
-            <a:r>
-              <a:rPr lang="en" dirty="0" smtClean="0"/>
-              <a:t>44</a:t>
-            </a:r>
-            <a:endParaRPr lang="en" dirty="0" smtClean="0"/>
           </a:p>
           <a:p>
             <a:pPr marL="457200" lvl="0" indent="-228600" rtl="0">
@@ -37219,13 +38722,8 @@
             </a:r>
             <a:r>
               <a:rPr lang="en" dirty="0" smtClean="0"/>
-              <a:t> </a:t>
+              <a:t> 308</a:t>
             </a:r>
-            <a:r>
-              <a:rPr lang="en" dirty="0" smtClean="0"/>
-              <a:t>308</a:t>
-            </a:r>
-            <a:endParaRPr lang="en" dirty="0" smtClean="0"/>
           </a:p>
           <a:p>
             <a:pPr marL="457200" lvl="0" indent="-228600" rtl="0">
@@ -37245,15 +38743,7 @@
             </a:r>
             <a:r>
               <a:rPr lang="en" dirty="0" smtClean="0"/>
-              <a:t> </a:t>
-            </a:r>
-            <a:r>
-              <a:rPr lang="en" dirty="0" smtClean="0"/>
-              <a:t>78.9</a:t>
-            </a:r>
-            <a:r>
-              <a:rPr lang="en" dirty="0" smtClean="0"/>
-              <a:t>%</a:t>
+              <a:t> 78.9%</a:t>
             </a:r>
           </a:p>
           <a:p>
@@ -37274,13 +38764,8 @@
             </a:r>
             <a:r>
               <a:rPr lang="en" dirty="0" smtClean="0"/>
-              <a:t> </a:t>
+              <a:t> 30</a:t>
             </a:r>
-            <a:r>
-              <a:rPr lang="en" dirty="0" smtClean="0"/>
-              <a:t>30</a:t>
-            </a:r>
-            <a:endParaRPr lang="en" dirty="0" smtClean="0"/>
           </a:p>
           <a:p>
             <a:pPr marL="457200" lvl="0" indent="-228600" rtl="0">
@@ -37302,19 +38787,7 @@
               <a:rPr lang="en" dirty="0" smtClean="0">
                 <a:sym typeface="Wingdings" pitchFamily="2" charset="2"/>
               </a:rPr>
-              <a:t> </a:t>
-            </a:r>
-            <a:r>
-              <a:rPr lang="en" dirty="0" smtClean="0">
-                <a:sym typeface="Wingdings" pitchFamily="2" charset="2"/>
-              </a:rPr>
-              <a:t>13.7% </a:t>
-            </a:r>
-            <a:r>
-              <a:rPr lang="en" dirty="0" smtClean="0">
-                <a:sym typeface="Wingdings" pitchFamily="2" charset="2"/>
-              </a:rPr>
-              <a:t>Comments</a:t>
+              <a:t> 13.7% Comments</a:t>
             </a:r>
             <a:endParaRPr lang="en" dirty="0"/>
           </a:p>

</xml_diff>